<commit_message>
Update slides part 1
</commit_message>
<xml_diff>
--- a/finalPresentation/Part 1/Part1.pptx
+++ b/finalPresentation/Part 1/Part1.pptx
@@ -6,7 +6,7 @@
     <p:sldMasterId id="2147483660" r:id="rId2"/>
   </p:sldMasterIdLst>
   <p:notesMasterIdLst>
-    <p:notesMasterId r:id="rId14"/>
+    <p:notesMasterId r:id="rId16"/>
   </p:notesMasterIdLst>
   <p:sldIdLst>
     <p:sldId id="257" r:id="rId3"/>
@@ -18,8 +18,10 @@
     <p:sldId id="268" r:id="rId9"/>
     <p:sldId id="260" r:id="rId10"/>
     <p:sldId id="263" r:id="rId11"/>
-    <p:sldId id="272" r:id="rId12"/>
-    <p:sldId id="271" r:id="rId13"/>
+    <p:sldId id="273" r:id="rId12"/>
+    <p:sldId id="272" r:id="rId13"/>
+    <p:sldId id="271" r:id="rId14"/>
+    <p:sldId id="274" r:id="rId15"/>
   </p:sldIdLst>
   <p:sldSz cx="12192000" cy="6858000"/>
   <p:notesSz cx="6858000" cy="9144000"/>
@@ -798,7 +800,377 @@
     </p:spTree>
     <p:extLst>
       <p:ext uri="{BB962C8B-B14F-4D97-AF65-F5344CB8AC3E}">
+        <p14:creationId xmlns:p14="http://schemas.microsoft.com/office/powerpoint/2010/main" val="2328796011"/>
+      </p:ext>
+    </p:extLst>
+  </p:cSld>
+  <p:clrMapOvr>
+    <a:masterClrMapping/>
+  </p:clrMapOvr>
+</p:notes>
+</file>
+
+<file path=ppt/notesSlides/notesSlide11.xml><?xml version="1.0" encoding="utf-8"?>
+<p:notes xmlns:a="http://schemas.openxmlformats.org/drawingml/2006/main" xmlns:r="http://schemas.openxmlformats.org/officeDocument/2006/relationships" xmlns:p="http://schemas.openxmlformats.org/presentationml/2006/main" showMasterSp="0" showMasterPhAnim="0">
+  <p:cSld>
+    <p:spTree>
+      <p:nvGrpSpPr>
+        <p:cNvPr id="1" name="Shape 32"/>
+        <p:cNvGrpSpPr/>
+        <p:nvPr/>
+      </p:nvGrpSpPr>
+      <p:grpSpPr>
+        <a:xfrm>
+          <a:off x="0" y="0"/>
+          <a:ext cx="0" cy="0"/>
+          <a:chOff x="0" y="0"/>
+          <a:chExt cx="0" cy="0"/>
+        </a:xfrm>
+      </p:grpSpPr>
+      <p:sp>
+        <p:nvSpPr>
+          <p:cNvPr id="33" name="Shape 33"/>
+          <p:cNvSpPr>
+            <a:spLocks noGrp="1" noRot="1" noChangeAspect="1"/>
+          </p:cNvSpPr>
+          <p:nvPr>
+            <p:ph type="sldImg" idx="2"/>
+          </p:nvPr>
+        </p:nvSpPr>
+        <p:spPr>
+          <a:xfrm>
+            <a:off x="381000" y="685800"/>
+            <a:ext cx="6096000" cy="3429000"/>
+          </a:xfrm>
+          <a:custGeom>
+            <a:avLst/>
+            <a:gdLst/>
+            <a:ahLst/>
+            <a:cxnLst/>
+            <a:rect l="0" t="0" r="0" b="0"/>
+            <a:pathLst>
+              <a:path w="120000" h="120000" extrusionOk="0">
+                <a:moveTo>
+                  <a:pt x="0" y="0"/>
+                </a:moveTo>
+                <a:lnTo>
+                  <a:pt x="120000" y="0"/>
+                </a:lnTo>
+                <a:lnTo>
+                  <a:pt x="120000" y="120000"/>
+                </a:lnTo>
+                <a:lnTo>
+                  <a:pt x="0" y="120000"/>
+                </a:lnTo>
+                <a:close/>
+              </a:path>
+            </a:pathLst>
+          </a:custGeom>
+          <a:noFill/>
+          <a:ln w="9525" cap="flat" cmpd="sng">
+            <a:solidFill>
+              <a:srgbClr val="000000"/>
+            </a:solidFill>
+            <a:prstDash val="solid"/>
+            <a:round/>
+            <a:headEnd type="none" w="med" len="med"/>
+            <a:tailEnd type="none" w="med" len="med"/>
+          </a:ln>
+        </p:spPr>
+      </p:sp>
+      <p:sp>
+        <p:nvSpPr>
+          <p:cNvPr id="34" name="Shape 34"/>
+          <p:cNvSpPr txBox="1">
+            <a:spLocks noGrp="1"/>
+          </p:cNvSpPr>
+          <p:nvPr>
+            <p:ph type="body" idx="1"/>
+          </p:nvPr>
+        </p:nvSpPr>
+        <p:spPr>
+          <a:xfrm>
+            <a:off x="685800" y="4343400"/>
+            <a:ext cx="5486399" cy="4114800"/>
+          </a:xfrm>
+          <a:prstGeom prst="rect">
+            <a:avLst/>
+          </a:prstGeom>
+        </p:spPr>
+        <p:txBody>
+          <a:bodyPr lIns="91425" tIns="91425" rIns="91425" bIns="91425" anchor="t" anchorCtr="0">
+            <a:noAutofit/>
+          </a:bodyPr>
+          <a:lstStyle/>
+          <a:p>
+            <a:pPr lvl="0" rtl="0">
+              <a:spcBef>
+                <a:spcPts val="0"/>
+              </a:spcBef>
+              <a:buNone/>
+            </a:pPr>
+            <a:r>
+              <a:rPr lang="it-IT" dirty="0"/>
+              <a:t>Voltaggio</a:t>
+            </a:r>
+            <a:r>
+              <a:rPr lang="it-IT" baseline="0" dirty="0"/>
+              <a:t> a onda quadra con corrente che lo segue e fare vedere che la </a:t>
+            </a:r>
+            <a:r>
+              <a:rPr lang="it-IT" baseline="0" dirty="0" err="1"/>
+              <a:t>disatnza</a:t>
+            </a:r>
+            <a:r>
+              <a:rPr lang="it-IT" baseline="0" dirty="0"/>
+              <a:t> a steady state è R. L’abbiamo </a:t>
+            </a:r>
+            <a:r>
+              <a:rPr lang="it-IT" baseline="0" dirty="0" err="1"/>
+              <a:t>idnetificata</a:t>
+            </a:r>
+            <a:r>
+              <a:rPr lang="it-IT" baseline="0" dirty="0"/>
+              <a:t> cosi.</a:t>
+            </a:r>
+          </a:p>
+          <a:p>
+            <a:pPr lvl="0" rtl="0">
+              <a:spcBef>
+                <a:spcPts val="0"/>
+              </a:spcBef>
+              <a:buNone/>
+            </a:pPr>
+            <a:endParaRPr lang="it-IT" baseline="0" dirty="0"/>
+          </a:p>
+          <a:p>
+            <a:pPr lvl="0" rtl="0">
+              <a:spcBef>
+                <a:spcPts val="0"/>
+              </a:spcBef>
+              <a:buNone/>
+            </a:pPr>
+            <a:r>
+              <a:rPr lang="it-IT" baseline="0" dirty="0"/>
+              <a:t>Per la </a:t>
+            </a:r>
+            <a:r>
+              <a:rPr lang="it-IT" baseline="0" dirty="0" err="1"/>
+              <a:t>fuznione</a:t>
+            </a:r>
+            <a:r>
+              <a:rPr lang="it-IT" baseline="0" dirty="0"/>
+              <a:t> di </a:t>
+            </a:r>
+            <a:r>
+              <a:rPr lang="it-IT" baseline="0" dirty="0" err="1"/>
+              <a:t>straferimento</a:t>
+            </a:r>
+            <a:r>
+              <a:rPr lang="it-IT" baseline="0" dirty="0"/>
+              <a:t> mettere il blocchetto di </a:t>
+            </a:r>
+            <a:r>
+              <a:rPr lang="it-IT" baseline="0" dirty="0" err="1"/>
+              <a:t>simulink</a:t>
+            </a:r>
+            <a:r>
+              <a:rPr lang="it-IT" baseline="0" dirty="0"/>
+              <a:t> nei modelli</a:t>
+            </a:r>
+            <a:endParaRPr dirty="0"/>
+          </a:p>
+        </p:txBody>
+      </p:sp>
+    </p:spTree>
+    <p:extLst>
+      <p:ext uri="{BB962C8B-B14F-4D97-AF65-F5344CB8AC3E}">
         <p14:creationId xmlns:p14="http://schemas.microsoft.com/office/powerpoint/2010/main" val="851829052"/>
+      </p:ext>
+    </p:extLst>
+  </p:cSld>
+  <p:clrMapOvr>
+    <a:masterClrMapping/>
+  </p:clrMapOvr>
+</p:notes>
+</file>
+
+<file path=ppt/notesSlides/notesSlide12.xml><?xml version="1.0" encoding="utf-8"?>
+<p:notes xmlns:a="http://schemas.openxmlformats.org/drawingml/2006/main" xmlns:r="http://schemas.openxmlformats.org/officeDocument/2006/relationships" xmlns:p="http://schemas.openxmlformats.org/presentationml/2006/main" showMasterSp="0" showMasterPhAnim="0">
+  <p:cSld>
+    <p:spTree>
+      <p:nvGrpSpPr>
+        <p:cNvPr id="1" name="Shape 32"/>
+        <p:cNvGrpSpPr/>
+        <p:nvPr/>
+      </p:nvGrpSpPr>
+      <p:grpSpPr>
+        <a:xfrm>
+          <a:off x="0" y="0"/>
+          <a:ext cx="0" cy="0"/>
+          <a:chOff x="0" y="0"/>
+          <a:chExt cx="0" cy="0"/>
+        </a:xfrm>
+      </p:grpSpPr>
+      <p:sp>
+        <p:nvSpPr>
+          <p:cNvPr id="33" name="Shape 33"/>
+          <p:cNvSpPr>
+            <a:spLocks noGrp="1" noRot="1" noChangeAspect="1"/>
+          </p:cNvSpPr>
+          <p:nvPr>
+            <p:ph type="sldImg" idx="2"/>
+          </p:nvPr>
+        </p:nvSpPr>
+        <p:spPr>
+          <a:xfrm>
+            <a:off x="381000" y="685800"/>
+            <a:ext cx="6096000" cy="3429000"/>
+          </a:xfrm>
+          <a:custGeom>
+            <a:avLst/>
+            <a:gdLst/>
+            <a:ahLst/>
+            <a:cxnLst/>
+            <a:rect l="0" t="0" r="0" b="0"/>
+            <a:pathLst>
+              <a:path w="120000" h="120000" extrusionOk="0">
+                <a:moveTo>
+                  <a:pt x="0" y="0"/>
+                </a:moveTo>
+                <a:lnTo>
+                  <a:pt x="120000" y="0"/>
+                </a:lnTo>
+                <a:lnTo>
+                  <a:pt x="120000" y="120000"/>
+                </a:lnTo>
+                <a:lnTo>
+                  <a:pt x="0" y="120000"/>
+                </a:lnTo>
+                <a:close/>
+              </a:path>
+            </a:pathLst>
+          </a:custGeom>
+          <a:noFill/>
+          <a:ln w="9525" cap="flat" cmpd="sng">
+            <a:solidFill>
+              <a:srgbClr val="000000"/>
+            </a:solidFill>
+            <a:prstDash val="solid"/>
+            <a:round/>
+            <a:headEnd type="none" w="med" len="med"/>
+            <a:tailEnd type="none" w="med" len="med"/>
+          </a:ln>
+        </p:spPr>
+      </p:sp>
+      <p:sp>
+        <p:nvSpPr>
+          <p:cNvPr id="34" name="Shape 34"/>
+          <p:cNvSpPr txBox="1">
+            <a:spLocks noGrp="1"/>
+          </p:cNvSpPr>
+          <p:nvPr>
+            <p:ph type="body" idx="1"/>
+          </p:nvPr>
+        </p:nvSpPr>
+        <p:spPr>
+          <a:xfrm>
+            <a:off x="685800" y="4343400"/>
+            <a:ext cx="5486399" cy="4114800"/>
+          </a:xfrm>
+          <a:prstGeom prst="rect">
+            <a:avLst/>
+          </a:prstGeom>
+        </p:spPr>
+        <p:txBody>
+          <a:bodyPr lIns="91425" tIns="91425" rIns="91425" bIns="91425" anchor="t" anchorCtr="0">
+            <a:noAutofit/>
+          </a:bodyPr>
+          <a:lstStyle/>
+          <a:p>
+            <a:pPr lvl="0" rtl="0">
+              <a:spcBef>
+                <a:spcPts val="0"/>
+              </a:spcBef>
+              <a:buNone/>
+            </a:pPr>
+            <a:r>
+              <a:rPr lang="it-IT" dirty="0"/>
+              <a:t>Voltaggio</a:t>
+            </a:r>
+            <a:r>
+              <a:rPr lang="it-IT" baseline="0" dirty="0"/>
+              <a:t> a onda quadra con corrente che lo segue e fare vedere che la </a:t>
+            </a:r>
+            <a:r>
+              <a:rPr lang="it-IT" baseline="0" dirty="0" err="1"/>
+              <a:t>disatnza</a:t>
+            </a:r>
+            <a:r>
+              <a:rPr lang="it-IT" baseline="0" dirty="0"/>
+              <a:t> a steady state è R. L’abbiamo </a:t>
+            </a:r>
+            <a:r>
+              <a:rPr lang="it-IT" baseline="0" dirty="0" err="1"/>
+              <a:t>idnetificata</a:t>
+            </a:r>
+            <a:r>
+              <a:rPr lang="it-IT" baseline="0" dirty="0"/>
+              <a:t> cosi.</a:t>
+            </a:r>
+          </a:p>
+          <a:p>
+            <a:pPr lvl="0" rtl="0">
+              <a:spcBef>
+                <a:spcPts val="0"/>
+              </a:spcBef>
+              <a:buNone/>
+            </a:pPr>
+            <a:endParaRPr lang="it-IT" baseline="0" dirty="0"/>
+          </a:p>
+          <a:p>
+            <a:pPr lvl="0" rtl="0">
+              <a:spcBef>
+                <a:spcPts val="0"/>
+              </a:spcBef>
+              <a:buNone/>
+            </a:pPr>
+            <a:r>
+              <a:rPr lang="it-IT" baseline="0" dirty="0"/>
+              <a:t>Per la </a:t>
+            </a:r>
+            <a:r>
+              <a:rPr lang="it-IT" baseline="0" dirty="0" err="1"/>
+              <a:t>fuznione</a:t>
+            </a:r>
+            <a:r>
+              <a:rPr lang="it-IT" baseline="0" dirty="0"/>
+              <a:t> di </a:t>
+            </a:r>
+            <a:r>
+              <a:rPr lang="it-IT" baseline="0" dirty="0" err="1"/>
+              <a:t>straferimento</a:t>
+            </a:r>
+            <a:r>
+              <a:rPr lang="it-IT" baseline="0" dirty="0"/>
+              <a:t> mettere il blocchetto di </a:t>
+            </a:r>
+            <a:r>
+              <a:rPr lang="it-IT" baseline="0" dirty="0" err="1"/>
+              <a:t>simulink</a:t>
+            </a:r>
+            <a:r>
+              <a:rPr lang="it-IT" baseline="0" dirty="0"/>
+              <a:t> nei modelli</a:t>
+            </a:r>
+            <a:endParaRPr dirty="0"/>
+          </a:p>
+        </p:txBody>
+      </p:sp>
+    </p:spTree>
+    <p:extLst>
+      <p:ext uri="{BB962C8B-B14F-4D97-AF65-F5344CB8AC3E}">
+        <p14:creationId xmlns:p14="http://schemas.microsoft.com/office/powerpoint/2010/main" val="278173629"/>
       </p:ext>
     </p:extLst>
   </p:cSld>
@@ -1940,7 +2312,7 @@
     </p:spTree>
     <p:extLst>
       <p:ext uri="{BB962C8B-B14F-4D97-AF65-F5344CB8AC3E}">
-        <p14:creationId xmlns:p14="http://schemas.microsoft.com/office/powerpoint/2010/main" val="2328796011"/>
+        <p14:creationId xmlns:p14="http://schemas.microsoft.com/office/powerpoint/2010/main" val="369319978"/>
       </p:ext>
     </p:extLst>
   </p:cSld>
@@ -6257,6 +6629,786 @@
           <a:chExt cx="0" cy="0"/>
         </a:xfrm>
       </p:grpSpPr>
+      <p:pic>
+        <p:nvPicPr>
+          <p:cNvPr id="7" name="Immagine 6"/>
+          <p:cNvPicPr>
+            <a:picLocks noChangeAspect="1"/>
+          </p:cNvPicPr>
+          <p:nvPr/>
+        </p:nvPicPr>
+        <p:blipFill>
+          <a:blip r:embed="rId4">
+            <a:extLst>
+              <a:ext uri="{28A0092B-C50C-407E-A947-70E740481C1C}">
+                <a14:useLocalDpi xmlns:a14="http://schemas.microsoft.com/office/drawing/2010/main" val="0"/>
+              </a:ext>
+            </a:extLst>
+          </a:blip>
+          <a:stretch>
+            <a:fillRect/>
+          </a:stretch>
+        </p:blipFill>
+        <p:spPr>
+          <a:xfrm>
+            <a:off x="1606450" y="848772"/>
+            <a:ext cx="5173767" cy="3880325"/>
+          </a:xfrm>
+          <a:prstGeom prst="rect">
+            <a:avLst/>
+          </a:prstGeom>
+        </p:spPr>
+      </p:pic>
+      <p:sp>
+        <p:nvSpPr>
+          <p:cNvPr id="36" name="Shape 36"/>
+          <p:cNvSpPr txBox="1">
+            <a:spLocks noGrp="1"/>
+          </p:cNvSpPr>
+          <p:nvPr>
+            <p:ph type="title"/>
+          </p:nvPr>
+        </p:nvSpPr>
+        <p:spPr>
+          <a:xfrm>
+            <a:off x="2361450" y="131951"/>
+            <a:ext cx="8136900" cy="498599"/>
+          </a:xfrm>
+          <a:prstGeom prst="rect">
+            <a:avLst/>
+          </a:prstGeom>
+        </p:spPr>
+        <p:txBody>
+          <a:bodyPr lIns="91425" tIns="91425" rIns="91425" bIns="91425" anchor="b" anchorCtr="0">
+            <a:noAutofit/>
+          </a:bodyPr>
+          <a:lstStyle/>
+          <a:p>
+            <a:r>
+              <a:rPr lang="en-GB" sz="3000" dirty="0">
+                <a:solidFill>
+                  <a:srgbClr val="003366"/>
+                </a:solidFill>
+              </a:rPr>
+              <a:t>Validation cost function</a:t>
+            </a:r>
+          </a:p>
+        </p:txBody>
+      </p:sp>
+      <p:pic>
+        <p:nvPicPr>
+          <p:cNvPr id="38" name="Shape 38"/>
+          <p:cNvPicPr preferRelativeResize="0"/>
+          <p:nvPr/>
+        </p:nvPicPr>
+        <p:blipFill>
+          <a:blip r:embed="rId5">
+            <a:alphaModFix/>
+          </a:blip>
+          <a:stretch>
+            <a:fillRect/>
+          </a:stretch>
+        </p:blipFill>
+        <p:spPr>
+          <a:xfrm>
+            <a:off x="1606450" y="65950"/>
+            <a:ext cx="464900" cy="498650"/>
+          </a:xfrm>
+          <a:prstGeom prst="rect">
+            <a:avLst/>
+          </a:prstGeom>
+          <a:noFill/>
+          <a:ln>
+            <a:noFill/>
+          </a:ln>
+        </p:spPr>
+      </p:pic>
+      <p:pic>
+        <p:nvPicPr>
+          <p:cNvPr id="39" name="Shape 39"/>
+          <p:cNvPicPr preferRelativeResize="0"/>
+          <p:nvPr/>
+        </p:nvPicPr>
+        <p:blipFill>
+          <a:blip r:embed="rId6">
+            <a:alphaModFix/>
+          </a:blip>
+          <a:stretch>
+            <a:fillRect/>
+          </a:stretch>
+        </p:blipFill>
+        <p:spPr>
+          <a:xfrm>
+            <a:off x="1524000" y="630540"/>
+            <a:ext cx="9143998" cy="97471"/>
+          </a:xfrm>
+          <a:prstGeom prst="rect">
+            <a:avLst/>
+          </a:prstGeom>
+          <a:noFill/>
+          <a:ln>
+            <a:noFill/>
+          </a:ln>
+        </p:spPr>
+      </p:pic>
+      <p:cxnSp>
+        <p:nvCxnSpPr>
+          <p:cNvPr id="40" name="Shape 40"/>
+          <p:cNvCxnSpPr/>
+          <p:nvPr/>
+        </p:nvCxnSpPr>
+        <p:spPr>
+          <a:xfrm rot="10800000">
+            <a:off x="2215550" y="126"/>
+            <a:ext cx="0" cy="630299"/>
+          </a:xfrm>
+          <a:prstGeom prst="straightConnector1">
+            <a:avLst/>
+          </a:prstGeom>
+          <a:noFill/>
+          <a:ln w="9525" cap="flat" cmpd="sng">
+            <a:solidFill>
+              <a:srgbClr val="003366"/>
+            </a:solidFill>
+            <a:prstDash val="solid"/>
+            <a:round/>
+            <a:headEnd type="none" w="lg" len="lg"/>
+            <a:tailEnd type="none" w="lg" len="lg"/>
+          </a:ln>
+        </p:spPr>
+      </p:cxnSp>
+      <p:sp>
+        <p:nvSpPr>
+          <p:cNvPr id="41" name="Shape 41"/>
+          <p:cNvSpPr txBox="1"/>
+          <p:nvPr/>
+        </p:nvSpPr>
+        <p:spPr>
+          <a:xfrm>
+            <a:off x="8307700" y="6531001"/>
+            <a:ext cx="2599200" cy="363899"/>
+          </a:xfrm>
+          <a:prstGeom prst="rect">
+            <a:avLst/>
+          </a:prstGeom>
+          <a:noFill/>
+          <a:ln>
+            <a:noFill/>
+          </a:ln>
+        </p:spPr>
+        <p:txBody>
+          <a:bodyPr lIns="91425" tIns="91425" rIns="91425" bIns="91425" anchor="t" anchorCtr="0">
+            <a:noAutofit/>
+          </a:bodyPr>
+          <a:lstStyle/>
+          <a:p>
+            <a:r>
+              <a:rPr lang="en-GB" sz="1200" b="1" dirty="0">
+                <a:solidFill>
+                  <a:srgbClr val="FFFFFF"/>
+                </a:solidFill>
+              </a:rPr>
+              <a:t>POLITECNICO DI MILANO</a:t>
+            </a:r>
+          </a:p>
+        </p:txBody>
+      </p:sp>
+      <p:pic>
+        <p:nvPicPr>
+          <p:cNvPr id="42" name="Shape 42"/>
+          <p:cNvPicPr preferRelativeResize="0"/>
+          <p:nvPr/>
+        </p:nvPicPr>
+        <p:blipFill>
+          <a:blip r:embed="rId7">
+            <a:alphaModFix/>
+          </a:blip>
+          <a:stretch>
+            <a:fillRect/>
+          </a:stretch>
+        </p:blipFill>
+        <p:spPr>
+          <a:xfrm>
+            <a:off x="1524000" y="6571226"/>
+            <a:ext cx="9144000" cy="286775"/>
+          </a:xfrm>
+          <a:prstGeom prst="rect">
+            <a:avLst/>
+          </a:prstGeom>
+          <a:noFill/>
+          <a:ln>
+            <a:noFill/>
+          </a:ln>
+        </p:spPr>
+      </p:pic>
+      <p:sp>
+        <p:nvSpPr>
+          <p:cNvPr id="43" name="Shape 43"/>
+          <p:cNvSpPr txBox="1">
+            <a:spLocks noGrp="1"/>
+          </p:cNvSpPr>
+          <p:nvPr>
+            <p:ph type="ctrTitle" idx="4294967295"/>
+          </p:nvPr>
+        </p:nvSpPr>
+        <p:spPr>
+          <a:xfrm>
+            <a:off x="3575453" y="6500850"/>
+            <a:ext cx="3238799" cy="424199"/>
+          </a:xfrm>
+          <a:prstGeom prst="rect">
+            <a:avLst/>
+          </a:prstGeom>
+        </p:spPr>
+        <p:txBody>
+          <a:bodyPr lIns="91425" tIns="91425" rIns="91425" bIns="91425" anchor="ctr" anchorCtr="0">
+            <a:noAutofit/>
+          </a:bodyPr>
+          <a:lstStyle/>
+          <a:p>
+            <a:pPr indent="457200">
+              <a:lnSpc>
+                <a:spcPct val="115000"/>
+              </a:lnSpc>
+            </a:pPr>
+            <a:r>
+              <a:rPr lang="en-GB" sz="1200" b="1" dirty="0">
+                <a:solidFill>
+                  <a:srgbClr val="003366"/>
+                </a:solidFill>
+              </a:rPr>
+              <a:t>Control of linear vibrations</a:t>
+            </a:r>
+            <a:endParaRPr lang="en-GB" sz="1300" b="1" dirty="0">
+              <a:solidFill>
+                <a:srgbClr val="003366"/>
+              </a:solidFill>
+            </a:endParaRPr>
+          </a:p>
+        </p:txBody>
+      </p:sp>
+      <p:graphicFrame>
+        <p:nvGraphicFramePr>
+          <p:cNvPr id="34" name="Oggetto 33"/>
+          <p:cNvGraphicFramePr>
+            <a:graphicFrameLocks noChangeAspect="1"/>
+          </p:cNvGraphicFramePr>
+          <p:nvPr>
+            <p:extLst>
+              <p:ext uri="{D42A27DB-BD31-4B8C-83A1-F6EECF244321}">
+                <p14:modId xmlns:p14="http://schemas.microsoft.com/office/powerpoint/2010/main" val="90763860"/>
+              </p:ext>
+            </p:extLst>
+          </p:nvPr>
+        </p:nvGraphicFramePr>
+        <p:xfrm>
+          <a:off x="6523119" y="3256208"/>
+          <a:ext cx="2628900" cy="638175"/>
+        </p:xfrm>
+        <a:graphic>
+          <a:graphicData uri="http://schemas.openxmlformats.org/presentationml/2006/ole">
+            <mc:AlternateContent xmlns:mc="http://schemas.openxmlformats.org/markup-compatibility/2006">
+              <mc:Choice xmlns:v="urn:schemas-microsoft-com:vml" Requires="v">
+                <p:oleObj spid="_x0000_s14387" name="Equazione" r:id="rId8" imgW="1714320" imgH="419040" progId="Equation.3">
+                  <p:embed/>
+                </p:oleObj>
+              </mc:Choice>
+              <mc:Fallback>
+                <p:oleObj name="Equazione" r:id="rId8" imgW="1714320" imgH="419040" progId="Equation.3">
+                  <p:embed/>
+                  <p:pic>
+                    <p:nvPicPr>
+                      <p:cNvPr id="32" name="Oggetto 31"/>
+                      <p:cNvPicPr>
+                        <a:picLocks noChangeAspect="1" noChangeArrowheads="1"/>
+                      </p:cNvPicPr>
+                      <p:nvPr/>
+                    </p:nvPicPr>
+                    <p:blipFill>
+                      <a:blip r:embed="rId9"/>
+                      <a:srcRect/>
+                      <a:stretch>
+                        <a:fillRect/>
+                      </a:stretch>
+                    </p:blipFill>
+                    <p:spPr bwMode="auto">
+                      <a:xfrm>
+                        <a:off x="6523119" y="3256208"/>
+                        <a:ext cx="2628900" cy="638175"/>
+                      </a:xfrm>
+                      <a:prstGeom prst="rect">
+                        <a:avLst/>
+                      </a:prstGeom>
+                      <a:noFill/>
+                    </p:spPr>
+                  </p:pic>
+                </p:oleObj>
+              </mc:Fallback>
+            </mc:AlternateContent>
+          </a:graphicData>
+        </a:graphic>
+      </p:graphicFrame>
+      <p:grpSp>
+        <p:nvGrpSpPr>
+          <p:cNvPr id="45" name="Gruppo 44"/>
+          <p:cNvGrpSpPr/>
+          <p:nvPr/>
+        </p:nvGrpSpPr>
+        <p:grpSpPr>
+          <a:xfrm>
+            <a:off x="4386152" y="1674759"/>
+            <a:ext cx="1865019" cy="478272"/>
+            <a:chOff x="2798273" y="1113053"/>
+            <a:chExt cx="8171907" cy="478272"/>
+          </a:xfrm>
+        </p:grpSpPr>
+        <p:sp>
+          <p:nvSpPr>
+            <p:cNvPr id="47" name="Rettangolo arrotondato 46"/>
+            <p:cNvSpPr/>
+            <p:nvPr/>
+          </p:nvSpPr>
+          <p:spPr>
+            <a:xfrm>
+              <a:off x="2798273" y="1113053"/>
+              <a:ext cx="8171907" cy="478272"/>
+            </a:xfrm>
+            <a:prstGeom prst="roundRect">
+              <a:avLst/>
+            </a:prstGeom>
+            <a:solidFill>
+              <a:schemeClr val="bg2"/>
+            </a:solidFill>
+          </p:spPr>
+          <p:style>
+            <a:lnRef idx="2">
+              <a:schemeClr val="accent1">
+                <a:shade val="50000"/>
+              </a:schemeClr>
+            </a:lnRef>
+            <a:fillRef idx="1">
+              <a:schemeClr val="accent1"/>
+            </a:fillRef>
+            <a:effectRef idx="0">
+              <a:schemeClr val="accent1"/>
+            </a:effectRef>
+            <a:fontRef idx="minor">
+              <a:schemeClr val="lt1"/>
+            </a:fontRef>
+          </p:style>
+          <p:txBody>
+            <a:bodyPr rtlCol="0" anchor="ctr"/>
+            <a:lstStyle/>
+            <a:p>
+              <a:pPr algn="ctr"/>
+              <a:endParaRPr lang="en-GB" dirty="0"/>
+            </a:p>
+          </p:txBody>
+        </p:sp>
+        <p:sp>
+          <p:nvSpPr>
+            <p:cNvPr id="49" name="Rettangolo 48"/>
+            <p:cNvSpPr/>
+            <p:nvPr/>
+          </p:nvSpPr>
+          <p:spPr>
+            <a:xfrm>
+              <a:off x="2904331" y="1165276"/>
+              <a:ext cx="8065849" cy="369332"/>
+            </a:xfrm>
+            <a:prstGeom prst="rect">
+              <a:avLst/>
+            </a:prstGeom>
+          </p:spPr>
+          <p:txBody>
+            <a:bodyPr wrap="square">
+              <a:spAutoFit/>
+            </a:bodyPr>
+            <a:lstStyle/>
+            <a:p>
+              <a:r>
+                <a:rPr lang="en-GB" dirty="0">
+                  <a:solidFill>
+                    <a:schemeClr val="accent2"/>
+                  </a:solidFill>
+                </a:rPr>
+                <a:t>Simulated output</a:t>
+              </a:r>
+            </a:p>
+          </p:txBody>
+        </p:sp>
+      </p:grpSp>
+      <p:grpSp>
+        <p:nvGrpSpPr>
+          <p:cNvPr id="65" name="Gruppo 64"/>
+          <p:cNvGrpSpPr/>
+          <p:nvPr/>
+        </p:nvGrpSpPr>
+        <p:grpSpPr>
+          <a:xfrm>
+            <a:off x="4860882" y="3249710"/>
+            <a:ext cx="1298850" cy="478272"/>
+            <a:chOff x="2798273" y="1113053"/>
+            <a:chExt cx="8171907" cy="478272"/>
+          </a:xfrm>
+        </p:grpSpPr>
+        <p:sp>
+          <p:nvSpPr>
+            <p:cNvPr id="66" name="Rettangolo arrotondato 65"/>
+            <p:cNvSpPr/>
+            <p:nvPr/>
+          </p:nvSpPr>
+          <p:spPr>
+            <a:xfrm>
+              <a:off x="2798273" y="1113053"/>
+              <a:ext cx="8171907" cy="478272"/>
+            </a:xfrm>
+            <a:prstGeom prst="roundRect">
+              <a:avLst/>
+            </a:prstGeom>
+            <a:solidFill>
+              <a:schemeClr val="bg2"/>
+            </a:solidFill>
+          </p:spPr>
+          <p:style>
+            <a:lnRef idx="2">
+              <a:schemeClr val="accent1">
+                <a:shade val="50000"/>
+              </a:schemeClr>
+            </a:lnRef>
+            <a:fillRef idx="1">
+              <a:schemeClr val="accent1"/>
+            </a:fillRef>
+            <a:effectRef idx="0">
+              <a:schemeClr val="accent1"/>
+            </a:effectRef>
+            <a:fontRef idx="minor">
+              <a:schemeClr val="lt1"/>
+            </a:fontRef>
+          </p:style>
+          <p:txBody>
+            <a:bodyPr rtlCol="0" anchor="ctr"/>
+            <a:lstStyle/>
+            <a:p>
+              <a:pPr algn="ctr"/>
+              <a:endParaRPr lang="en-GB" dirty="0"/>
+            </a:p>
+          </p:txBody>
+        </p:sp>
+        <p:sp>
+          <p:nvSpPr>
+            <p:cNvPr id="67" name="Rettangolo 66"/>
+            <p:cNvSpPr/>
+            <p:nvPr/>
+          </p:nvSpPr>
+          <p:spPr>
+            <a:xfrm>
+              <a:off x="2904331" y="1165276"/>
+              <a:ext cx="8065849" cy="369332"/>
+            </a:xfrm>
+            <a:prstGeom prst="rect">
+              <a:avLst/>
+            </a:prstGeom>
+          </p:spPr>
+          <p:txBody>
+            <a:bodyPr wrap="square">
+              <a:spAutoFit/>
+            </a:bodyPr>
+            <a:lstStyle/>
+            <a:p>
+              <a:r>
+                <a:rPr lang="en-GB" dirty="0">
+                  <a:solidFill>
+                    <a:schemeClr val="accent1">
+                      <a:lumMod val="75000"/>
+                    </a:schemeClr>
+                  </a:solidFill>
+                </a:rPr>
+                <a:t>Real output</a:t>
+              </a:r>
+            </a:p>
+          </p:txBody>
+        </p:sp>
+      </p:grpSp>
+      <p:cxnSp>
+        <p:nvCxnSpPr>
+          <p:cNvPr id="11" name="Connettore 2 10"/>
+          <p:cNvCxnSpPr/>
+          <p:nvPr/>
+        </p:nvCxnSpPr>
+        <p:spPr>
+          <a:xfrm>
+            <a:off x="5330764" y="2153031"/>
+            <a:ext cx="471520" cy="440540"/>
+          </a:xfrm>
+          <a:prstGeom prst="straightConnector1">
+            <a:avLst/>
+          </a:prstGeom>
+          <a:ln>
+            <a:solidFill>
+              <a:schemeClr val="accent2"/>
+            </a:solidFill>
+            <a:tailEnd type="triangle"/>
+          </a:ln>
+        </p:spPr>
+        <p:style>
+          <a:lnRef idx="1">
+            <a:schemeClr val="accent1"/>
+          </a:lnRef>
+          <a:fillRef idx="0">
+            <a:schemeClr val="accent1"/>
+          </a:fillRef>
+          <a:effectRef idx="0">
+            <a:schemeClr val="accent1"/>
+          </a:effectRef>
+          <a:fontRef idx="minor">
+            <a:schemeClr val="tx1"/>
+          </a:fontRef>
+        </p:style>
+      </p:cxnSp>
+      <p:cxnSp>
+        <p:nvCxnSpPr>
+          <p:cNvPr id="15" name="Connettore 2 14"/>
+          <p:cNvCxnSpPr/>
+          <p:nvPr/>
+        </p:nvCxnSpPr>
+        <p:spPr>
+          <a:xfrm flipH="1" flipV="1">
+            <a:off x="5394960" y="2714332"/>
+            <a:ext cx="115348" cy="535378"/>
+          </a:xfrm>
+          <a:prstGeom prst="straightConnector1">
+            <a:avLst/>
+          </a:prstGeom>
+          <a:ln>
+            <a:tailEnd type="triangle"/>
+          </a:ln>
+        </p:spPr>
+        <p:style>
+          <a:lnRef idx="1">
+            <a:schemeClr val="accent1"/>
+          </a:lnRef>
+          <a:fillRef idx="0">
+            <a:schemeClr val="accent1"/>
+          </a:fillRef>
+          <a:effectRef idx="0">
+            <a:schemeClr val="accent1"/>
+          </a:effectRef>
+          <a:fontRef idx="minor">
+            <a:schemeClr val="tx1"/>
+          </a:fontRef>
+        </p:style>
+      </p:cxnSp>
+      <p:sp>
+        <p:nvSpPr>
+          <p:cNvPr id="18" name="CasellaDiTesto 17"/>
+          <p:cNvSpPr txBox="1"/>
+          <p:nvPr/>
+        </p:nvSpPr>
+        <p:spPr>
+          <a:xfrm>
+            <a:off x="6508865" y="1214247"/>
+            <a:ext cx="3050643" cy="369332"/>
+          </a:xfrm>
+          <a:prstGeom prst="rect">
+            <a:avLst/>
+          </a:prstGeom>
+          <a:noFill/>
+        </p:spPr>
+        <p:txBody>
+          <a:bodyPr wrap="none" rtlCol="0">
+            <a:spAutoFit/>
+          </a:bodyPr>
+          <a:lstStyle/>
+          <a:p>
+            <a:r>
+              <a:rPr lang="en-GB" dirty="0"/>
+              <a:t>Distance expressed by </a:t>
+            </a:r>
+            <a:r>
+              <a:rPr lang="en-GB" i="1" dirty="0"/>
+              <a:t>L</a:t>
+            </a:r>
+            <a:r>
+              <a:rPr lang="en-GB" baseline="-25000" dirty="0"/>
+              <a:t>2</a:t>
+            </a:r>
+            <a:r>
+              <a:rPr lang="en-GB" dirty="0"/>
+              <a:t> norm</a:t>
+            </a:r>
+          </a:p>
+        </p:txBody>
+      </p:sp>
+      <p:graphicFrame>
+        <p:nvGraphicFramePr>
+          <p:cNvPr id="68" name="Oggetto 67"/>
+          <p:cNvGraphicFramePr>
+            <a:graphicFrameLocks noChangeAspect="1"/>
+          </p:cNvGraphicFramePr>
+          <p:nvPr>
+            <p:extLst>
+              <p:ext uri="{D42A27DB-BD31-4B8C-83A1-F6EECF244321}">
+                <p14:modId xmlns:p14="http://schemas.microsoft.com/office/powerpoint/2010/main" val="1706847993"/>
+              </p:ext>
+            </p:extLst>
+          </p:nvPr>
+        </p:nvGraphicFramePr>
+        <p:xfrm>
+          <a:off x="6524838" y="1649766"/>
+          <a:ext cx="3973512" cy="503238"/>
+        </p:xfrm>
+        <a:graphic>
+          <a:graphicData uri="http://schemas.openxmlformats.org/presentationml/2006/ole">
+            <mc:AlternateContent xmlns:mc="http://schemas.openxmlformats.org/markup-compatibility/2006">
+              <mc:Choice xmlns:v="urn:schemas-microsoft-com:vml" Requires="v">
+                <p:oleObj spid="_x0000_s14388" name="Equazione" r:id="rId10" imgW="2590560" imgH="330120" progId="Equation.3">
+                  <p:embed/>
+                </p:oleObj>
+              </mc:Choice>
+              <mc:Fallback>
+                <p:oleObj name="Equazione" r:id="rId10" imgW="2590560" imgH="330120" progId="Equation.3">
+                  <p:embed/>
+                  <p:pic>
+                    <p:nvPicPr>
+                      <p:cNvPr id="34" name="Oggetto 33"/>
+                      <p:cNvPicPr>
+                        <a:picLocks noChangeAspect="1" noChangeArrowheads="1"/>
+                      </p:cNvPicPr>
+                      <p:nvPr/>
+                    </p:nvPicPr>
+                    <p:blipFill>
+                      <a:blip r:embed="rId11"/>
+                      <a:srcRect/>
+                      <a:stretch>
+                        <a:fillRect/>
+                      </a:stretch>
+                    </p:blipFill>
+                    <p:spPr bwMode="auto">
+                      <a:xfrm>
+                        <a:off x="6524838" y="1649766"/>
+                        <a:ext cx="3973512" cy="503238"/>
+                      </a:xfrm>
+                      <a:prstGeom prst="rect">
+                        <a:avLst/>
+                      </a:prstGeom>
+                      <a:noFill/>
+                    </p:spPr>
+                  </p:pic>
+                </p:oleObj>
+              </mc:Fallback>
+            </mc:AlternateContent>
+          </a:graphicData>
+        </a:graphic>
+      </p:graphicFrame>
+      <p:sp>
+        <p:nvSpPr>
+          <p:cNvPr id="19" name="CasellaDiTesto 18"/>
+          <p:cNvSpPr txBox="1"/>
+          <p:nvPr/>
+        </p:nvSpPr>
+        <p:spPr>
+          <a:xfrm>
+            <a:off x="6513169" y="2254447"/>
+            <a:ext cx="4451988" cy="923330"/>
+          </a:xfrm>
+          <a:prstGeom prst="rect">
+            <a:avLst/>
+          </a:prstGeom>
+          <a:noFill/>
+        </p:spPr>
+        <p:txBody>
+          <a:bodyPr wrap="none" rtlCol="0">
+            <a:spAutoFit/>
+          </a:bodyPr>
+          <a:lstStyle/>
+          <a:p>
+            <a:r>
+              <a:rPr lang="en-GB" dirty="0"/>
+              <a:t>represents the energy of the difference signal</a:t>
+            </a:r>
+          </a:p>
+          <a:p>
+            <a:endParaRPr lang="en-GB" dirty="0"/>
+          </a:p>
+          <a:p>
+            <a:r>
+              <a:rPr lang="en-GB" dirty="0"/>
+              <a:t>A more practical index is:</a:t>
+            </a:r>
+          </a:p>
+        </p:txBody>
+      </p:sp>
+      <p:sp>
+        <p:nvSpPr>
+          <p:cNvPr id="20" name="CasellaDiTesto 19"/>
+          <p:cNvSpPr txBox="1"/>
+          <p:nvPr/>
+        </p:nvSpPr>
+        <p:spPr>
+          <a:xfrm>
+            <a:off x="2215550" y="4702781"/>
+            <a:ext cx="5057317" cy="369332"/>
+          </a:xfrm>
+          <a:prstGeom prst="rect">
+            <a:avLst/>
+          </a:prstGeom>
+          <a:noFill/>
+        </p:spPr>
+        <p:txBody>
+          <a:bodyPr wrap="square" rtlCol="0">
+            <a:spAutoFit/>
+          </a:bodyPr>
+          <a:lstStyle/>
+          <a:p>
+            <a:r>
+              <a:rPr lang="en-GB" dirty="0"/>
+              <a:t>In this way </a:t>
+            </a:r>
+            <a:r>
+              <a:rPr lang="en-GB" i="1" dirty="0"/>
+              <a:t>d</a:t>
+            </a:r>
+            <a:r>
+              <a:rPr lang="en-GB" dirty="0"/>
+              <a:t>=1 represents a perfect fit</a:t>
+            </a:r>
+          </a:p>
+        </p:txBody>
+      </p:sp>
+    </p:spTree>
+    <p:extLst>
+      <p:ext uri="{BB962C8B-B14F-4D97-AF65-F5344CB8AC3E}">
+        <p14:creationId xmlns:p14="http://schemas.microsoft.com/office/powerpoint/2010/main" val="927456250"/>
+      </p:ext>
+    </p:extLst>
+  </p:cSld>
+  <p:clrMapOvr>
+    <a:masterClrMapping/>
+  </p:clrMapOvr>
+  <p:transition spd="slow">
+    <p:cut/>
+  </p:transition>
+</p:sld>
+</file>
+
+<file path=ppt/slides/slide11.xml><?xml version="1.0" encoding="utf-8"?>
+<p:sld xmlns:a="http://schemas.openxmlformats.org/drawingml/2006/main" xmlns:r="http://schemas.openxmlformats.org/officeDocument/2006/relationships" xmlns:p="http://schemas.openxmlformats.org/presentationml/2006/main">
+  <p:cSld>
+    <p:spTree>
+      <p:nvGrpSpPr>
+        <p:cNvPr id="1" name="Shape 35"/>
+        <p:cNvGrpSpPr/>
+        <p:nvPr/>
+      </p:nvGrpSpPr>
+      <p:grpSpPr>
+        <a:xfrm>
+          <a:off x="0" y="0"/>
+          <a:ext cx="0" cy="0"/>
+          <a:chOff x="0" y="0"/>
+          <a:chExt cx="0" cy="0"/>
+        </a:xfrm>
+      </p:grpSpPr>
       <p:sp>
         <p:nvSpPr>
           <p:cNvPr id="36" name="Shape 36"/>
@@ -6603,7 +7755,7 @@
           <a:graphicData uri="http://schemas.openxmlformats.org/presentationml/2006/ole">
             <mc:AlternateContent xmlns:mc="http://schemas.openxmlformats.org/markup-compatibility/2006">
               <mc:Choice xmlns:v="urn:schemas-microsoft-com:vml" Requires="v">
-                <p:oleObj spid="_x0000_s13316" name="Equazione" r:id="rId7" imgW="876240" imgH="253800" progId="Equation.3">
+                <p:oleObj spid="_x0000_s13335" name="Equazione" r:id="rId7" imgW="876240" imgH="253800" progId="Equation.3">
                   <p:embed/>
                 </p:oleObj>
               </mc:Choice>
@@ -6687,7 +7839,753 @@
 </p:sld>
 </file>
 
-<file path=ppt/slides/slide11.xml><?xml version="1.0" encoding="utf-8"?>
+<file path=ppt/slides/slide12.xml><?xml version="1.0" encoding="utf-8"?>
+<p:sld xmlns:a="http://schemas.openxmlformats.org/drawingml/2006/main" xmlns:r="http://schemas.openxmlformats.org/officeDocument/2006/relationships" xmlns:p="http://schemas.openxmlformats.org/presentationml/2006/main">
+  <p:cSld>
+    <p:spTree>
+      <p:nvGrpSpPr>
+        <p:cNvPr id="1" name="Shape 35"/>
+        <p:cNvGrpSpPr/>
+        <p:nvPr/>
+      </p:nvGrpSpPr>
+      <p:grpSpPr>
+        <a:xfrm>
+          <a:off x="0" y="0"/>
+          <a:ext cx="0" cy="0"/>
+          <a:chOff x="0" y="0"/>
+          <a:chExt cx="0" cy="0"/>
+        </a:xfrm>
+      </p:grpSpPr>
+      <p:pic>
+        <p:nvPicPr>
+          <p:cNvPr id="3" name="Immagine 2"/>
+          <p:cNvPicPr>
+            <a:picLocks noChangeAspect="1"/>
+          </p:cNvPicPr>
+          <p:nvPr/>
+        </p:nvPicPr>
+        <p:blipFill>
+          <a:blip r:embed="rId4">
+            <a:extLst>
+              <a:ext uri="{28A0092B-C50C-407E-A947-70E740481C1C}">
+                <a14:useLocalDpi xmlns:a14="http://schemas.microsoft.com/office/drawing/2010/main" val="0"/>
+              </a:ext>
+            </a:extLst>
+          </a:blip>
+          <a:stretch>
+            <a:fillRect/>
+          </a:stretch>
+        </p:blipFill>
+        <p:spPr>
+          <a:xfrm>
+            <a:off x="1524000" y="1063189"/>
+            <a:ext cx="6400800" cy="4800600"/>
+          </a:xfrm>
+          <a:prstGeom prst="rect">
+            <a:avLst/>
+          </a:prstGeom>
+        </p:spPr>
+      </p:pic>
+      <p:sp>
+        <p:nvSpPr>
+          <p:cNvPr id="36" name="Shape 36"/>
+          <p:cNvSpPr txBox="1">
+            <a:spLocks noGrp="1"/>
+          </p:cNvSpPr>
+          <p:nvPr>
+            <p:ph type="title"/>
+          </p:nvPr>
+        </p:nvSpPr>
+        <p:spPr>
+          <a:xfrm>
+            <a:off x="2361450" y="131951"/>
+            <a:ext cx="8136900" cy="498599"/>
+          </a:xfrm>
+          <a:prstGeom prst="rect">
+            <a:avLst/>
+          </a:prstGeom>
+        </p:spPr>
+        <p:txBody>
+          <a:bodyPr lIns="91425" tIns="91425" rIns="91425" bIns="91425" anchor="b" anchorCtr="0">
+            <a:noAutofit/>
+          </a:bodyPr>
+          <a:lstStyle/>
+          <a:p>
+            <a:r>
+              <a:rPr lang="en-US" sz="3000" dirty="0">
+                <a:solidFill>
+                  <a:srgbClr val="003366"/>
+                </a:solidFill>
+              </a:rPr>
+              <a:t>Motor identification: resistance</a:t>
+            </a:r>
+          </a:p>
+        </p:txBody>
+      </p:sp>
+      <p:pic>
+        <p:nvPicPr>
+          <p:cNvPr id="38" name="Shape 38"/>
+          <p:cNvPicPr preferRelativeResize="0"/>
+          <p:nvPr/>
+        </p:nvPicPr>
+        <p:blipFill>
+          <a:blip r:embed="rId5">
+            <a:alphaModFix/>
+          </a:blip>
+          <a:stretch>
+            <a:fillRect/>
+          </a:stretch>
+        </p:blipFill>
+        <p:spPr>
+          <a:xfrm>
+            <a:off x="1606450" y="65950"/>
+            <a:ext cx="464900" cy="498650"/>
+          </a:xfrm>
+          <a:prstGeom prst="rect">
+            <a:avLst/>
+          </a:prstGeom>
+          <a:noFill/>
+          <a:ln>
+            <a:noFill/>
+          </a:ln>
+        </p:spPr>
+      </p:pic>
+      <p:pic>
+        <p:nvPicPr>
+          <p:cNvPr id="39" name="Shape 39"/>
+          <p:cNvPicPr preferRelativeResize="0"/>
+          <p:nvPr/>
+        </p:nvPicPr>
+        <p:blipFill>
+          <a:blip r:embed="rId6">
+            <a:alphaModFix/>
+          </a:blip>
+          <a:stretch>
+            <a:fillRect/>
+          </a:stretch>
+        </p:blipFill>
+        <p:spPr>
+          <a:xfrm>
+            <a:off x="1524000" y="630540"/>
+            <a:ext cx="9143998" cy="97471"/>
+          </a:xfrm>
+          <a:prstGeom prst="rect">
+            <a:avLst/>
+          </a:prstGeom>
+          <a:noFill/>
+          <a:ln>
+            <a:noFill/>
+          </a:ln>
+        </p:spPr>
+      </p:pic>
+      <p:cxnSp>
+        <p:nvCxnSpPr>
+          <p:cNvPr id="40" name="Shape 40"/>
+          <p:cNvCxnSpPr/>
+          <p:nvPr/>
+        </p:nvCxnSpPr>
+        <p:spPr>
+          <a:xfrm rot="10800000">
+            <a:off x="2215550" y="126"/>
+            <a:ext cx="0" cy="630299"/>
+          </a:xfrm>
+          <a:prstGeom prst="straightConnector1">
+            <a:avLst/>
+          </a:prstGeom>
+          <a:noFill/>
+          <a:ln w="9525" cap="flat" cmpd="sng">
+            <a:solidFill>
+              <a:srgbClr val="003366"/>
+            </a:solidFill>
+            <a:prstDash val="solid"/>
+            <a:round/>
+            <a:headEnd type="none" w="lg" len="lg"/>
+            <a:tailEnd type="none" w="lg" len="lg"/>
+          </a:ln>
+        </p:spPr>
+      </p:cxnSp>
+      <p:sp>
+        <p:nvSpPr>
+          <p:cNvPr id="41" name="Shape 41"/>
+          <p:cNvSpPr txBox="1"/>
+          <p:nvPr/>
+        </p:nvSpPr>
+        <p:spPr>
+          <a:xfrm>
+            <a:off x="8307700" y="6531001"/>
+            <a:ext cx="2599200" cy="363899"/>
+          </a:xfrm>
+          <a:prstGeom prst="rect">
+            <a:avLst/>
+          </a:prstGeom>
+          <a:noFill/>
+          <a:ln>
+            <a:noFill/>
+          </a:ln>
+        </p:spPr>
+        <p:txBody>
+          <a:bodyPr lIns="91425" tIns="91425" rIns="91425" bIns="91425" anchor="t" anchorCtr="0">
+            <a:noAutofit/>
+          </a:bodyPr>
+          <a:lstStyle/>
+          <a:p>
+            <a:r>
+              <a:rPr lang="en-US" sz="1200" b="1" dirty="0">
+                <a:solidFill>
+                  <a:srgbClr val="FFFFFF"/>
+                </a:solidFill>
+              </a:rPr>
+              <a:t>POLITECNICO DI MILANO</a:t>
+            </a:r>
+          </a:p>
+        </p:txBody>
+      </p:sp>
+      <p:pic>
+        <p:nvPicPr>
+          <p:cNvPr id="42" name="Shape 42"/>
+          <p:cNvPicPr preferRelativeResize="0"/>
+          <p:nvPr/>
+        </p:nvPicPr>
+        <p:blipFill>
+          <a:blip r:embed="rId7">
+            <a:alphaModFix/>
+          </a:blip>
+          <a:stretch>
+            <a:fillRect/>
+          </a:stretch>
+        </p:blipFill>
+        <p:spPr>
+          <a:xfrm>
+            <a:off x="1524000" y="6571226"/>
+            <a:ext cx="9144000" cy="286775"/>
+          </a:xfrm>
+          <a:prstGeom prst="rect">
+            <a:avLst/>
+          </a:prstGeom>
+          <a:noFill/>
+          <a:ln>
+            <a:noFill/>
+          </a:ln>
+        </p:spPr>
+      </p:pic>
+      <p:sp>
+        <p:nvSpPr>
+          <p:cNvPr id="43" name="Shape 43"/>
+          <p:cNvSpPr txBox="1">
+            <a:spLocks noGrp="1"/>
+          </p:cNvSpPr>
+          <p:nvPr>
+            <p:ph type="ctrTitle" idx="4294967295"/>
+          </p:nvPr>
+        </p:nvSpPr>
+        <p:spPr>
+          <a:xfrm>
+            <a:off x="3575453" y="6500850"/>
+            <a:ext cx="3238799" cy="424199"/>
+          </a:xfrm>
+          <a:prstGeom prst="rect">
+            <a:avLst/>
+          </a:prstGeom>
+        </p:spPr>
+        <p:txBody>
+          <a:bodyPr lIns="91425" tIns="91425" rIns="91425" bIns="91425" anchor="ctr" anchorCtr="0">
+            <a:noAutofit/>
+          </a:bodyPr>
+          <a:lstStyle/>
+          <a:p>
+            <a:pPr indent="457200">
+              <a:lnSpc>
+                <a:spcPct val="115000"/>
+              </a:lnSpc>
+            </a:pPr>
+            <a:r>
+              <a:rPr lang="en-US" sz="1200" b="1" dirty="0">
+                <a:solidFill>
+                  <a:srgbClr val="003366"/>
+                </a:solidFill>
+              </a:rPr>
+              <a:t>Control of linear vibrations</a:t>
+            </a:r>
+            <a:endParaRPr lang="en-US" sz="1300" b="1" dirty="0">
+              <a:solidFill>
+                <a:srgbClr val="003366"/>
+              </a:solidFill>
+            </a:endParaRPr>
+          </a:p>
+        </p:txBody>
+      </p:sp>
+      <p:graphicFrame>
+        <p:nvGraphicFramePr>
+          <p:cNvPr id="13" name="Oggetto 12"/>
+          <p:cNvGraphicFramePr>
+            <a:graphicFrameLocks noChangeAspect="1"/>
+          </p:cNvGraphicFramePr>
+          <p:nvPr>
+            <p:extLst>
+              <p:ext uri="{D42A27DB-BD31-4B8C-83A1-F6EECF244321}">
+                <p14:modId xmlns:p14="http://schemas.microsoft.com/office/powerpoint/2010/main" val="149716300"/>
+              </p:ext>
+            </p:extLst>
+          </p:nvPr>
+        </p:nvGraphicFramePr>
+        <p:xfrm>
+          <a:off x="4288979" y="867086"/>
+          <a:ext cx="3264190" cy="355171"/>
+        </p:xfrm>
+        <a:graphic>
+          <a:graphicData uri="http://schemas.openxmlformats.org/presentationml/2006/ole">
+            <mc:AlternateContent xmlns:mc="http://schemas.openxmlformats.org/markup-compatibility/2006">
+              <mc:Choice xmlns:v="urn:schemas-microsoft-com:vml" Requires="v">
+                <p:oleObj spid="_x0000_s12421" name="Equazione" r:id="rId8" imgW="1841500" imgH="203200" progId="Equation.3">
+                  <p:embed/>
+                </p:oleObj>
+              </mc:Choice>
+              <mc:Fallback>
+                <p:oleObj name="Equazione" r:id="rId8" imgW="1841500" imgH="203200" progId="Equation.3">
+                  <p:embed/>
+                  <p:pic>
+                    <p:nvPicPr>
+                      <p:cNvPr id="13" name="Oggetto 12"/>
+                      <p:cNvPicPr>
+                        <a:picLocks noChangeAspect="1" noChangeArrowheads="1"/>
+                      </p:cNvPicPr>
+                      <p:nvPr/>
+                    </p:nvPicPr>
+                    <p:blipFill>
+                      <a:blip r:embed="rId9">
+                        <a:extLst>
+                          <a:ext uri="{28A0092B-C50C-407E-A947-70E740481C1C}">
+                            <a14:useLocalDpi xmlns:a14="http://schemas.microsoft.com/office/drawing/2010/main" val="0"/>
+                          </a:ext>
+                        </a:extLst>
+                      </a:blip>
+                      <a:srcRect/>
+                      <a:stretch>
+                        <a:fillRect/>
+                      </a:stretch>
+                    </p:blipFill>
+                    <p:spPr bwMode="auto">
+                      <a:xfrm>
+                        <a:off x="4288979" y="867086"/>
+                        <a:ext cx="3264190" cy="355171"/>
+                      </a:xfrm>
+                      <a:prstGeom prst="rect">
+                        <a:avLst/>
+                      </a:prstGeom>
+                      <a:noFill/>
+                    </p:spPr>
+                  </p:pic>
+                </p:oleObj>
+              </mc:Fallback>
+            </mc:AlternateContent>
+          </a:graphicData>
+        </a:graphic>
+      </p:graphicFrame>
+      <p:sp>
+        <p:nvSpPr>
+          <p:cNvPr id="4" name="CasellaDiTesto 3"/>
+          <p:cNvSpPr txBox="1"/>
+          <p:nvPr/>
+        </p:nvSpPr>
+        <p:spPr>
+          <a:xfrm>
+            <a:off x="2215550" y="852891"/>
+            <a:ext cx="2213426" cy="369332"/>
+          </a:xfrm>
+          <a:prstGeom prst="rect">
+            <a:avLst/>
+          </a:prstGeom>
+          <a:noFill/>
+        </p:spPr>
+        <p:txBody>
+          <a:bodyPr wrap="none" rtlCol="0">
+            <a:spAutoFit/>
+          </a:bodyPr>
+          <a:lstStyle/>
+          <a:p>
+            <a:r>
+              <a:rPr lang="it-IT" dirty="0"/>
+              <a:t>Steady state: </a:t>
+            </a:r>
+            <a:r>
+              <a:rPr lang="it-IT" dirty="0" err="1"/>
+              <a:t>identify</a:t>
+            </a:r>
+            <a:r>
+              <a:rPr lang="it-IT" dirty="0"/>
+              <a:t> </a:t>
+            </a:r>
+          </a:p>
+        </p:txBody>
+      </p:sp>
+      <p:cxnSp>
+        <p:nvCxnSpPr>
+          <p:cNvPr id="9" name="Connettore 2 8"/>
+          <p:cNvCxnSpPr>
+            <a:stCxn id="10" idx="1"/>
+          </p:cNvCxnSpPr>
+          <p:nvPr/>
+        </p:nvCxnSpPr>
+        <p:spPr>
+          <a:xfrm flipH="1">
+            <a:off x="6716684" y="1396538"/>
+            <a:ext cx="1209200" cy="415637"/>
+          </a:xfrm>
+          <a:prstGeom prst="straightConnector1">
+            <a:avLst/>
+          </a:prstGeom>
+          <a:ln>
+            <a:tailEnd type="triangle"/>
+          </a:ln>
+        </p:spPr>
+        <p:style>
+          <a:lnRef idx="1">
+            <a:schemeClr val="accent1"/>
+          </a:lnRef>
+          <a:fillRef idx="0">
+            <a:schemeClr val="accent1"/>
+          </a:fillRef>
+          <a:effectRef idx="0">
+            <a:schemeClr val="accent1"/>
+          </a:effectRef>
+          <a:fontRef idx="minor">
+            <a:schemeClr val="tx1"/>
+          </a:fontRef>
+        </p:style>
+      </p:cxnSp>
+      <p:sp>
+        <p:nvSpPr>
+          <p:cNvPr id="10" name="CasellaDiTesto 9"/>
+          <p:cNvSpPr txBox="1"/>
+          <p:nvPr/>
+        </p:nvSpPr>
+        <p:spPr>
+          <a:xfrm>
+            <a:off x="7925884" y="1211872"/>
+            <a:ext cx="888385" cy="369332"/>
+          </a:xfrm>
+          <a:prstGeom prst="rect">
+            <a:avLst/>
+          </a:prstGeom>
+          <a:noFill/>
+          <a:ln>
+            <a:solidFill>
+              <a:schemeClr val="accent1"/>
+            </a:solidFill>
+          </a:ln>
+        </p:spPr>
+        <p:txBody>
+          <a:bodyPr wrap="none" rtlCol="0">
+            <a:spAutoFit/>
+          </a:bodyPr>
+          <a:lstStyle/>
+          <a:p>
+            <a:r>
+              <a:rPr lang="it-IT" dirty="0"/>
+              <a:t>Voltage</a:t>
+            </a:r>
+          </a:p>
+        </p:txBody>
+      </p:sp>
+      <p:cxnSp>
+        <p:nvCxnSpPr>
+          <p:cNvPr id="37" name="Connettore 2 36"/>
+          <p:cNvCxnSpPr>
+            <a:stCxn id="44" idx="1"/>
+          </p:cNvCxnSpPr>
+          <p:nvPr/>
+        </p:nvCxnSpPr>
+        <p:spPr>
+          <a:xfrm flipH="1">
+            <a:off x="6991004" y="1996841"/>
+            <a:ext cx="961512" cy="567183"/>
+          </a:xfrm>
+          <a:prstGeom prst="straightConnector1">
+            <a:avLst/>
+          </a:prstGeom>
+          <a:ln>
+            <a:solidFill>
+              <a:schemeClr val="accent2"/>
+            </a:solidFill>
+            <a:tailEnd type="triangle"/>
+          </a:ln>
+        </p:spPr>
+        <p:style>
+          <a:lnRef idx="1">
+            <a:schemeClr val="accent1"/>
+          </a:lnRef>
+          <a:fillRef idx="0">
+            <a:schemeClr val="accent1"/>
+          </a:fillRef>
+          <a:effectRef idx="0">
+            <a:schemeClr val="accent1"/>
+          </a:effectRef>
+          <a:fontRef idx="minor">
+            <a:schemeClr val="tx1"/>
+          </a:fontRef>
+        </p:style>
+      </p:cxnSp>
+      <p:sp>
+        <p:nvSpPr>
+          <p:cNvPr id="44" name="CasellaDiTesto 43"/>
+          <p:cNvSpPr txBox="1"/>
+          <p:nvPr/>
+        </p:nvSpPr>
+        <p:spPr>
+          <a:xfrm>
+            <a:off x="7952516" y="1812175"/>
+            <a:ext cx="899285" cy="369332"/>
+          </a:xfrm>
+          <a:prstGeom prst="rect">
+            <a:avLst/>
+          </a:prstGeom>
+          <a:noFill/>
+          <a:ln>
+            <a:solidFill>
+              <a:schemeClr val="accent2"/>
+            </a:solidFill>
+          </a:ln>
+        </p:spPr>
+        <p:txBody>
+          <a:bodyPr wrap="none" rtlCol="0">
+            <a:spAutoFit/>
+          </a:bodyPr>
+          <a:lstStyle/>
+          <a:p>
+            <a:r>
+              <a:rPr lang="it-IT" dirty="0" err="1"/>
+              <a:t>Current</a:t>
+            </a:r>
+            <a:endParaRPr lang="it-IT" dirty="0"/>
+          </a:p>
+        </p:txBody>
+      </p:sp>
+      <p:cxnSp>
+        <p:nvCxnSpPr>
+          <p:cNvPr id="26" name="Connettore diritto 25"/>
+          <p:cNvCxnSpPr/>
+          <p:nvPr/>
+        </p:nvCxnSpPr>
+        <p:spPr>
+          <a:xfrm>
+            <a:off x="3865417" y="1396537"/>
+            <a:ext cx="0" cy="3956859"/>
+          </a:xfrm>
+          <a:prstGeom prst="line">
+            <a:avLst/>
+          </a:prstGeom>
+          <a:ln w="63500">
+            <a:solidFill>
+              <a:schemeClr val="accent5">
+                <a:lumMod val="50000"/>
+              </a:schemeClr>
+            </a:solidFill>
+          </a:ln>
+        </p:spPr>
+        <p:style>
+          <a:lnRef idx="3">
+            <a:schemeClr val="accent6"/>
+          </a:lnRef>
+          <a:fillRef idx="0">
+            <a:schemeClr val="accent6"/>
+          </a:fillRef>
+          <a:effectRef idx="2">
+            <a:schemeClr val="accent6"/>
+          </a:effectRef>
+          <a:fontRef idx="minor">
+            <a:schemeClr val="tx1"/>
+          </a:fontRef>
+        </p:style>
+      </p:cxnSp>
+      <p:grpSp>
+        <p:nvGrpSpPr>
+          <p:cNvPr id="46" name="Gruppo 45"/>
+          <p:cNvGrpSpPr/>
+          <p:nvPr/>
+        </p:nvGrpSpPr>
+        <p:grpSpPr>
+          <a:xfrm>
+            <a:off x="2687544" y="4170504"/>
+            <a:ext cx="1122180" cy="478272"/>
+            <a:chOff x="2798273" y="1113053"/>
+            <a:chExt cx="8919303" cy="478272"/>
+          </a:xfrm>
+        </p:grpSpPr>
+        <p:sp>
+          <p:nvSpPr>
+            <p:cNvPr id="48" name="Rettangolo arrotondato 47"/>
+            <p:cNvSpPr/>
+            <p:nvPr/>
+          </p:nvSpPr>
+          <p:spPr>
+            <a:xfrm>
+              <a:off x="2798273" y="1113053"/>
+              <a:ext cx="8919303" cy="478272"/>
+            </a:xfrm>
+            <a:prstGeom prst="roundRect">
+              <a:avLst/>
+            </a:prstGeom>
+            <a:solidFill>
+              <a:schemeClr val="bg2"/>
+            </a:solidFill>
+          </p:spPr>
+          <p:style>
+            <a:lnRef idx="2">
+              <a:schemeClr val="accent1">
+                <a:shade val="50000"/>
+              </a:schemeClr>
+            </a:lnRef>
+            <a:fillRef idx="1">
+              <a:schemeClr val="accent1"/>
+            </a:fillRef>
+            <a:effectRef idx="0">
+              <a:schemeClr val="accent1"/>
+            </a:effectRef>
+            <a:fontRef idx="minor">
+              <a:schemeClr val="lt1"/>
+            </a:fontRef>
+          </p:style>
+          <p:txBody>
+            <a:bodyPr rtlCol="0" anchor="ctr"/>
+            <a:lstStyle/>
+            <a:p>
+              <a:pPr algn="ctr"/>
+              <a:endParaRPr lang="en-GB" dirty="0"/>
+            </a:p>
+          </p:txBody>
+        </p:sp>
+        <p:sp>
+          <p:nvSpPr>
+            <p:cNvPr id="50" name="Rettangolo 49"/>
+            <p:cNvSpPr/>
+            <p:nvPr/>
+          </p:nvSpPr>
+          <p:spPr>
+            <a:xfrm>
+              <a:off x="2904321" y="1165276"/>
+              <a:ext cx="8813255" cy="369332"/>
+            </a:xfrm>
+            <a:prstGeom prst="rect">
+              <a:avLst/>
+            </a:prstGeom>
+          </p:spPr>
+          <p:txBody>
+            <a:bodyPr wrap="square">
+              <a:spAutoFit/>
+            </a:bodyPr>
+            <a:lstStyle/>
+            <a:p>
+              <a:r>
+                <a:rPr lang="en-GB" dirty="0"/>
+                <a:t>Transient</a:t>
+              </a:r>
+            </a:p>
+          </p:txBody>
+        </p:sp>
+      </p:grpSp>
+      <p:grpSp>
+        <p:nvGrpSpPr>
+          <p:cNvPr id="51" name="Gruppo 50"/>
+          <p:cNvGrpSpPr/>
+          <p:nvPr/>
+        </p:nvGrpSpPr>
+        <p:grpSpPr>
+          <a:xfrm>
+            <a:off x="5057711" y="4168257"/>
+            <a:ext cx="1372189" cy="478272"/>
+            <a:chOff x="2798273" y="1113053"/>
+            <a:chExt cx="8919303" cy="478272"/>
+          </a:xfrm>
+        </p:grpSpPr>
+        <p:sp>
+          <p:nvSpPr>
+            <p:cNvPr id="52" name="Rettangolo arrotondato 51"/>
+            <p:cNvSpPr/>
+            <p:nvPr/>
+          </p:nvSpPr>
+          <p:spPr>
+            <a:xfrm>
+              <a:off x="2798273" y="1113053"/>
+              <a:ext cx="8919303" cy="478272"/>
+            </a:xfrm>
+            <a:prstGeom prst="roundRect">
+              <a:avLst/>
+            </a:prstGeom>
+            <a:solidFill>
+              <a:schemeClr val="bg2"/>
+            </a:solidFill>
+          </p:spPr>
+          <p:style>
+            <a:lnRef idx="2">
+              <a:schemeClr val="accent1">
+                <a:shade val="50000"/>
+              </a:schemeClr>
+            </a:lnRef>
+            <a:fillRef idx="1">
+              <a:schemeClr val="accent1"/>
+            </a:fillRef>
+            <a:effectRef idx="0">
+              <a:schemeClr val="accent1"/>
+            </a:effectRef>
+            <a:fontRef idx="minor">
+              <a:schemeClr val="lt1"/>
+            </a:fontRef>
+          </p:style>
+          <p:txBody>
+            <a:bodyPr rtlCol="0" anchor="ctr"/>
+            <a:lstStyle/>
+            <a:p>
+              <a:pPr algn="ctr"/>
+              <a:endParaRPr lang="en-GB" dirty="0"/>
+            </a:p>
+          </p:txBody>
+        </p:sp>
+        <p:sp>
+          <p:nvSpPr>
+            <p:cNvPr id="53" name="Rettangolo 52"/>
+            <p:cNvSpPr/>
+            <p:nvPr/>
+          </p:nvSpPr>
+          <p:spPr>
+            <a:xfrm>
+              <a:off x="2904321" y="1165276"/>
+              <a:ext cx="8813255" cy="369332"/>
+            </a:xfrm>
+            <a:prstGeom prst="rect">
+              <a:avLst/>
+            </a:prstGeom>
+          </p:spPr>
+          <p:txBody>
+            <a:bodyPr wrap="square">
+              <a:spAutoFit/>
+            </a:bodyPr>
+            <a:lstStyle/>
+            <a:p>
+              <a:r>
+                <a:rPr lang="en-GB" dirty="0"/>
+                <a:t>Steady state</a:t>
+              </a:r>
+            </a:p>
+          </p:txBody>
+        </p:sp>
+      </p:grpSp>
+    </p:spTree>
+    <p:extLst>
+      <p:ext uri="{BB962C8B-B14F-4D97-AF65-F5344CB8AC3E}">
+        <p14:creationId xmlns:p14="http://schemas.microsoft.com/office/powerpoint/2010/main" val="4288432972"/>
+      </p:ext>
+    </p:extLst>
+  </p:cSld>
+  <p:clrMapOvr>
+    <a:masterClrMapping/>
+  </p:clrMapOvr>
+  <p:transition spd="slow">
+    <p:cut/>
+  </p:transition>
+</p:sld>
+</file>
+
+<file path=ppt/slides/slide13.xml><?xml version="1.0" encoding="utf-8"?>
 <p:sld xmlns:a="http://schemas.openxmlformats.org/drawingml/2006/main" xmlns:r="http://schemas.openxmlformats.org/officeDocument/2006/relationships" xmlns:p="http://schemas.openxmlformats.org/presentationml/2006/main">
   <p:cSld>
     <p:spTree>
@@ -6707,7 +8605,9 @@
       <p:pic>
         <p:nvPicPr>
           <p:cNvPr id="47" name="Immagine 46" descr="C:\Users\user\Documents\GitHub\linearVibrationsControl\finalReport\parts\Identification\img\motor_validation.png"/>
-          <p:cNvPicPr/>
+          <p:cNvPicPr>
+            <a:picLocks noChangeAspect="1"/>
+          </p:cNvPicPr>
           <p:nvPr/>
         </p:nvPicPr>
         <p:blipFill>
@@ -6725,8 +8625,8 @@
         </p:blipFill>
         <p:spPr bwMode="auto">
           <a:xfrm>
-            <a:off x="1415501" y="3520433"/>
-            <a:ext cx="4451846" cy="3083294"/>
+            <a:off x="878954" y="1886369"/>
+            <a:ext cx="6844536" cy="4740442"/>
           </a:xfrm>
           <a:prstGeom prst="rect">
             <a:avLst/>
@@ -6768,7 +8668,7 @@
                   <a:srgbClr val="003366"/>
                 </a:solidFill>
               </a:rPr>
-              <a:t>Identification: validation cost function</a:t>
+              <a:t>Motor identification: inductance</a:t>
             </a:r>
           </a:p>
         </p:txBody>
@@ -6965,9 +8865,338 @@
           </a:p>
         </p:txBody>
       </p:sp>
+      <p:graphicFrame>
+        <p:nvGraphicFramePr>
+          <p:cNvPr id="14" name="Oggetto 13"/>
+          <p:cNvGraphicFramePr>
+            <a:graphicFrameLocks noChangeAspect="1"/>
+          </p:cNvGraphicFramePr>
+          <p:nvPr>
+            <p:extLst>
+              <p:ext uri="{D42A27DB-BD31-4B8C-83A1-F6EECF244321}">
+                <p14:modId xmlns:p14="http://schemas.microsoft.com/office/powerpoint/2010/main" val="979431262"/>
+              </p:ext>
+            </p:extLst>
+          </p:nvPr>
+        </p:nvGraphicFramePr>
+        <p:xfrm>
+          <a:off x="4174204" y="802043"/>
+          <a:ext cx="1717782" cy="572594"/>
+        </p:xfrm>
+        <a:graphic>
+          <a:graphicData uri="http://schemas.openxmlformats.org/presentationml/2006/ole">
+            <mc:AlternateContent xmlns:mc="http://schemas.openxmlformats.org/markup-compatibility/2006">
+              <mc:Choice xmlns:v="urn:schemas-microsoft-com:vml" Requires="v">
+                <p:oleObj spid="_x0000_s15437" name="Equazione" r:id="rId8" imgW="1167893" imgH="393529" progId="Equation.3">
+                  <p:embed/>
+                </p:oleObj>
+              </mc:Choice>
+              <mc:Fallback>
+                <p:oleObj name="Equazione" r:id="rId8" imgW="1167893" imgH="393529" progId="Equation.3">
+                  <p:embed/>
+                  <p:pic>
+                    <p:nvPicPr>
+                      <p:cNvPr id="14" name="Oggetto 13"/>
+                      <p:cNvPicPr>
+                        <a:picLocks noChangeAspect="1" noChangeArrowheads="1"/>
+                      </p:cNvPicPr>
+                      <p:nvPr/>
+                    </p:nvPicPr>
+                    <p:blipFill>
+                      <a:blip r:embed="rId9">
+                        <a:extLst>
+                          <a:ext uri="{28A0092B-C50C-407E-A947-70E740481C1C}">
+                            <a14:useLocalDpi xmlns:a14="http://schemas.microsoft.com/office/drawing/2010/main" val="0"/>
+                          </a:ext>
+                        </a:extLst>
+                      </a:blip>
+                      <a:srcRect/>
+                      <a:stretch>
+                        <a:fillRect/>
+                      </a:stretch>
+                    </p:blipFill>
+                    <p:spPr bwMode="auto">
+                      <a:xfrm>
+                        <a:off x="4174204" y="802043"/>
+                        <a:ext cx="1717782" cy="572594"/>
+                      </a:xfrm>
+                      <a:prstGeom prst="rect">
+                        <a:avLst/>
+                      </a:prstGeom>
+                      <a:noFill/>
+                    </p:spPr>
+                  </p:pic>
+                </p:oleObj>
+              </mc:Fallback>
+            </mc:AlternateContent>
+          </a:graphicData>
+        </a:graphic>
+      </p:graphicFrame>
+      <p:graphicFrame>
+        <p:nvGraphicFramePr>
+          <p:cNvPr id="16" name="Oggetto 15"/>
+          <p:cNvGraphicFramePr>
+            <a:graphicFrameLocks noChangeAspect="1"/>
+          </p:cNvGraphicFramePr>
+          <p:nvPr>
+            <p:extLst>
+              <p:ext uri="{D42A27DB-BD31-4B8C-83A1-F6EECF244321}">
+                <p14:modId xmlns:p14="http://schemas.microsoft.com/office/powerpoint/2010/main" val="2339216678"/>
+              </p:ext>
+            </p:extLst>
+          </p:nvPr>
+        </p:nvGraphicFramePr>
+        <p:xfrm>
+          <a:off x="4518466" y="1412888"/>
+          <a:ext cx="1179209" cy="508922"/>
+        </p:xfrm>
+        <a:graphic>
+          <a:graphicData uri="http://schemas.openxmlformats.org/presentationml/2006/ole">
+            <mc:AlternateContent xmlns:mc="http://schemas.openxmlformats.org/markup-compatibility/2006">
+              <mc:Choice xmlns:v="urn:schemas-microsoft-com:vml" Requires="v">
+                <p:oleObj spid="_x0000_s15438" name="Equazione" r:id="rId10" imgW="901309" imgH="393529" progId="Equation.3">
+                  <p:embed/>
+                </p:oleObj>
+              </mc:Choice>
+              <mc:Fallback>
+                <p:oleObj name="Equazione" r:id="rId10" imgW="901309" imgH="393529" progId="Equation.3">
+                  <p:embed/>
+                  <p:pic>
+                    <p:nvPicPr>
+                      <p:cNvPr id="16" name="Oggetto 15"/>
+                      <p:cNvPicPr>
+                        <a:picLocks noChangeAspect="1" noChangeArrowheads="1"/>
+                      </p:cNvPicPr>
+                      <p:nvPr/>
+                    </p:nvPicPr>
+                    <p:blipFill>
+                      <a:blip r:embed="rId11">
+                        <a:extLst>
+                          <a:ext uri="{28A0092B-C50C-407E-A947-70E740481C1C}">
+                            <a14:useLocalDpi xmlns:a14="http://schemas.microsoft.com/office/drawing/2010/main" val="0"/>
+                          </a:ext>
+                        </a:extLst>
+                      </a:blip>
+                      <a:srcRect/>
+                      <a:stretch>
+                        <a:fillRect/>
+                      </a:stretch>
+                    </p:blipFill>
+                    <p:spPr bwMode="auto">
+                      <a:xfrm>
+                        <a:off x="4518466" y="1412888"/>
+                        <a:ext cx="1179209" cy="508922"/>
+                      </a:xfrm>
+                      <a:prstGeom prst="rect">
+                        <a:avLst/>
+                      </a:prstGeom>
+                      <a:noFill/>
+                    </p:spPr>
+                  </p:pic>
+                </p:oleObj>
+              </mc:Fallback>
+            </mc:AlternateContent>
+          </a:graphicData>
+        </a:graphic>
+      </p:graphicFrame>
+      <p:graphicFrame>
+        <p:nvGraphicFramePr>
+          <p:cNvPr id="19" name="Oggetto 18"/>
+          <p:cNvGraphicFramePr>
+            <a:graphicFrameLocks noChangeAspect="1"/>
+          </p:cNvGraphicFramePr>
+          <p:nvPr>
+            <p:extLst>
+              <p:ext uri="{D42A27DB-BD31-4B8C-83A1-F6EECF244321}">
+                <p14:modId xmlns:p14="http://schemas.microsoft.com/office/powerpoint/2010/main" val="3347964650"/>
+              </p:ext>
+            </p:extLst>
+          </p:nvPr>
+        </p:nvGraphicFramePr>
+        <p:xfrm>
+          <a:off x="7621246" y="912827"/>
+          <a:ext cx="2727069" cy="360179"/>
+        </p:xfrm>
+        <a:graphic>
+          <a:graphicData uri="http://schemas.openxmlformats.org/presentationml/2006/ole">
+            <mc:AlternateContent xmlns:mc="http://schemas.openxmlformats.org/markup-compatibility/2006">
+              <mc:Choice xmlns:v="urn:schemas-microsoft-com:vml" Requires="v">
+                <p:oleObj spid="_x0000_s15439" name="Equazione" r:id="rId12" imgW="1511300" imgH="203200" progId="Equation.3">
+                  <p:embed/>
+                </p:oleObj>
+              </mc:Choice>
+              <mc:Fallback>
+                <p:oleObj name="Equazione" r:id="rId12" imgW="1511300" imgH="203200" progId="Equation.3">
+                  <p:embed/>
+                  <p:pic>
+                    <p:nvPicPr>
+                      <p:cNvPr id="19" name="Oggetto 18"/>
+                      <p:cNvPicPr>
+                        <a:picLocks noChangeAspect="1" noChangeArrowheads="1"/>
+                      </p:cNvPicPr>
+                      <p:nvPr/>
+                    </p:nvPicPr>
+                    <p:blipFill>
+                      <a:blip r:embed="rId13">
+                        <a:extLst>
+                          <a:ext uri="{28A0092B-C50C-407E-A947-70E740481C1C}">
+                            <a14:useLocalDpi xmlns:a14="http://schemas.microsoft.com/office/drawing/2010/main" val="0"/>
+                          </a:ext>
+                        </a:extLst>
+                      </a:blip>
+                      <a:srcRect/>
+                      <a:stretch>
+                        <a:fillRect/>
+                      </a:stretch>
+                    </p:blipFill>
+                    <p:spPr bwMode="auto">
+                      <a:xfrm>
+                        <a:off x="7621246" y="912827"/>
+                        <a:ext cx="2727069" cy="360179"/>
+                      </a:xfrm>
+                      <a:prstGeom prst="rect">
+                        <a:avLst/>
+                      </a:prstGeom>
+                      <a:noFill/>
+                    </p:spPr>
+                  </p:pic>
+                </p:oleObj>
+              </mc:Fallback>
+            </mc:AlternateContent>
+          </a:graphicData>
+        </a:graphic>
+      </p:graphicFrame>
+      <p:graphicFrame>
+        <p:nvGraphicFramePr>
+          <p:cNvPr id="20" name="Oggetto 19"/>
+          <p:cNvGraphicFramePr>
+            <a:graphicFrameLocks noChangeAspect="1"/>
+          </p:cNvGraphicFramePr>
+          <p:nvPr>
+            <p:extLst>
+              <p:ext uri="{D42A27DB-BD31-4B8C-83A1-F6EECF244321}">
+                <p14:modId xmlns:p14="http://schemas.microsoft.com/office/powerpoint/2010/main" val="927427361"/>
+              </p:ext>
+            </p:extLst>
+          </p:nvPr>
+        </p:nvGraphicFramePr>
+        <p:xfrm>
+          <a:off x="7483536" y="2663165"/>
+          <a:ext cx="1064119" cy="375571"/>
+        </p:xfrm>
+        <a:graphic>
+          <a:graphicData uri="http://schemas.openxmlformats.org/presentationml/2006/ole">
+            <mc:AlternateContent xmlns:mc="http://schemas.openxmlformats.org/markup-compatibility/2006">
+              <mc:Choice xmlns:v="urn:schemas-microsoft-com:vml" Requires="v">
+                <p:oleObj spid="_x0000_s15440" name="Equazione" r:id="rId14" imgW="647640" imgH="228600" progId="Equation.3">
+                  <p:embed/>
+                </p:oleObj>
+              </mc:Choice>
+              <mc:Fallback>
+                <p:oleObj name="Equazione" r:id="rId14" imgW="647640" imgH="228600" progId="Equation.3">
+                  <p:embed/>
+                  <p:pic>
+                    <p:nvPicPr>
+                      <p:cNvPr id="20" name="Oggetto 19"/>
+                      <p:cNvPicPr>
+                        <a:picLocks noChangeAspect="1" noChangeArrowheads="1"/>
+                      </p:cNvPicPr>
+                      <p:nvPr/>
+                    </p:nvPicPr>
+                    <p:blipFill>
+                      <a:blip r:embed="rId15"/>
+                      <a:srcRect/>
+                      <a:stretch>
+                        <a:fillRect/>
+                      </a:stretch>
+                    </p:blipFill>
+                    <p:spPr bwMode="auto">
+                      <a:xfrm>
+                        <a:off x="7483536" y="2663165"/>
+                        <a:ext cx="1064119" cy="375571"/>
+                      </a:xfrm>
+                      <a:prstGeom prst="rect">
+                        <a:avLst/>
+                      </a:prstGeom>
+                      <a:noFill/>
+                    </p:spPr>
+                  </p:pic>
+                </p:oleObj>
+              </mc:Fallback>
+            </mc:AlternateContent>
+          </a:graphicData>
+        </a:graphic>
+      </p:graphicFrame>
+      <p:graphicFrame>
+        <p:nvGraphicFramePr>
+          <p:cNvPr id="22" name="Oggetto 21"/>
+          <p:cNvGraphicFramePr>
+            <a:graphicFrameLocks noChangeAspect="1"/>
+          </p:cNvGraphicFramePr>
+          <p:nvPr>
+            <p:extLst>
+              <p:ext uri="{D42A27DB-BD31-4B8C-83A1-F6EECF244321}">
+                <p14:modId xmlns:p14="http://schemas.microsoft.com/office/powerpoint/2010/main" val="4261224269"/>
+              </p:ext>
+            </p:extLst>
+          </p:nvPr>
+        </p:nvGraphicFramePr>
+        <p:xfrm>
+          <a:off x="8770303" y="2656502"/>
+          <a:ext cx="1458372" cy="376354"/>
+        </p:xfrm>
+        <a:graphic>
+          <a:graphicData uri="http://schemas.openxmlformats.org/presentationml/2006/ole">
+            <mc:AlternateContent xmlns:mc="http://schemas.openxmlformats.org/markup-compatibility/2006">
+              <mc:Choice xmlns:v="urn:schemas-microsoft-com:vml" Requires="v">
+                <p:oleObj spid="_x0000_s15441" name="Equazione" r:id="rId16" imgW="889000" imgH="228600" progId="Equation.3">
+                  <p:embed/>
+                </p:oleObj>
+              </mc:Choice>
+              <mc:Fallback>
+                <p:oleObj name="Equazione" r:id="rId16" imgW="889000" imgH="228600" progId="Equation.3">
+                  <p:embed/>
+                  <p:pic>
+                    <p:nvPicPr>
+                      <p:cNvPr id="22" name="Oggetto 21"/>
+                      <p:cNvPicPr>
+                        <a:picLocks noChangeAspect="1" noChangeArrowheads="1"/>
+                      </p:cNvPicPr>
+                      <p:nvPr/>
+                    </p:nvPicPr>
+                    <p:blipFill>
+                      <a:blip r:embed="rId17">
+                        <a:extLst>
+                          <a:ext uri="{28A0092B-C50C-407E-A947-70E740481C1C}">
+                            <a14:useLocalDpi xmlns:a14="http://schemas.microsoft.com/office/drawing/2010/main" val="0"/>
+                          </a:ext>
+                        </a:extLst>
+                      </a:blip>
+                      <a:srcRect/>
+                      <a:stretch>
+                        <a:fillRect/>
+                      </a:stretch>
+                    </p:blipFill>
+                    <p:spPr bwMode="auto">
+                      <a:xfrm>
+                        <a:off x="8770303" y="2656502"/>
+                        <a:ext cx="1458372" cy="376354"/>
+                      </a:xfrm>
+                      <a:prstGeom prst="rect">
+                        <a:avLst/>
+                      </a:prstGeom>
+                      <a:noFill/>
+                    </p:spPr>
+                  </p:pic>
+                </p:oleObj>
+              </mc:Fallback>
+            </mc:AlternateContent>
+          </a:graphicData>
+        </a:graphic>
+      </p:graphicFrame>
       <p:sp>
         <p:nvSpPr>
-          <p:cNvPr id="45" name="Rectangle 39"/>
+          <p:cNvPr id="25" name="Rectangle 10"/>
           <p:cNvSpPr>
             <a:spLocks noChangeArrowheads="1"/>
           </p:cNvSpPr>
@@ -6975,8 +9204,8 @@
         </p:nvSpPr>
         <p:spPr bwMode="auto">
           <a:xfrm>
-            <a:off x="2106219" y="1929660"/>
-            <a:ext cx="12192000" cy="457200"/>
+            <a:off x="1606450" y="903674"/>
+            <a:ext cx="2567754" cy="369332"/>
           </a:xfrm>
           <a:prstGeom prst="rect">
             <a:avLst/>
@@ -7024,13 +9253,112 @@
           </a:bodyPr>
           <a:lstStyle/>
           <a:p>
-            <a:endParaRPr lang="en-US"/>
+            <a:pPr marL="0" marR="0" lvl="0" indent="0" algn="l" defTabSz="914400" rtl="0" eaLnBrk="0" fontAlgn="base" latinLnBrk="0" hangingPunct="0">
+              <a:lnSpc>
+                <a:spcPct val="100000"/>
+              </a:lnSpc>
+              <a:spcBef>
+                <a:spcPct val="0"/>
+              </a:spcBef>
+              <a:spcAft>
+                <a:spcPct val="0"/>
+              </a:spcAft>
+              <a:buClrTx/>
+              <a:buSzTx/>
+              <a:buFontTx/>
+              <a:buNone/>
+              <a:tabLst/>
+            </a:pPr>
+            <a:r>
+              <a:rPr kumimoji="0" lang="en-US" altLang="en-US" sz="1800" b="0" i="0" u="none" strike="noStrike" cap="none" normalizeH="0" baseline="0" dirty="0" err="1">
+                <a:ln>
+                  <a:noFill/>
+                </a:ln>
+                <a:solidFill>
+                  <a:schemeClr val="tx1"/>
+                </a:solidFill>
+                <a:effectLst/>
+                <a:latin typeface="Calibri" panose="020F0502020204030204" pitchFamily="34" charset="0"/>
+                <a:ea typeface="Calibri" panose="020F0502020204030204" pitchFamily="34" charset="0"/>
+                <a:cs typeface="Times New Roman" panose="02020603050405020304" pitchFamily="18" charset="0"/>
+              </a:rPr>
+              <a:t>Matlab</a:t>
+            </a:r>
+            <a:r>
+              <a:rPr kumimoji="0" lang="en-US" altLang="en-US" sz="1800" b="0" i="0" u="none" strike="noStrike" cap="none" normalizeH="0" baseline="0" dirty="0">
+                <a:ln>
+                  <a:noFill/>
+                </a:ln>
+                <a:solidFill>
+                  <a:schemeClr val="tx1"/>
+                </a:solidFill>
+                <a:effectLst/>
+                <a:latin typeface="Calibri" panose="020F0502020204030204" pitchFamily="34" charset="0"/>
+                <a:ea typeface="Calibri" panose="020F0502020204030204" pitchFamily="34" charset="0"/>
+                <a:cs typeface="Times New Roman" panose="02020603050405020304" pitchFamily="18" charset="0"/>
+              </a:rPr>
+              <a:t> </a:t>
+            </a:r>
+            <a:r>
+              <a:rPr kumimoji="0" lang="en-US" altLang="en-US" sz="1800" b="0" u="none" strike="noStrike" cap="none" normalizeH="0" baseline="0" dirty="0" err="1">
+                <a:ln>
+                  <a:noFill/>
+                </a:ln>
+                <a:solidFill>
+                  <a:schemeClr val="tx1"/>
+                </a:solidFill>
+                <a:effectLst/>
+                <a:latin typeface="Lucida Calligraphy" panose="03010101010101010101" pitchFamily="66" charset="0"/>
+                <a:ea typeface="Calibri" panose="020F0502020204030204" pitchFamily="34" charset="0"/>
+                <a:cs typeface="Times New Roman" panose="02020603050405020304" pitchFamily="18" charset="0"/>
+              </a:rPr>
+              <a:t>tfest</a:t>
+            </a:r>
+            <a:r>
+              <a:rPr kumimoji="0" lang="en-US" altLang="en-US" sz="1800" b="0" u="none" strike="noStrike" cap="none" normalizeH="0" baseline="0" dirty="0">
+                <a:ln>
+                  <a:noFill/>
+                </a:ln>
+                <a:solidFill>
+                  <a:schemeClr val="tx1"/>
+                </a:solidFill>
+                <a:effectLst/>
+                <a:latin typeface="Calibri" panose="020F0502020204030204" pitchFamily="34" charset="0"/>
+                <a:ea typeface="Calibri" panose="020F0502020204030204" pitchFamily="34" charset="0"/>
+                <a:cs typeface="Times New Roman" panose="02020603050405020304" pitchFamily="18" charset="0"/>
+              </a:rPr>
+              <a:t> </a:t>
+            </a:r>
+            <a:r>
+              <a:rPr kumimoji="0" lang="en-US" altLang="en-US" sz="1800" b="0" i="0" u="none" strike="noStrike" cap="none" normalizeH="0" baseline="0" dirty="0">
+                <a:ln>
+                  <a:noFill/>
+                </a:ln>
+                <a:solidFill>
+                  <a:schemeClr val="tx1"/>
+                </a:solidFill>
+                <a:effectLst/>
+                <a:latin typeface="Calibri" panose="020F0502020204030204" pitchFamily="34" charset="0"/>
+                <a:ea typeface="Calibri" panose="020F0502020204030204" pitchFamily="34" charset="0"/>
+                <a:cs typeface="Times New Roman" panose="02020603050405020304" pitchFamily="18" charset="0"/>
+              </a:rPr>
+              <a:t>(first order)</a:t>
+            </a:r>
+            <a:endParaRPr kumimoji="0" lang="en-US" altLang="en-US" sz="800" b="0" i="0" u="none" strike="noStrike" cap="none" normalizeH="0" baseline="0" dirty="0">
+              <a:ln>
+                <a:noFill/>
+              </a:ln>
+              <a:solidFill>
+                <a:schemeClr val="tx1"/>
+              </a:solidFill>
+              <a:effectLst/>
+            </a:endParaRPr>
           </a:p>
         </p:txBody>
       </p:sp>
       <p:sp>
         <p:nvSpPr>
-          <p:cNvPr id="49" name="Rectangle 39"/>
+          <p:cNvPr id="27" name="Rectangle 11"/>
           <p:cNvSpPr>
             <a:spLocks noChangeArrowheads="1"/>
           </p:cNvSpPr>
@@ -7038,8 +9366,8 @@
         </p:nvSpPr>
         <p:spPr bwMode="auto">
           <a:xfrm>
-            <a:off x="2120169" y="1929728"/>
-            <a:ext cx="12192000" cy="457200"/>
+            <a:off x="1606450" y="1449989"/>
+            <a:ext cx="2912016" cy="369332"/>
           </a:xfrm>
           <a:prstGeom prst="rect">
             <a:avLst/>
@@ -7087,511 +9415,83 @@
           </a:bodyPr>
           <a:lstStyle/>
           <a:p>
-            <a:endParaRPr lang="en-US"/>
+            <a:pPr marL="0" marR="0" lvl="0" indent="0" algn="l" defTabSz="914400" rtl="0" eaLnBrk="0" fontAlgn="base" latinLnBrk="0" hangingPunct="0">
+              <a:lnSpc>
+                <a:spcPct val="100000"/>
+              </a:lnSpc>
+              <a:spcBef>
+                <a:spcPct val="0"/>
+              </a:spcBef>
+              <a:spcAft>
+                <a:spcPct val="0"/>
+              </a:spcAft>
+              <a:buClrTx/>
+              <a:buSzTx/>
+              <a:buFontTx/>
+              <a:buNone/>
+              <a:tabLst/>
+            </a:pPr>
+            <a:r>
+              <a:rPr kumimoji="0" lang="en-US" altLang="en-US" sz="1800" b="0" i="0" u="none" strike="noStrike" cap="none" normalizeH="0" baseline="0" dirty="0">
+                <a:ln>
+                  <a:noFill/>
+                </a:ln>
+                <a:solidFill>
+                  <a:schemeClr val="tx1"/>
+                </a:solidFill>
+                <a:effectLst/>
+                <a:latin typeface="Calibri" panose="020F0502020204030204" pitchFamily="34" charset="0"/>
+                <a:ea typeface="Calibri" panose="020F0502020204030204" pitchFamily="34" charset="0"/>
+                <a:cs typeface="Times New Roman" panose="02020603050405020304" pitchFamily="18" charset="0"/>
+              </a:rPr>
+              <a:t>back-</a:t>
+            </a:r>
+            <a:r>
+              <a:rPr kumimoji="0" lang="en-US" altLang="en-US" sz="1800" b="0" i="0" u="none" strike="noStrike" cap="none" normalizeH="0" baseline="0" dirty="0" err="1">
+                <a:ln>
+                  <a:noFill/>
+                </a:ln>
+                <a:solidFill>
+                  <a:schemeClr val="tx1"/>
+                </a:solidFill>
+                <a:effectLst/>
+                <a:latin typeface="Calibri" panose="020F0502020204030204" pitchFamily="34" charset="0"/>
+                <a:ea typeface="Calibri" panose="020F0502020204030204" pitchFamily="34" charset="0"/>
+                <a:cs typeface="Times New Roman" panose="02020603050405020304" pitchFamily="18" charset="0"/>
+              </a:rPr>
+              <a:t>emf</a:t>
+            </a:r>
+            <a:r>
+              <a:rPr kumimoji="0" lang="en-US" altLang="en-US" sz="1800" b="0" i="0" u="none" strike="noStrike" cap="none" normalizeH="0" baseline="0" dirty="0">
+                <a:ln>
+                  <a:noFill/>
+                </a:ln>
+                <a:solidFill>
+                  <a:schemeClr val="tx1"/>
+                </a:solidFill>
+                <a:effectLst/>
+                <a:latin typeface="Calibri" panose="020F0502020204030204" pitchFamily="34" charset="0"/>
+                <a:ea typeface="Calibri" panose="020F0502020204030204" pitchFamily="34" charset="0"/>
+                <a:cs typeface="Times New Roman" panose="02020603050405020304" pitchFamily="18" charset="0"/>
+              </a:rPr>
+              <a:t> neglected because </a:t>
+            </a:r>
+            <a:endParaRPr kumimoji="0" lang="en-US" altLang="en-US" sz="1800" b="0" i="0" u="none" strike="noStrike" cap="none" normalizeH="0" baseline="0" dirty="0">
+              <a:ln>
+                <a:noFill/>
+              </a:ln>
+              <a:solidFill>
+                <a:schemeClr val="tx1"/>
+              </a:solidFill>
+              <a:effectLst/>
+              <a:latin typeface="Arial" panose="020B0604020202020204" pitchFamily="34" charset="0"/>
+            </a:endParaRPr>
           </a:p>
         </p:txBody>
       </p:sp>
-      <p:graphicFrame>
-        <p:nvGraphicFramePr>
-          <p:cNvPr id="13" name="Oggetto 12"/>
-          <p:cNvGraphicFramePr>
-            <a:graphicFrameLocks noChangeAspect="1"/>
-          </p:cNvGraphicFramePr>
-          <p:nvPr>
-            <p:extLst/>
-          </p:nvPr>
-        </p:nvGraphicFramePr>
-        <p:xfrm>
-          <a:off x="8307700" y="924792"/>
-          <a:ext cx="3264190" cy="355171"/>
-        </p:xfrm>
-        <a:graphic>
-          <a:graphicData uri="http://schemas.openxmlformats.org/presentationml/2006/ole">
-            <mc:AlternateContent xmlns:mc="http://schemas.openxmlformats.org/markup-compatibility/2006">
-              <mc:Choice xmlns:v="urn:schemas-microsoft-com:vml" Requires="v">
-                <p:oleObj spid="_x0000_s12322" name="Equazione" r:id="rId8" imgW="1841500" imgH="203200" progId="Equation.3">
-                  <p:embed/>
-                </p:oleObj>
-              </mc:Choice>
-              <mc:Fallback>
-                <p:oleObj name="Equazione" r:id="rId8" imgW="1841500" imgH="203200" progId="Equation.3">
-                  <p:embed/>
-                  <p:pic>
-                    <p:nvPicPr>
-                      <p:cNvPr id="13" name="Oggetto 12"/>
-                      <p:cNvPicPr>
-                        <a:picLocks noChangeAspect="1" noChangeArrowheads="1"/>
-                      </p:cNvPicPr>
-                      <p:nvPr/>
-                    </p:nvPicPr>
-                    <p:blipFill>
-                      <a:blip r:embed="rId9">
-                        <a:extLst>
-                          <a:ext uri="{28A0092B-C50C-407E-A947-70E740481C1C}">
-                            <a14:useLocalDpi xmlns:a14="http://schemas.microsoft.com/office/drawing/2010/main" val="0"/>
-                          </a:ext>
-                        </a:extLst>
-                      </a:blip>
-                      <a:srcRect/>
-                      <a:stretch>
-                        <a:fillRect/>
-                      </a:stretch>
-                    </p:blipFill>
-                    <p:spPr bwMode="auto">
-                      <a:xfrm>
-                        <a:off x="8307700" y="924792"/>
-                        <a:ext cx="3264190" cy="355171"/>
-                      </a:xfrm>
-                      <a:prstGeom prst="rect">
-                        <a:avLst/>
-                      </a:prstGeom>
-                      <a:noFill/>
-                    </p:spPr>
-                  </p:pic>
-                </p:oleObj>
-              </mc:Fallback>
-            </mc:AlternateContent>
-          </a:graphicData>
-        </a:graphic>
-      </p:graphicFrame>
-      <p:graphicFrame>
-        <p:nvGraphicFramePr>
-          <p:cNvPr id="14" name="Oggetto 13"/>
-          <p:cNvGraphicFramePr>
-            <a:graphicFrameLocks noChangeAspect="1"/>
-          </p:cNvGraphicFramePr>
-          <p:nvPr>
-            <p:extLst/>
-          </p:nvPr>
-        </p:nvGraphicFramePr>
-        <p:xfrm>
-          <a:off x="1676659" y="1595869"/>
-          <a:ext cx="1717782" cy="572594"/>
-        </p:xfrm>
-        <a:graphic>
-          <a:graphicData uri="http://schemas.openxmlformats.org/presentationml/2006/ole">
-            <mc:AlternateContent xmlns:mc="http://schemas.openxmlformats.org/markup-compatibility/2006">
-              <mc:Choice xmlns:v="urn:schemas-microsoft-com:vml" Requires="v">
-                <p:oleObj spid="_x0000_s12323" name="Equazione" r:id="rId10" imgW="1167893" imgH="393529" progId="Equation.3">
-                  <p:embed/>
-                </p:oleObj>
-              </mc:Choice>
-              <mc:Fallback>
-                <p:oleObj name="Equazione" r:id="rId10" imgW="1167893" imgH="393529" progId="Equation.3">
-                  <p:embed/>
-                  <p:pic>
-                    <p:nvPicPr>
-                      <p:cNvPr id="14" name="Oggetto 13"/>
-                      <p:cNvPicPr>
-                        <a:picLocks noChangeAspect="1" noChangeArrowheads="1"/>
-                      </p:cNvPicPr>
-                      <p:nvPr/>
-                    </p:nvPicPr>
-                    <p:blipFill>
-                      <a:blip r:embed="rId11">
-                        <a:extLst>
-                          <a:ext uri="{28A0092B-C50C-407E-A947-70E740481C1C}">
-                            <a14:useLocalDpi xmlns:a14="http://schemas.microsoft.com/office/drawing/2010/main" val="0"/>
-                          </a:ext>
-                        </a:extLst>
-                      </a:blip>
-                      <a:srcRect/>
-                      <a:stretch>
-                        <a:fillRect/>
-                      </a:stretch>
-                    </p:blipFill>
-                    <p:spPr bwMode="auto">
-                      <a:xfrm>
-                        <a:off x="1676659" y="1595869"/>
-                        <a:ext cx="1717782" cy="572594"/>
-                      </a:xfrm>
-                      <a:prstGeom prst="rect">
-                        <a:avLst/>
-                      </a:prstGeom>
-                      <a:noFill/>
-                    </p:spPr>
-                  </p:pic>
-                </p:oleObj>
-              </mc:Fallback>
-            </mc:AlternateContent>
-          </a:graphicData>
-        </a:graphic>
-      </p:graphicFrame>
-      <p:graphicFrame>
-        <p:nvGraphicFramePr>
-          <p:cNvPr id="15" name="Oggetto 14"/>
-          <p:cNvGraphicFramePr>
-            <a:graphicFrameLocks noChangeAspect="1"/>
-          </p:cNvGraphicFramePr>
-          <p:nvPr>
-            <p:extLst/>
-          </p:nvPr>
-        </p:nvGraphicFramePr>
-        <p:xfrm>
-          <a:off x="4418872" y="1691068"/>
-          <a:ext cx="885554" cy="372865"/>
-        </p:xfrm>
-        <a:graphic>
-          <a:graphicData uri="http://schemas.openxmlformats.org/presentationml/2006/ole">
-            <mc:AlternateContent xmlns:mc="http://schemas.openxmlformats.org/markup-compatibility/2006">
-              <mc:Choice xmlns:v="urn:schemas-microsoft-com:vml" Requires="v">
-                <p:oleObj spid="_x0000_s12324" name="Equazione" r:id="rId12" imgW="545863" imgH="228501" progId="Equation.3">
-                  <p:embed/>
-                </p:oleObj>
-              </mc:Choice>
-              <mc:Fallback>
-                <p:oleObj name="Equazione" r:id="rId12" imgW="545863" imgH="228501" progId="Equation.3">
-                  <p:embed/>
-                  <p:pic>
-                    <p:nvPicPr>
-                      <p:cNvPr id="15" name="Oggetto 14"/>
-                      <p:cNvPicPr>
-                        <a:picLocks noChangeAspect="1" noChangeArrowheads="1"/>
-                      </p:cNvPicPr>
-                      <p:nvPr/>
-                    </p:nvPicPr>
-                    <p:blipFill>
-                      <a:blip r:embed="rId13">
-                        <a:extLst>
-                          <a:ext uri="{28A0092B-C50C-407E-A947-70E740481C1C}">
-                            <a14:useLocalDpi xmlns:a14="http://schemas.microsoft.com/office/drawing/2010/main" val="0"/>
-                          </a:ext>
-                        </a:extLst>
-                      </a:blip>
-                      <a:srcRect/>
-                      <a:stretch>
-                        <a:fillRect/>
-                      </a:stretch>
-                    </p:blipFill>
-                    <p:spPr bwMode="auto">
-                      <a:xfrm>
-                        <a:off x="4418872" y="1691068"/>
-                        <a:ext cx="885554" cy="372865"/>
-                      </a:xfrm>
-                      <a:prstGeom prst="rect">
-                        <a:avLst/>
-                      </a:prstGeom>
-                      <a:noFill/>
-                    </p:spPr>
-                  </p:pic>
-                </p:oleObj>
-              </mc:Fallback>
-            </mc:AlternateContent>
-          </a:graphicData>
-        </a:graphic>
-      </p:graphicFrame>
-      <p:graphicFrame>
-        <p:nvGraphicFramePr>
-          <p:cNvPr id="16" name="Oggetto 15"/>
-          <p:cNvGraphicFramePr>
-            <a:graphicFrameLocks noChangeAspect="1"/>
-          </p:cNvGraphicFramePr>
-          <p:nvPr>
-            <p:extLst/>
-          </p:nvPr>
-        </p:nvGraphicFramePr>
-        <p:xfrm>
-          <a:off x="7128491" y="1608151"/>
-          <a:ext cx="1179209" cy="508922"/>
-        </p:xfrm>
-        <a:graphic>
-          <a:graphicData uri="http://schemas.openxmlformats.org/presentationml/2006/ole">
-            <mc:AlternateContent xmlns:mc="http://schemas.openxmlformats.org/markup-compatibility/2006">
-              <mc:Choice xmlns:v="urn:schemas-microsoft-com:vml" Requires="v">
-                <p:oleObj spid="_x0000_s12325" name="Equazione" r:id="rId14" imgW="901309" imgH="393529" progId="Equation.3">
-                  <p:embed/>
-                </p:oleObj>
-              </mc:Choice>
-              <mc:Fallback>
-                <p:oleObj name="Equazione" r:id="rId14" imgW="901309" imgH="393529" progId="Equation.3">
-                  <p:embed/>
-                  <p:pic>
-                    <p:nvPicPr>
-                      <p:cNvPr id="16" name="Oggetto 15"/>
-                      <p:cNvPicPr>
-                        <a:picLocks noChangeAspect="1" noChangeArrowheads="1"/>
-                      </p:cNvPicPr>
-                      <p:nvPr/>
-                    </p:nvPicPr>
-                    <p:blipFill>
-                      <a:blip r:embed="rId15">
-                        <a:extLst>
-                          <a:ext uri="{28A0092B-C50C-407E-A947-70E740481C1C}">
-                            <a14:useLocalDpi xmlns:a14="http://schemas.microsoft.com/office/drawing/2010/main" val="0"/>
-                          </a:ext>
-                        </a:extLst>
-                      </a:blip>
-                      <a:srcRect/>
-                      <a:stretch>
-                        <a:fillRect/>
-                      </a:stretch>
-                    </p:blipFill>
-                    <p:spPr bwMode="auto">
-                      <a:xfrm>
-                        <a:off x="7128491" y="1608151"/>
-                        <a:ext cx="1179209" cy="508922"/>
-                      </a:xfrm>
-                      <a:prstGeom prst="rect">
-                        <a:avLst/>
-                      </a:prstGeom>
-                      <a:noFill/>
-                    </p:spPr>
-                  </p:pic>
-                </p:oleObj>
-              </mc:Fallback>
-            </mc:AlternateContent>
-          </a:graphicData>
-        </a:graphic>
-      </p:graphicFrame>
-      <p:graphicFrame>
-        <p:nvGraphicFramePr>
-          <p:cNvPr id="17" name="Oggetto 16"/>
-          <p:cNvGraphicFramePr>
-            <a:graphicFrameLocks noChangeAspect="1"/>
-          </p:cNvGraphicFramePr>
-          <p:nvPr>
-            <p:extLst/>
-          </p:nvPr>
-        </p:nvGraphicFramePr>
-        <p:xfrm>
-          <a:off x="2052978" y="2230862"/>
-          <a:ext cx="2682925" cy="361163"/>
-        </p:xfrm>
-        <a:graphic>
-          <a:graphicData uri="http://schemas.openxmlformats.org/presentationml/2006/ole">
-            <mc:AlternateContent xmlns:mc="http://schemas.openxmlformats.org/markup-compatibility/2006">
-              <mc:Choice xmlns:v="urn:schemas-microsoft-com:vml" Requires="v">
-                <p:oleObj spid="_x0000_s12326" name="Equazione" r:id="rId16" imgW="1485900" imgH="203200" progId="Equation.3">
-                  <p:embed/>
-                </p:oleObj>
-              </mc:Choice>
-              <mc:Fallback>
-                <p:oleObj name="Equazione" r:id="rId16" imgW="1485900" imgH="203200" progId="Equation.3">
-                  <p:embed/>
-                  <p:pic>
-                    <p:nvPicPr>
-                      <p:cNvPr id="17" name="Oggetto 16"/>
-                      <p:cNvPicPr>
-                        <a:picLocks noChangeAspect="1" noChangeArrowheads="1"/>
-                      </p:cNvPicPr>
-                      <p:nvPr/>
-                    </p:nvPicPr>
-                    <p:blipFill>
-                      <a:blip r:embed="rId17">
-                        <a:extLst>
-                          <a:ext uri="{28A0092B-C50C-407E-A947-70E740481C1C}">
-                            <a14:useLocalDpi xmlns:a14="http://schemas.microsoft.com/office/drawing/2010/main" val="0"/>
-                          </a:ext>
-                        </a:extLst>
-                      </a:blip>
-                      <a:srcRect/>
-                      <a:stretch>
-                        <a:fillRect/>
-                      </a:stretch>
-                    </p:blipFill>
-                    <p:spPr bwMode="auto">
-                      <a:xfrm>
-                        <a:off x="2052978" y="2230862"/>
-                        <a:ext cx="2682925" cy="361163"/>
-                      </a:xfrm>
-                      <a:prstGeom prst="rect">
-                        <a:avLst/>
-                      </a:prstGeom>
-                      <a:noFill/>
-                    </p:spPr>
-                  </p:pic>
-                </p:oleObj>
-              </mc:Fallback>
-            </mc:AlternateContent>
-          </a:graphicData>
-        </a:graphic>
-      </p:graphicFrame>
-      <p:graphicFrame>
-        <p:nvGraphicFramePr>
-          <p:cNvPr id="19" name="Oggetto 18"/>
-          <p:cNvGraphicFramePr>
-            <a:graphicFrameLocks noChangeAspect="1"/>
-          </p:cNvGraphicFramePr>
-          <p:nvPr>
-            <p:extLst/>
-          </p:nvPr>
-        </p:nvGraphicFramePr>
-        <p:xfrm>
-          <a:off x="4789144" y="2222975"/>
-          <a:ext cx="2727069" cy="360179"/>
-        </p:xfrm>
-        <a:graphic>
-          <a:graphicData uri="http://schemas.openxmlformats.org/presentationml/2006/ole">
-            <mc:AlternateContent xmlns:mc="http://schemas.openxmlformats.org/markup-compatibility/2006">
-              <mc:Choice xmlns:v="urn:schemas-microsoft-com:vml" Requires="v">
-                <p:oleObj spid="_x0000_s12327" name="Equazione" r:id="rId18" imgW="1511300" imgH="203200" progId="Equation.3">
-                  <p:embed/>
-                </p:oleObj>
-              </mc:Choice>
-              <mc:Fallback>
-                <p:oleObj name="Equazione" r:id="rId18" imgW="1511300" imgH="203200" progId="Equation.3">
-                  <p:embed/>
-                  <p:pic>
-                    <p:nvPicPr>
-                      <p:cNvPr id="19" name="Oggetto 18"/>
-                      <p:cNvPicPr>
-                        <a:picLocks noChangeAspect="1" noChangeArrowheads="1"/>
-                      </p:cNvPicPr>
-                      <p:nvPr/>
-                    </p:nvPicPr>
-                    <p:blipFill>
-                      <a:blip r:embed="rId19">
-                        <a:extLst>
-                          <a:ext uri="{28A0092B-C50C-407E-A947-70E740481C1C}">
-                            <a14:useLocalDpi xmlns:a14="http://schemas.microsoft.com/office/drawing/2010/main" val="0"/>
-                          </a:ext>
-                        </a:extLst>
-                      </a:blip>
-                      <a:srcRect/>
-                      <a:stretch>
-                        <a:fillRect/>
-                      </a:stretch>
-                    </p:blipFill>
-                    <p:spPr bwMode="auto">
-                      <a:xfrm>
-                        <a:off x="4789144" y="2222975"/>
-                        <a:ext cx="2727069" cy="360179"/>
-                      </a:xfrm>
-                      <a:prstGeom prst="rect">
-                        <a:avLst/>
-                      </a:prstGeom>
-                      <a:noFill/>
-                    </p:spPr>
-                  </p:pic>
-                </p:oleObj>
-              </mc:Fallback>
-            </mc:AlternateContent>
-          </a:graphicData>
-        </a:graphic>
-      </p:graphicFrame>
-      <p:graphicFrame>
-        <p:nvGraphicFramePr>
-          <p:cNvPr id="20" name="Oggetto 19"/>
-          <p:cNvGraphicFramePr>
-            <a:graphicFrameLocks noChangeAspect="1"/>
-          </p:cNvGraphicFramePr>
-          <p:nvPr>
-            <p:extLst/>
-          </p:nvPr>
-        </p:nvGraphicFramePr>
-        <p:xfrm>
-          <a:off x="5365781" y="2682332"/>
-          <a:ext cx="1064119" cy="375571"/>
-        </p:xfrm>
-        <a:graphic>
-          <a:graphicData uri="http://schemas.openxmlformats.org/presentationml/2006/ole">
-            <mc:AlternateContent xmlns:mc="http://schemas.openxmlformats.org/markup-compatibility/2006">
-              <mc:Choice xmlns:v="urn:schemas-microsoft-com:vml" Requires="v">
-                <p:oleObj spid="_x0000_s12328" name="Equazione" r:id="rId20" imgW="647640" imgH="228600" progId="Equation.3">
-                  <p:embed/>
-                </p:oleObj>
-              </mc:Choice>
-              <mc:Fallback>
-                <p:oleObj name="Equazione" r:id="rId20" imgW="647640" imgH="228600" progId="Equation.3">
-                  <p:embed/>
-                  <p:pic>
-                    <p:nvPicPr>
-                      <p:cNvPr id="20" name="Oggetto 19"/>
-                      <p:cNvPicPr>
-                        <a:picLocks noChangeAspect="1" noChangeArrowheads="1"/>
-                      </p:cNvPicPr>
-                      <p:nvPr/>
-                    </p:nvPicPr>
-                    <p:blipFill>
-                      <a:blip r:embed="rId21"/>
-                      <a:srcRect/>
-                      <a:stretch>
-                        <a:fillRect/>
-                      </a:stretch>
-                    </p:blipFill>
-                    <p:spPr bwMode="auto">
-                      <a:xfrm>
-                        <a:off x="5365781" y="2682332"/>
-                        <a:ext cx="1064119" cy="375571"/>
-                      </a:xfrm>
-                      <a:prstGeom prst="rect">
-                        <a:avLst/>
-                      </a:prstGeom>
-                      <a:noFill/>
-                    </p:spPr>
-                  </p:pic>
-                </p:oleObj>
-              </mc:Fallback>
-            </mc:AlternateContent>
-          </a:graphicData>
-        </a:graphic>
-      </p:graphicFrame>
-      <p:graphicFrame>
-        <p:nvGraphicFramePr>
-          <p:cNvPr id="22" name="Oggetto 21"/>
-          <p:cNvGraphicFramePr>
-            <a:graphicFrameLocks noChangeAspect="1"/>
-          </p:cNvGraphicFramePr>
-          <p:nvPr>
-            <p:extLst/>
-          </p:nvPr>
-        </p:nvGraphicFramePr>
-        <p:xfrm>
-          <a:off x="6484314" y="2681549"/>
-          <a:ext cx="1458372" cy="376354"/>
-        </p:xfrm>
-        <a:graphic>
-          <a:graphicData uri="http://schemas.openxmlformats.org/presentationml/2006/ole">
-            <mc:AlternateContent xmlns:mc="http://schemas.openxmlformats.org/markup-compatibility/2006">
-              <mc:Choice xmlns:v="urn:schemas-microsoft-com:vml" Requires="v">
-                <p:oleObj spid="_x0000_s12329" name="Equazione" r:id="rId22" imgW="889000" imgH="228600" progId="Equation.3">
-                  <p:embed/>
-                </p:oleObj>
-              </mc:Choice>
-              <mc:Fallback>
-                <p:oleObj name="Equazione" r:id="rId22" imgW="889000" imgH="228600" progId="Equation.3">
-                  <p:embed/>
-                  <p:pic>
-                    <p:nvPicPr>
-                      <p:cNvPr id="22" name="Oggetto 21"/>
-                      <p:cNvPicPr>
-                        <a:picLocks noChangeAspect="1" noChangeArrowheads="1"/>
-                      </p:cNvPicPr>
-                      <p:nvPr/>
-                    </p:nvPicPr>
-                    <p:blipFill>
-                      <a:blip r:embed="rId23">
-                        <a:extLst>
-                          <a:ext uri="{28A0092B-C50C-407E-A947-70E740481C1C}">
-                            <a14:useLocalDpi xmlns:a14="http://schemas.microsoft.com/office/drawing/2010/main" val="0"/>
-                          </a:ext>
-                        </a:extLst>
-                      </a:blip>
-                      <a:srcRect/>
-                      <a:stretch>
-                        <a:fillRect/>
-                      </a:stretch>
-                    </p:blipFill>
-                    <p:spPr bwMode="auto">
-                      <a:xfrm>
-                        <a:off x="6484314" y="2681549"/>
-                        <a:ext cx="1458372" cy="376354"/>
-                      </a:xfrm>
-                      <a:prstGeom prst="rect">
-                        <a:avLst/>
-                      </a:prstGeom>
-                      <a:noFill/>
-                    </p:spPr>
-                  </p:pic>
-                </p:oleObj>
-              </mc:Fallback>
-            </mc:AlternateContent>
-          </a:graphicData>
-        </a:graphic>
-      </p:graphicFrame>
       <p:sp>
         <p:nvSpPr>
-          <p:cNvPr id="23" name="Rectangle 9"/>
+          <p:cNvPr id="33" name="Rectangle 15"/>
           <p:cNvSpPr>
             <a:spLocks noChangeArrowheads="1"/>
           </p:cNvSpPr>
@@ -7599,8 +9499,8 @@
         </p:nvSpPr>
         <p:spPr bwMode="auto">
           <a:xfrm>
-            <a:off x="1606450" y="860788"/>
-            <a:ext cx="12192000" cy="457200"/>
+            <a:off x="7361725" y="2216794"/>
+            <a:ext cx="3913764" cy="369332"/>
           </a:xfrm>
           <a:prstGeom prst="rect">
             <a:avLst/>
@@ -7677,7 +9577,7 @@
                 <a:ea typeface="Calibri" panose="020F0502020204030204" pitchFamily="34" charset="0"/>
                 <a:cs typeface="Times New Roman" panose="02020603050405020304" pitchFamily="18" charset="0"/>
               </a:rPr>
-              <a:t>Resistance only: voltage pulses to motor: steady state measurement of </a:t>
+              <a:t>Nominal values from motor datasheet </a:t>
             </a:r>
             <a:endParaRPr kumimoji="0" lang="en-US" altLang="en-US" sz="1800" b="0" i="0" u="none" strike="noStrike" cap="none" normalizeH="0" baseline="0" dirty="0">
               <a:ln>
@@ -7694,7 +9594,7 @@
       </p:sp>
       <p:sp>
         <p:nvSpPr>
-          <p:cNvPr id="25" name="Rectangle 10"/>
+          <p:cNvPr id="35" name="Rectangle 17"/>
           <p:cNvSpPr>
             <a:spLocks noChangeArrowheads="1"/>
           </p:cNvSpPr>
@@ -7702,8 +9602,8 @@
         </p:nvSpPr>
         <p:spPr bwMode="auto">
           <a:xfrm>
-            <a:off x="1624903" y="1242560"/>
-            <a:ext cx="8942192" cy="369332"/>
+            <a:off x="7361725" y="3379871"/>
+            <a:ext cx="2170338" cy="923330"/>
           </a:xfrm>
           <a:prstGeom prst="rect">
             <a:avLst/>
@@ -7768,6 +9668,21 @@
               <a:tabLst/>
             </a:pPr>
             <a:r>
+              <a:rPr kumimoji="0" lang="en-US" altLang="en-US" sz="1800" b="1" i="0" u="none" strike="noStrike" cap="none" normalizeH="0" baseline="0" dirty="0">
+                <a:ln>
+                  <a:noFill/>
+                </a:ln>
+                <a:solidFill>
+                  <a:schemeClr val="tx1"/>
+                </a:solidFill>
+                <a:effectLst/>
+                <a:latin typeface="Calibri" panose="020F0502020204030204" pitchFamily="34" charset="0"/>
+                <a:ea typeface="Calibri" panose="020F0502020204030204" pitchFamily="34" charset="0"/>
+                <a:cs typeface="Times New Roman" panose="02020603050405020304" pitchFamily="18" charset="0"/>
+              </a:rPr>
+              <a:t>Validation</a:t>
+            </a:r>
+            <a:r>
               <a:rPr kumimoji="0" lang="en-US" altLang="en-US" sz="1800" b="0" i="0" u="none" strike="noStrike" cap="none" normalizeH="0" baseline="0" dirty="0">
                 <a:ln>
                   <a:noFill/>
@@ -7780,138 +9695,9 @@
                 <a:ea typeface="Calibri" panose="020F0502020204030204" pitchFamily="34" charset="0"/>
                 <a:cs typeface="Times New Roman" panose="02020603050405020304" pitchFamily="18" charset="0"/>
               </a:rPr>
-              <a:t>Resistance and inductance: experimental input/output data given to </a:t>
-            </a:r>
-            <a:r>
-              <a:rPr kumimoji="0" lang="en-US" altLang="en-US" sz="1800" b="0" i="0" u="none" strike="noStrike" cap="none" normalizeH="0" baseline="0" dirty="0" err="1">
-                <a:ln>
-                  <a:noFill/>
-                </a:ln>
-                <a:solidFill>
-                  <a:schemeClr val="tx1"/>
-                </a:solidFill>
-                <a:effectLst/>
-                <a:latin typeface="Calibri" panose="020F0502020204030204" pitchFamily="34" charset="0"/>
-                <a:ea typeface="Calibri" panose="020F0502020204030204" pitchFamily="34" charset="0"/>
-                <a:cs typeface="Times New Roman" panose="02020603050405020304" pitchFamily="18" charset="0"/>
-              </a:rPr>
-              <a:t>Matlab</a:t>
-            </a:r>
-            <a:r>
-              <a:rPr kumimoji="0" lang="en-US" altLang="en-US" sz="1800" b="0" i="0" u="none" strike="noStrike" cap="none" normalizeH="0" baseline="0" dirty="0">
-                <a:ln>
-                  <a:noFill/>
-                </a:ln>
-                <a:solidFill>
-                  <a:schemeClr val="tx1"/>
-                </a:solidFill>
-                <a:effectLst/>
-                <a:latin typeface="Calibri" panose="020F0502020204030204" pitchFamily="34" charset="0"/>
-                <a:ea typeface="Calibri" panose="020F0502020204030204" pitchFamily="34" charset="0"/>
-                <a:cs typeface="Times New Roman" panose="02020603050405020304" pitchFamily="18" charset="0"/>
-              </a:rPr>
-              <a:t> </a:t>
-            </a:r>
-            <a:r>
-              <a:rPr kumimoji="0" lang="en-US" altLang="en-US" sz="1800" b="0" i="1" u="none" strike="noStrike" cap="none" normalizeH="0" baseline="0" dirty="0" err="1">
-                <a:ln>
-                  <a:noFill/>
-                </a:ln>
-                <a:solidFill>
-                  <a:schemeClr val="tx1"/>
-                </a:solidFill>
-                <a:effectLst/>
-                <a:latin typeface="Calibri" panose="020F0502020204030204" pitchFamily="34" charset="0"/>
-                <a:ea typeface="Calibri" panose="020F0502020204030204" pitchFamily="34" charset="0"/>
-                <a:cs typeface="Times New Roman" panose="02020603050405020304" pitchFamily="18" charset="0"/>
-              </a:rPr>
-              <a:t>tfest</a:t>
-            </a:r>
-            <a:r>
-              <a:rPr kumimoji="0" lang="en-US" altLang="en-US" sz="1800" b="0" i="0" u="none" strike="noStrike" cap="none" normalizeH="0" baseline="0" dirty="0">
-                <a:ln>
-                  <a:noFill/>
-                </a:ln>
-                <a:solidFill>
-                  <a:schemeClr val="tx1"/>
-                </a:solidFill>
-                <a:effectLst/>
-                <a:latin typeface="Calibri" panose="020F0502020204030204" pitchFamily="34" charset="0"/>
-                <a:ea typeface="Calibri" panose="020F0502020204030204" pitchFamily="34" charset="0"/>
-                <a:cs typeface="Times New Roman" panose="02020603050405020304" pitchFamily="18" charset="0"/>
-              </a:rPr>
-              <a:t> (first order)</a:t>
-            </a:r>
-            <a:endParaRPr kumimoji="0" lang="en-US" altLang="en-US" sz="800" b="0" i="0" u="none" strike="noStrike" cap="none" normalizeH="0" baseline="0" dirty="0">
-              <a:ln>
-                <a:noFill/>
-              </a:ln>
-              <a:solidFill>
-                <a:schemeClr val="tx1"/>
-              </a:solidFill>
-              <a:effectLst/>
-            </a:endParaRPr>
-          </a:p>
-        </p:txBody>
-      </p:sp>
-      <p:sp>
-        <p:nvSpPr>
-          <p:cNvPr id="27" name="Rectangle 11"/>
-          <p:cNvSpPr>
-            <a:spLocks noChangeArrowheads="1"/>
-          </p:cNvSpPr>
-          <p:nvPr/>
-        </p:nvSpPr>
-        <p:spPr bwMode="auto">
-          <a:xfrm>
-            <a:off x="3275819" y="1677721"/>
-            <a:ext cx="3937681" cy="369332"/>
-          </a:xfrm>
-          <a:prstGeom prst="rect">
-            <a:avLst/>
-          </a:prstGeom>
-          <a:noFill/>
-          <a:ln>
-            <a:noFill/>
-          </a:ln>
-          <a:effectLst/>
-          <a:extLst>
-            <a:ext uri="{909E8E84-426E-40DD-AFC4-6F175D3DCCD1}">
-              <a14:hiddenFill xmlns:a14="http://schemas.microsoft.com/office/drawing/2010/main">
-                <a:solidFill>
-                  <a:schemeClr val="accent1"/>
-                </a:solidFill>
-              </a14:hiddenFill>
-            </a:ext>
-            <a:ext uri="{91240B29-F687-4F45-9708-019B960494DF}">
-              <a14:hiddenLine xmlns:a14="http://schemas.microsoft.com/office/drawing/2010/main" w="9525">
-                <a:solidFill>
-                  <a:schemeClr val="tx1"/>
-                </a:solidFill>
-                <a:miter lim="800000"/>
-                <a:headEnd/>
-                <a:tailEnd/>
-              </a14:hiddenLine>
-            </a:ext>
-            <a:ext uri="{AF507438-7753-43E0-B8FC-AC1667EBCBE1}">
-              <a14:hiddenEffects xmlns:a14="http://schemas.microsoft.com/office/drawing/2010/main">
-                <a:effectLst>
-                  <a:outerShdw dist="35921" dir="2700000" algn="ctr" rotWithShape="0">
-                    <a:schemeClr val="bg2"/>
-                  </a:outerShdw>
-                </a:effectLst>
-              </a14:hiddenEffects>
-            </a:ext>
-          </a:extLst>
-        </p:spPr>
-        <p:txBody>
-          <a:bodyPr vert="horz" wrap="none" lIns="91440" tIns="45720" rIns="91440" bIns="45720" numCol="1" anchor="ctr" anchorCtr="0" compatLnSpc="1">
-            <a:prstTxWarp prst="textNoShape">
-              <a:avLst/>
-            </a:prstTxWarp>
-            <a:spAutoFit/>
-          </a:bodyPr>
-          <a:lstStyle/>
+              <a:t> with input</a:t>
+            </a:r>
+          </a:p>
           <a:p>
             <a:pPr marL="0" marR="0" lvl="0" indent="0" algn="l" defTabSz="914400" rtl="0" eaLnBrk="0" fontAlgn="base" latinLnBrk="0" hangingPunct="0">
               <a:lnSpc>
@@ -7929,145 +9715,12 @@
               <a:buNone/>
               <a:tabLst/>
             </a:pPr>
-            <a:r>
-              <a:rPr kumimoji="0" lang="en-US" altLang="en-US" sz="1800" b="0" i="0" u="none" strike="noStrike" cap="none" normalizeH="0" baseline="0" dirty="0">
-                <a:ln>
-                  <a:noFill/>
-                </a:ln>
-                <a:solidFill>
-                  <a:schemeClr val="tx1"/>
-                </a:solidFill>
-                <a:effectLst/>
-                <a:latin typeface="Calibri" panose="020F0502020204030204" pitchFamily="34" charset="0"/>
-                <a:ea typeface="Calibri" panose="020F0502020204030204" pitchFamily="34" charset="0"/>
-                <a:cs typeface="Times New Roman" panose="02020603050405020304" pitchFamily="18" charset="0"/>
-              </a:rPr>
-              <a:t>;</a:t>
-            </a:r>
-            <a:r>
-              <a:rPr lang="en-US" altLang="en-US" dirty="0">
-                <a:latin typeface="Calibri" panose="020F0502020204030204" pitchFamily="34" charset="0"/>
-                <a:ea typeface="Calibri" panose="020F0502020204030204" pitchFamily="34" charset="0"/>
-                <a:cs typeface="Times New Roman" panose="02020603050405020304" pitchFamily="18" charset="0"/>
-              </a:rPr>
-              <a:t> </a:t>
-            </a:r>
-            <a:r>
-              <a:rPr kumimoji="0" lang="en-US" altLang="en-US" sz="1800" b="0" i="0" u="none" strike="noStrike" cap="none" normalizeH="0" baseline="0" dirty="0">
-                <a:ln>
-                  <a:noFill/>
-                </a:ln>
-                <a:solidFill>
-                  <a:schemeClr val="tx1"/>
-                </a:solidFill>
-                <a:effectLst/>
-                <a:latin typeface="Calibri" panose="020F0502020204030204" pitchFamily="34" charset="0"/>
-                <a:ea typeface="Calibri" panose="020F0502020204030204" pitchFamily="34" charset="0"/>
-                <a:cs typeface="Times New Roman" panose="02020603050405020304" pitchFamily="18" charset="0"/>
-              </a:rPr>
-              <a:t>back-</a:t>
-            </a:r>
-            <a:r>
-              <a:rPr kumimoji="0" lang="en-US" altLang="en-US" sz="1800" b="0" i="0" u="none" strike="noStrike" cap="none" normalizeH="0" baseline="0" dirty="0" err="1">
-                <a:ln>
-                  <a:noFill/>
-                </a:ln>
-                <a:solidFill>
-                  <a:schemeClr val="tx1"/>
-                </a:solidFill>
-                <a:effectLst/>
-                <a:latin typeface="Calibri" panose="020F0502020204030204" pitchFamily="34" charset="0"/>
-                <a:ea typeface="Calibri" panose="020F0502020204030204" pitchFamily="34" charset="0"/>
-                <a:cs typeface="Times New Roman" panose="02020603050405020304" pitchFamily="18" charset="0"/>
-              </a:rPr>
-              <a:t>emf</a:t>
-            </a:r>
-            <a:r>
-              <a:rPr kumimoji="0" lang="en-US" altLang="en-US" sz="1800" b="0" i="0" u="none" strike="noStrike" cap="none" normalizeH="0" baseline="0" dirty="0">
-                <a:ln>
-                  <a:noFill/>
-                </a:ln>
-                <a:solidFill>
-                  <a:schemeClr val="tx1"/>
-                </a:solidFill>
-                <a:effectLst/>
-                <a:latin typeface="Calibri" panose="020F0502020204030204" pitchFamily="34" charset="0"/>
-                <a:ea typeface="Calibri" panose="020F0502020204030204" pitchFamily="34" charset="0"/>
-                <a:cs typeface="Times New Roman" panose="02020603050405020304" pitchFamily="18" charset="0"/>
-              </a:rPr>
-              <a:t>	  neglected because </a:t>
-            </a:r>
-            <a:endParaRPr kumimoji="0" lang="en-US" altLang="en-US" sz="1800" b="0" i="0" u="none" strike="noStrike" cap="none" normalizeH="0" baseline="0" dirty="0">
-              <a:ln>
-                <a:noFill/>
-              </a:ln>
-              <a:solidFill>
-                <a:schemeClr val="tx1"/>
-              </a:solidFill>
-              <a:effectLst/>
-              <a:latin typeface="Arial" panose="020B0604020202020204" pitchFamily="34" charset="0"/>
+            <a:endParaRPr lang="en-US" altLang="en-US" dirty="0">
+              <a:latin typeface="Calibri" panose="020F0502020204030204" pitchFamily="34" charset="0"/>
+              <a:ea typeface="Calibri" panose="020F0502020204030204" pitchFamily="34" charset="0"/>
+              <a:cs typeface="Times New Roman" panose="02020603050405020304" pitchFamily="18" charset="0"/>
             </a:endParaRPr>
           </a:p>
-        </p:txBody>
-      </p:sp>
-      <p:sp>
-        <p:nvSpPr>
-          <p:cNvPr id="32" name="Rectangle 14"/>
-          <p:cNvSpPr>
-            <a:spLocks noChangeArrowheads="1"/>
-          </p:cNvSpPr>
-          <p:nvPr/>
-        </p:nvSpPr>
-        <p:spPr bwMode="auto">
-          <a:xfrm flipH="1">
-            <a:off x="4654954" y="2222693"/>
-            <a:ext cx="148140" cy="369332"/>
-          </a:xfrm>
-          <a:prstGeom prst="rect">
-            <a:avLst/>
-          </a:prstGeom>
-          <a:noFill/>
-          <a:ln>
-            <a:noFill/>
-          </a:ln>
-          <a:effectLst/>
-          <a:extLst>
-            <a:ext uri="{909E8E84-426E-40DD-AFC4-6F175D3DCCD1}">
-              <a14:hiddenFill xmlns:a14="http://schemas.microsoft.com/office/drawing/2010/main">
-                <a:solidFill>
-                  <a:schemeClr val="accent1"/>
-                </a:solidFill>
-              </a14:hiddenFill>
-            </a:ext>
-            <a:ext uri="{91240B29-F687-4F45-9708-019B960494DF}">
-              <a14:hiddenLine xmlns:a14="http://schemas.microsoft.com/office/drawing/2010/main" w="9525">
-                <a:solidFill>
-                  <a:schemeClr val="tx1"/>
-                </a:solidFill>
-                <a:miter lim="800000"/>
-                <a:headEnd/>
-                <a:tailEnd/>
-              </a14:hiddenLine>
-            </a:ext>
-            <a:ext uri="{AF507438-7753-43E0-B8FC-AC1667EBCBE1}">
-              <a14:hiddenEffects xmlns:a14="http://schemas.microsoft.com/office/drawing/2010/main">
-                <a:effectLst>
-                  <a:outerShdw dist="35921" dir="2700000" algn="ctr" rotWithShape="0">
-                    <a:schemeClr val="bg2"/>
-                  </a:outerShdw>
-                </a:effectLst>
-              </a14:hiddenEffects>
-            </a:ext>
-          </a:extLst>
-        </p:spPr>
-        <p:txBody>
-          <a:bodyPr vert="horz" wrap="square" lIns="91440" tIns="45720" rIns="91440" bIns="45720" numCol="1" anchor="ctr" anchorCtr="0" compatLnSpc="1">
-            <a:prstTxWarp prst="textNoShape">
-              <a:avLst/>
-            </a:prstTxWarp>
-            <a:spAutoFit/>
-          </a:bodyPr>
-          <a:lstStyle/>
           <a:p>
             <a:pPr marL="0" marR="0" lvl="0" indent="0" algn="l" defTabSz="914400" rtl="0" eaLnBrk="0" fontAlgn="base" latinLnBrk="0" hangingPunct="0">
               <a:lnSpc>
@@ -8098,7 +9751,7 @@
                 <a:ea typeface="Calibri" panose="020F0502020204030204" pitchFamily="34" charset="0"/>
                 <a:cs typeface="Times New Roman" panose="02020603050405020304" pitchFamily="18" charset="0"/>
               </a:rPr>
-              <a:t>,</a:t>
+              <a:t>Fit = (81.42±3,64) %</a:t>
             </a:r>
             <a:endParaRPr kumimoji="0" lang="en-US" altLang="en-US" sz="1800" b="0" i="0" u="none" strike="noStrike" cap="none" normalizeH="0" baseline="0" dirty="0">
               <a:ln>
@@ -8115,332 +9768,120 @@
       </p:sp>
       <p:sp>
         <p:nvSpPr>
-          <p:cNvPr id="33" name="Rectangle 15"/>
-          <p:cNvSpPr>
-            <a:spLocks noChangeArrowheads="1"/>
-          </p:cNvSpPr>
+          <p:cNvPr id="29" name="Freccia a destra con strisce 28"/>
+          <p:cNvSpPr/>
           <p:nvPr/>
         </p:nvSpPr>
-        <p:spPr bwMode="auto">
-          <a:xfrm>
-            <a:off x="1676659" y="2697927"/>
-            <a:ext cx="3913764" cy="369332"/>
-          </a:xfrm>
-          <a:prstGeom prst="rect">
+        <p:spPr>
+          <a:xfrm>
+            <a:off x="6008515" y="843959"/>
+            <a:ext cx="1353210" cy="484632"/>
+          </a:xfrm>
+          <a:prstGeom prst="stripedRightArrow">
             <a:avLst/>
           </a:prstGeom>
           <a:noFill/>
-          <a:ln>
-            <a:noFill/>
+          <a:ln w="9525" cap="flat" cmpd="sng" algn="ctr">
+            <a:solidFill>
+              <a:schemeClr val="accent5"/>
+            </a:solidFill>
+            <a:prstDash val="solid"/>
+            <a:round/>
+            <a:headEnd type="none" w="med" len="med"/>
+            <a:tailEnd type="none" w="med" len="med"/>
           </a:ln>
-          <a:effectLst/>
-          <a:extLst>
-            <a:ext uri="{909E8E84-426E-40DD-AFC4-6F175D3DCCD1}">
-              <a14:hiddenFill xmlns:a14="http://schemas.microsoft.com/office/drawing/2010/main">
-                <a:solidFill>
-                  <a:schemeClr val="accent1"/>
-                </a:solidFill>
-              </a14:hiddenFill>
-            </a:ext>
-            <a:ext uri="{91240B29-F687-4F45-9708-019B960494DF}">
-              <a14:hiddenLine xmlns:a14="http://schemas.microsoft.com/office/drawing/2010/main" w="9525">
-                <a:solidFill>
-                  <a:schemeClr val="tx1"/>
-                </a:solidFill>
-                <a:miter lim="800000"/>
-                <a:headEnd/>
-                <a:tailEnd/>
-              </a14:hiddenLine>
-            </a:ext>
-            <a:ext uri="{AF507438-7753-43E0-B8FC-AC1667EBCBE1}">
-              <a14:hiddenEffects xmlns:a14="http://schemas.microsoft.com/office/drawing/2010/main">
-                <a:effectLst>
-                  <a:outerShdw dist="35921" dir="2700000" algn="ctr" rotWithShape="0">
-                    <a:schemeClr val="bg2"/>
-                  </a:outerShdw>
-                </a:effectLst>
-              </a14:hiddenEffects>
-            </a:ext>
-          </a:extLst>
-        </p:spPr>
+        </p:spPr>
+        <p:style>
+          <a:lnRef idx="0">
+            <a:scrgbClr r="0" g="0" b="0"/>
+          </a:lnRef>
+          <a:fillRef idx="0">
+            <a:scrgbClr r="0" g="0" b="0"/>
+          </a:fillRef>
+          <a:effectRef idx="0">
+            <a:scrgbClr r="0" g="0" b="0"/>
+          </a:effectRef>
+          <a:fontRef idx="minor">
+            <a:schemeClr val="accent5"/>
+          </a:fontRef>
+        </p:style>
         <p:txBody>
-          <a:bodyPr vert="horz" wrap="none" lIns="91440" tIns="45720" rIns="91440" bIns="45720" numCol="1" anchor="ctr" anchorCtr="0" compatLnSpc="1">
-            <a:prstTxWarp prst="textNoShape">
-              <a:avLst/>
-            </a:prstTxWarp>
-            <a:spAutoFit/>
-          </a:bodyPr>
+          <a:bodyPr rtlCol="0" anchor="ctr"/>
           <a:lstStyle/>
           <a:p>
-            <a:pPr marL="0" marR="0" lvl="0" indent="0" algn="l" defTabSz="914400" rtl="0" eaLnBrk="0" fontAlgn="base" latinLnBrk="0" hangingPunct="0">
-              <a:lnSpc>
-                <a:spcPct val="100000"/>
-              </a:lnSpc>
-              <a:spcBef>
-                <a:spcPct val="0"/>
-              </a:spcBef>
-              <a:spcAft>
-                <a:spcPct val="0"/>
-              </a:spcAft>
-              <a:buClrTx/>
-              <a:buSzTx/>
-              <a:buFontTx/>
-              <a:buNone/>
-              <a:tabLst/>
-            </a:pPr>
-            <a:r>
-              <a:rPr kumimoji="0" lang="en-US" altLang="en-US" sz="1800" b="0" i="0" u="none" strike="noStrike" cap="none" normalizeH="0" baseline="0" dirty="0">
-                <a:ln>
-                  <a:noFill/>
-                </a:ln>
-                <a:solidFill>
-                  <a:schemeClr val="tx1"/>
-                </a:solidFill>
-                <a:effectLst/>
-                <a:latin typeface="Calibri" panose="020F0502020204030204" pitchFamily="34" charset="0"/>
-                <a:ea typeface="Calibri" panose="020F0502020204030204" pitchFamily="34" charset="0"/>
-                <a:cs typeface="Times New Roman" panose="02020603050405020304" pitchFamily="18" charset="0"/>
-              </a:rPr>
-              <a:t>Nominal values from motor datasheet </a:t>
-            </a:r>
-            <a:endParaRPr kumimoji="0" lang="en-US" altLang="en-US" sz="1800" b="0" i="0" u="none" strike="noStrike" cap="none" normalizeH="0" baseline="0" dirty="0">
-              <a:ln>
-                <a:noFill/>
-              </a:ln>
-              <a:solidFill>
-                <a:schemeClr val="tx1"/>
-              </a:solidFill>
-              <a:effectLst/>
-              <a:latin typeface="Arial" panose="020B0604020202020204" pitchFamily="34" charset="0"/>
-            </a:endParaRPr>
+            <a:pPr algn="ctr"/>
+            <a:r>
+              <a:rPr lang="en-GB" dirty="0"/>
+              <a:t>From data</a:t>
+            </a:r>
           </a:p>
         </p:txBody>
       </p:sp>
-      <p:sp>
-        <p:nvSpPr>
-          <p:cNvPr id="34" name="Rectangle 16"/>
-          <p:cNvSpPr>
-            <a:spLocks noChangeArrowheads="1"/>
-          </p:cNvSpPr>
-          <p:nvPr/>
-        </p:nvSpPr>
-        <p:spPr bwMode="auto">
-          <a:xfrm>
-            <a:off x="6335920" y="2690519"/>
-            <a:ext cx="242374" cy="369332"/>
-          </a:xfrm>
-          <a:prstGeom prst="rect">
-            <a:avLst/>
-          </a:prstGeom>
-          <a:noFill/>
-          <a:ln>
-            <a:noFill/>
-          </a:ln>
-          <a:effectLst/>
-          <a:extLst>
-            <a:ext uri="{909E8E84-426E-40DD-AFC4-6F175D3DCCD1}">
-              <a14:hiddenFill xmlns:a14="http://schemas.microsoft.com/office/drawing/2010/main">
-                <a:solidFill>
-                  <a:schemeClr val="accent1"/>
-                </a:solidFill>
-              </a14:hiddenFill>
-            </a:ext>
-            <a:ext uri="{91240B29-F687-4F45-9708-019B960494DF}">
-              <a14:hiddenLine xmlns:a14="http://schemas.microsoft.com/office/drawing/2010/main" w="9525">
-                <a:solidFill>
-                  <a:schemeClr val="tx1"/>
-                </a:solidFill>
-                <a:miter lim="800000"/>
-                <a:headEnd/>
-                <a:tailEnd/>
-              </a14:hiddenLine>
-            </a:ext>
-            <a:ext uri="{AF507438-7753-43E0-B8FC-AC1667EBCBE1}">
-              <a14:hiddenEffects xmlns:a14="http://schemas.microsoft.com/office/drawing/2010/main">
-                <a:effectLst>
-                  <a:outerShdw dist="35921" dir="2700000" algn="ctr" rotWithShape="0">
-                    <a:schemeClr val="bg2"/>
-                  </a:outerShdw>
-                </a:effectLst>
-              </a14:hiddenEffects>
-            </a:ext>
-          </a:extLst>
-        </p:spPr>
-        <p:txBody>
-          <a:bodyPr vert="horz" wrap="none" lIns="91440" tIns="45720" rIns="91440" bIns="45720" numCol="1" anchor="ctr" anchorCtr="0" compatLnSpc="1">
-            <a:prstTxWarp prst="textNoShape">
-              <a:avLst/>
-            </a:prstTxWarp>
-            <a:spAutoFit/>
-          </a:bodyPr>
-          <a:lstStyle/>
-          <a:p>
-            <a:pPr marL="0" marR="0" lvl="0" indent="0" algn="l" defTabSz="914400" rtl="0" eaLnBrk="0" fontAlgn="base" latinLnBrk="0" hangingPunct="0">
-              <a:lnSpc>
-                <a:spcPct val="100000"/>
-              </a:lnSpc>
-              <a:spcBef>
-                <a:spcPct val="0"/>
-              </a:spcBef>
-              <a:spcAft>
-                <a:spcPct val="0"/>
-              </a:spcAft>
-              <a:buClrTx/>
-              <a:buSzTx/>
-              <a:buFontTx/>
-              <a:buNone/>
-              <a:tabLst/>
-            </a:pPr>
-            <a:r>
-              <a:rPr kumimoji="0" lang="en-US" altLang="en-US" sz="1800" b="0" i="0" u="none" strike="noStrike" cap="none" normalizeH="0" baseline="0" dirty="0">
-                <a:ln>
-                  <a:noFill/>
-                </a:ln>
-                <a:solidFill>
-                  <a:schemeClr val="tx1"/>
-                </a:solidFill>
-                <a:effectLst/>
-                <a:latin typeface="Calibri" panose="020F0502020204030204" pitchFamily="34" charset="0"/>
-                <a:ea typeface="Calibri" panose="020F0502020204030204" pitchFamily="34" charset="0"/>
-                <a:cs typeface="Times New Roman" panose="02020603050405020304" pitchFamily="18" charset="0"/>
-              </a:rPr>
-              <a:t>,</a:t>
-            </a:r>
-            <a:endParaRPr kumimoji="0" lang="en-US" altLang="en-US" sz="1800" b="0" i="0" u="none" strike="noStrike" cap="none" normalizeH="0" baseline="0" dirty="0">
-              <a:ln>
-                <a:noFill/>
-              </a:ln>
-              <a:solidFill>
-                <a:schemeClr val="tx1"/>
-              </a:solidFill>
-              <a:effectLst/>
-              <a:latin typeface="Arial" panose="020B0604020202020204" pitchFamily="34" charset="0"/>
-            </a:endParaRPr>
-          </a:p>
-        </p:txBody>
-      </p:sp>
-      <p:sp>
-        <p:nvSpPr>
-          <p:cNvPr id="35" name="Rectangle 17"/>
-          <p:cNvSpPr>
-            <a:spLocks noChangeArrowheads="1"/>
-          </p:cNvSpPr>
-          <p:nvPr/>
-        </p:nvSpPr>
-        <p:spPr bwMode="auto">
-          <a:xfrm>
-            <a:off x="1676659" y="3151101"/>
-            <a:ext cx="7574318" cy="369332"/>
-          </a:xfrm>
-          <a:prstGeom prst="rect">
-            <a:avLst/>
-          </a:prstGeom>
-          <a:noFill/>
-          <a:ln>
-            <a:noFill/>
-          </a:ln>
-          <a:effectLst/>
-          <a:extLst>
-            <a:ext uri="{909E8E84-426E-40DD-AFC4-6F175D3DCCD1}">
-              <a14:hiddenFill xmlns:a14="http://schemas.microsoft.com/office/drawing/2010/main">
-                <a:solidFill>
-                  <a:schemeClr val="accent1"/>
-                </a:solidFill>
-              </a14:hiddenFill>
-            </a:ext>
-            <a:ext uri="{91240B29-F687-4F45-9708-019B960494DF}">
-              <a14:hiddenLine xmlns:a14="http://schemas.microsoft.com/office/drawing/2010/main" w="9525">
-                <a:solidFill>
-                  <a:schemeClr val="tx1"/>
-                </a:solidFill>
-                <a:miter lim="800000"/>
-                <a:headEnd/>
-                <a:tailEnd/>
-              </a14:hiddenLine>
-            </a:ext>
-            <a:ext uri="{AF507438-7753-43E0-B8FC-AC1667EBCBE1}">
-              <a14:hiddenEffects xmlns:a14="http://schemas.microsoft.com/office/drawing/2010/main">
-                <a:effectLst>
-                  <a:outerShdw dist="35921" dir="2700000" algn="ctr" rotWithShape="0">
-                    <a:schemeClr val="bg2"/>
-                  </a:outerShdw>
-                </a:effectLst>
-              </a14:hiddenEffects>
-            </a:ext>
-          </a:extLst>
-        </p:spPr>
-        <p:txBody>
-          <a:bodyPr vert="horz" wrap="none" lIns="91440" tIns="45720" rIns="91440" bIns="45720" numCol="1" anchor="ctr" anchorCtr="0" compatLnSpc="1">
-            <a:prstTxWarp prst="textNoShape">
-              <a:avLst/>
-            </a:prstTxWarp>
-            <a:spAutoFit/>
-          </a:bodyPr>
-          <a:lstStyle/>
-          <a:p>
-            <a:pPr marL="0" marR="0" lvl="0" indent="0" algn="l" defTabSz="914400" rtl="0" eaLnBrk="0" fontAlgn="base" latinLnBrk="0" hangingPunct="0">
-              <a:lnSpc>
-                <a:spcPct val="100000"/>
-              </a:lnSpc>
-              <a:spcBef>
-                <a:spcPct val="0"/>
-              </a:spcBef>
-              <a:spcAft>
-                <a:spcPct val="0"/>
-              </a:spcAft>
-              <a:buClrTx/>
-              <a:buSzTx/>
-              <a:buFontTx/>
-              <a:buNone/>
-              <a:tabLst/>
-            </a:pPr>
-            <a:r>
-              <a:rPr kumimoji="0" lang="en-US" altLang="en-US" sz="1800" b="1" i="0" u="none" strike="noStrike" cap="none" normalizeH="0" baseline="0" dirty="0">
-                <a:ln>
-                  <a:noFill/>
-                </a:ln>
-                <a:solidFill>
-                  <a:schemeClr val="tx1"/>
-                </a:solidFill>
-                <a:effectLst/>
-                <a:latin typeface="Calibri" panose="020F0502020204030204" pitchFamily="34" charset="0"/>
-                <a:ea typeface="Calibri" panose="020F0502020204030204" pitchFamily="34" charset="0"/>
-                <a:cs typeface="Times New Roman" panose="02020603050405020304" pitchFamily="18" charset="0"/>
-              </a:rPr>
-              <a:t>Validation</a:t>
-            </a:r>
-            <a:r>
-              <a:rPr kumimoji="0" lang="en-US" altLang="en-US" sz="1800" b="0" i="0" u="none" strike="noStrike" cap="none" normalizeH="0" baseline="0" dirty="0">
-                <a:ln>
-                  <a:noFill/>
-                </a:ln>
-                <a:solidFill>
-                  <a:schemeClr val="tx1"/>
-                </a:solidFill>
-                <a:effectLst/>
-                <a:latin typeface="Calibri" panose="020F0502020204030204" pitchFamily="34" charset="0"/>
-                <a:ea typeface="Calibri" panose="020F0502020204030204" pitchFamily="34" charset="0"/>
-                <a:cs typeface="Times New Roman" panose="02020603050405020304" pitchFamily="18" charset="0"/>
-              </a:rPr>
-              <a:t>: real output vs simulation with input = N(0,9/4): fit=0.8142±0.0364</a:t>
-            </a:r>
-            <a:endParaRPr kumimoji="0" lang="en-US" altLang="en-US" sz="1800" b="0" i="0" u="none" strike="noStrike" cap="none" normalizeH="0" baseline="0" dirty="0">
-              <a:ln>
-                <a:noFill/>
-              </a:ln>
-              <a:solidFill>
-                <a:schemeClr val="tx1"/>
-              </a:solidFill>
-              <a:effectLst/>
-              <a:latin typeface="Arial" panose="020B0604020202020204" pitchFamily="34" charset="0"/>
-            </a:endParaRPr>
-          </a:p>
-        </p:txBody>
-      </p:sp>
+      <p:graphicFrame>
+        <p:nvGraphicFramePr>
+          <p:cNvPr id="30" name="Oggetto 29"/>
+          <p:cNvGraphicFramePr>
+            <a:graphicFrameLocks noChangeAspect="1"/>
+          </p:cNvGraphicFramePr>
+          <p:nvPr>
+            <p:extLst>
+              <p:ext uri="{D42A27DB-BD31-4B8C-83A1-F6EECF244321}">
+                <p14:modId xmlns:p14="http://schemas.microsoft.com/office/powerpoint/2010/main" val="914178720"/>
+              </p:ext>
+            </p:extLst>
+          </p:nvPr>
+        </p:nvGraphicFramePr>
+        <p:xfrm>
+          <a:off x="9499489" y="3272998"/>
+          <a:ext cx="831850" cy="647700"/>
+        </p:xfrm>
+        <a:graphic>
+          <a:graphicData uri="http://schemas.openxmlformats.org/presentationml/2006/ole">
+            <mc:AlternateContent xmlns:mc="http://schemas.openxmlformats.org/markup-compatibility/2006">
+              <mc:Choice xmlns:v="urn:schemas-microsoft-com:vml" Requires="v">
+                <p:oleObj spid="_x0000_s15442" name="Equazione" r:id="rId18" imgW="507960" imgH="393480" progId="Equation.3">
+                  <p:embed/>
+                </p:oleObj>
+              </mc:Choice>
+              <mc:Fallback>
+                <p:oleObj name="Equazione" r:id="rId18" imgW="507960" imgH="393480" progId="Equation.3">
+                  <p:embed/>
+                  <p:pic>
+                    <p:nvPicPr>
+                      <p:cNvPr id="22" name="Oggetto 21"/>
+                      <p:cNvPicPr>
+                        <a:picLocks noChangeAspect="1" noChangeArrowheads="1"/>
+                      </p:cNvPicPr>
+                      <p:nvPr/>
+                    </p:nvPicPr>
+                    <p:blipFill>
+                      <a:blip r:embed="rId19"/>
+                      <a:srcRect/>
+                      <a:stretch>
+                        <a:fillRect/>
+                      </a:stretch>
+                    </p:blipFill>
+                    <p:spPr bwMode="auto">
+                      <a:xfrm>
+                        <a:off x="9499489" y="3272998"/>
+                        <a:ext cx="831850" cy="647700"/>
+                      </a:xfrm>
+                      <a:prstGeom prst="rect">
+                        <a:avLst/>
+                      </a:prstGeom>
+                      <a:noFill/>
+                    </p:spPr>
+                  </p:pic>
+                </p:oleObj>
+              </mc:Fallback>
+            </mc:AlternateContent>
+          </a:graphicData>
+        </a:graphic>
+      </p:graphicFrame>
     </p:spTree>
     <p:extLst>
       <p:ext uri="{BB962C8B-B14F-4D97-AF65-F5344CB8AC3E}">
-        <p14:creationId xmlns:p14="http://schemas.microsoft.com/office/powerpoint/2010/main" val="4288432972"/>
+        <p14:creationId xmlns:p14="http://schemas.microsoft.com/office/powerpoint/2010/main" val="4247654423"/>
       </p:ext>
     </p:extLst>
   </p:cSld>
@@ -11616,8 +13057,8 @@
         </p:blipFill>
         <p:spPr>
           <a:xfrm>
-            <a:off x="8719368" y="1164637"/>
-            <a:ext cx="3472632" cy="1741742"/>
+            <a:off x="6676201" y="1960436"/>
+            <a:ext cx="4001743" cy="2007124"/>
           </a:xfrm>
           <a:prstGeom prst="rect">
             <a:avLst/>
@@ -11992,7 +13433,7 @@
           <a:graphicData uri="http://schemas.openxmlformats.org/presentationml/2006/ole">
             <mc:AlternateContent xmlns:mc="http://schemas.openxmlformats.org/markup-compatibility/2006">
               <mc:Choice xmlns:v="urn:schemas-microsoft-com:vml" Requires="v">
-                <p:oleObj spid="_x0000_s2717" name="Equazione" r:id="rId8" imgW="1815312" imgH="393529" progId="Equation.3">
+                <p:oleObj spid="_x0000_s2793" name="Equazione" r:id="rId8" imgW="1815312" imgH="393529" progId="Equation.3">
                   <p:embed/>
                 </p:oleObj>
               </mc:Choice>
@@ -12059,7 +13500,7 @@
           <a:graphicData uri="http://schemas.openxmlformats.org/presentationml/2006/ole">
             <mc:AlternateContent xmlns:mc="http://schemas.openxmlformats.org/markup-compatibility/2006">
               <mc:Choice xmlns:v="urn:schemas-microsoft-com:vml" Requires="v">
-                <p:oleObj spid="_x0000_s2718" name="Equazione" r:id="rId10" imgW="457200" imgH="241200" progId="Equation.3">
+                <p:oleObj spid="_x0000_s2794" name="Equazione" r:id="rId10" imgW="457200" imgH="241200" progId="Equation.3">
                   <p:embed/>
                 </p:oleObj>
               </mc:Choice>
@@ -12107,20 +13548,20 @@
           <p:nvPr>
             <p:extLst>
               <p:ext uri="{D42A27DB-BD31-4B8C-83A1-F6EECF244321}">
-                <p14:modId xmlns:p14="http://schemas.microsoft.com/office/powerpoint/2010/main" val="1659584791"/>
+                <p14:modId xmlns:p14="http://schemas.microsoft.com/office/powerpoint/2010/main" val="1837174191"/>
               </p:ext>
             </p:extLst>
           </p:nvPr>
         </p:nvGraphicFramePr>
         <p:xfrm>
-          <a:off x="6750299" y="3530588"/>
+          <a:off x="6814252" y="4681249"/>
           <a:ext cx="317204" cy="362519"/>
         </p:xfrm>
         <a:graphic>
           <a:graphicData uri="http://schemas.openxmlformats.org/presentationml/2006/ole">
             <mc:AlternateContent xmlns:mc="http://schemas.openxmlformats.org/markup-compatibility/2006">
               <mc:Choice xmlns:v="urn:schemas-microsoft-com:vml" Requires="v">
-                <p:oleObj spid="_x0000_s2719" name="Equazione" r:id="rId12" imgW="203112" imgH="228501" progId="Equation.3">
+                <p:oleObj spid="_x0000_s2795" name="Equazione" r:id="rId12" imgW="203112" imgH="228501" progId="Equation.3">
                   <p:embed/>
                 </p:oleObj>
               </mc:Choice>
@@ -12150,7 +13591,7 @@
                     </p:blipFill>
                     <p:spPr bwMode="auto">
                       <a:xfrm>
-                        <a:off x="6750299" y="3530588"/>
+                        <a:off x="6814252" y="4681249"/>
                         <a:ext cx="317204" cy="362519"/>
                       </a:xfrm>
                       <a:prstGeom prst="rect">
@@ -12315,20 +13756,20 @@
           <p:nvPr>
             <p:extLst>
               <p:ext uri="{D42A27DB-BD31-4B8C-83A1-F6EECF244321}">
-                <p14:modId xmlns:p14="http://schemas.microsoft.com/office/powerpoint/2010/main" val="4143628291"/>
+                <p14:modId xmlns:p14="http://schemas.microsoft.com/office/powerpoint/2010/main" val="1354070928"/>
               </p:ext>
             </p:extLst>
           </p:nvPr>
         </p:nvGraphicFramePr>
         <p:xfrm>
-          <a:off x="6750299" y="3033617"/>
+          <a:off x="6792417" y="4174120"/>
           <a:ext cx="1263573" cy="365371"/>
         </p:xfrm>
         <a:graphic>
           <a:graphicData uri="http://schemas.openxmlformats.org/presentationml/2006/ole">
             <mc:AlternateContent xmlns:mc="http://schemas.openxmlformats.org/markup-compatibility/2006">
               <mc:Choice xmlns:v="urn:schemas-microsoft-com:vml" Requires="v">
-                <p:oleObj spid="_x0000_s2720" name="Equazione" r:id="rId14" imgW="787400" imgH="228600" progId="Equation.3">
+                <p:oleObj spid="_x0000_s2796" name="Equazione" r:id="rId14" imgW="787400" imgH="228600" progId="Equation.3">
                   <p:embed/>
                 </p:oleObj>
               </mc:Choice>
@@ -12358,7 +13799,7 @@
                     </p:blipFill>
                     <p:spPr bwMode="auto">
                       <a:xfrm>
-                        <a:off x="6750299" y="3033617"/>
+                        <a:off x="6792417" y="4174120"/>
                         <a:ext cx="1263573" cy="365371"/>
                       </a:xfrm>
                       <a:prstGeom prst="rect">
@@ -12509,7 +13950,7 @@
         </p:nvSpPr>
         <p:spPr>
           <a:xfrm>
-            <a:off x="7023871" y="3495953"/>
+            <a:off x="7024136" y="4656600"/>
             <a:ext cx="1846596" cy="369332"/>
           </a:xfrm>
           <a:prstGeom prst="rect">
@@ -12542,7 +13983,7 @@
         </p:nvSpPr>
         <p:spPr>
           <a:xfrm>
-            <a:off x="9948333" y="1362184"/>
+            <a:off x="8085577" y="2311974"/>
             <a:ext cx="414867" cy="1279416"/>
           </a:xfrm>
           <a:prstGeom prst="ellipse">
@@ -12586,13 +14027,14 @@
           <p:cNvPr id="10" name="Connettore 2 9"/>
           <p:cNvCxnSpPr>
             <a:stCxn id="27" idx="2"/>
+            <a:endCxn id="8" idx="0"/>
           </p:cNvCxnSpPr>
           <p:nvPr/>
         </p:nvCxnSpPr>
         <p:spPr>
           <a:xfrm>
             <a:off x="8202219" y="1779659"/>
-            <a:ext cx="1746114" cy="0"/>
+            <a:ext cx="90792" cy="532315"/>
           </a:xfrm>
           <a:prstGeom prst="straightConnector1">
             <a:avLst/>
@@ -12627,7 +14069,7 @@
         </p:nvSpPr>
         <p:spPr>
           <a:xfrm>
-            <a:off x="7881969" y="3022128"/>
+            <a:off x="7947434" y="4140084"/>
             <a:ext cx="1568443" cy="369332"/>
           </a:xfrm>
           <a:prstGeom prst="rect">
@@ -13075,7 +14517,7 @@
           <a:graphicData uri="http://schemas.openxmlformats.org/presentationml/2006/ole">
             <mc:AlternateContent xmlns:mc="http://schemas.openxmlformats.org/markup-compatibility/2006">
               <mc:Choice xmlns:v="urn:schemas-microsoft-com:vml" Requires="v">
-                <p:oleObj spid="_x0000_s11326" name="Equazione" r:id="rId8" imgW="1625400" imgH="241200" progId="Equation.3">
+                <p:oleObj spid="_x0000_s11421" name="Equazione" r:id="rId8" imgW="1625400" imgH="241200" progId="Equation.3">
                   <p:embed/>
                 </p:oleObj>
               </mc:Choice>
@@ -13141,7 +14583,7 @@
           <a:graphicData uri="http://schemas.openxmlformats.org/presentationml/2006/ole">
             <mc:AlternateContent xmlns:mc="http://schemas.openxmlformats.org/markup-compatibility/2006">
               <mc:Choice xmlns:v="urn:schemas-microsoft-com:vml" Requires="v">
-                <p:oleObj spid="_x0000_s11327" name="Equazione" r:id="rId10" imgW="304668" imgH="228501" progId="Equation.3">
+                <p:oleObj spid="_x0000_s11422" name="Equazione" r:id="rId10" imgW="304668" imgH="228501" progId="Equation.3">
                   <p:embed/>
                 </p:oleObj>
               </mc:Choice>
@@ -13208,7 +14650,7 @@
           <a:graphicData uri="http://schemas.openxmlformats.org/presentationml/2006/ole">
             <mc:AlternateContent xmlns:mc="http://schemas.openxmlformats.org/markup-compatibility/2006">
               <mc:Choice xmlns:v="urn:schemas-microsoft-com:vml" Requires="v">
-                <p:oleObj spid="_x0000_s11328" name="Equazione" r:id="rId12" imgW="139579" imgH="177646" progId="Equation.3">
+                <p:oleObj spid="_x0000_s11423" name="Equazione" r:id="rId12" imgW="139579" imgH="177646" progId="Equation.3">
                   <p:embed/>
                 </p:oleObj>
               </mc:Choice>
@@ -13275,7 +14717,7 @@
           <a:graphicData uri="http://schemas.openxmlformats.org/presentationml/2006/ole">
             <mc:AlternateContent xmlns:mc="http://schemas.openxmlformats.org/markup-compatibility/2006">
               <mc:Choice xmlns:v="urn:schemas-microsoft-com:vml" Requires="v">
-                <p:oleObj spid="_x0000_s11329" name="Equazione" r:id="rId14" imgW="545760" imgH="241200" progId="Equation.3">
+                <p:oleObj spid="_x0000_s11424" name="Equazione" r:id="rId14" imgW="545760" imgH="241200" progId="Equation.3">
                   <p:embed/>
                 </p:oleObj>
               </mc:Choice>
@@ -13862,7 +15304,7 @@
           <a:graphicData uri="http://schemas.openxmlformats.org/presentationml/2006/ole">
             <mc:AlternateContent xmlns:mc="http://schemas.openxmlformats.org/markup-compatibility/2006">
               <mc:Choice xmlns:v="urn:schemas-microsoft-com:vml" Requires="v">
-                <p:oleObj spid="_x0000_s11330" name="Equazione" r:id="rId12" imgW="139579" imgH="177646" progId="Equation.3">
+                <p:oleObj spid="_x0000_s11425" name="Equazione" r:id="rId12" imgW="139579" imgH="177646" progId="Equation.3">
                   <p:embed/>
                 </p:oleObj>
               </mc:Choice>
@@ -14190,7 +15632,7 @@
           <a:graphicData uri="http://schemas.openxmlformats.org/presentationml/2006/ole">
             <mc:AlternateContent xmlns:mc="http://schemas.openxmlformats.org/markup-compatibility/2006">
               <mc:Choice xmlns:v="urn:schemas-microsoft-com:vml" Requires="v">
-                <p:oleObj spid="_x0000_s9349" name="Equazione" r:id="rId7" imgW="1549400" imgH="228600" progId="Equation.3">
+                <p:oleObj spid="_x0000_s9463" name="Equazione" r:id="rId7" imgW="1549400" imgH="228600" progId="Equation.3">
                   <p:embed/>
                 </p:oleObj>
               </mc:Choice>
@@ -14262,7 +15704,7 @@
           <a:graphicData uri="http://schemas.openxmlformats.org/presentationml/2006/ole">
             <mc:AlternateContent xmlns:mc="http://schemas.openxmlformats.org/markup-compatibility/2006">
               <mc:Choice xmlns:v="urn:schemas-microsoft-com:vml" Requires="v">
-                <p:oleObj spid="_x0000_s9350" name="Equazione" r:id="rId9" imgW="469900" imgH="228600" progId="Equation.3">
+                <p:oleObj spid="_x0000_s9464" name="Equazione" r:id="rId9" imgW="469900" imgH="228600" progId="Equation.3">
                   <p:embed/>
                 </p:oleObj>
               </mc:Choice>
@@ -14462,7 +15904,7 @@
           <a:graphicData uri="http://schemas.openxmlformats.org/presentationml/2006/ole">
             <mc:AlternateContent xmlns:mc="http://schemas.openxmlformats.org/markup-compatibility/2006">
               <mc:Choice xmlns:v="urn:schemas-microsoft-com:vml" Requires="v">
-                <p:oleObj spid="_x0000_s9351" name="Equazione" r:id="rId11" imgW="520474" imgH="393529" progId="Equation.3">
+                <p:oleObj spid="_x0000_s9465" name="Equazione" r:id="rId11" imgW="520474" imgH="393529" progId="Equation.3">
                   <p:embed/>
                 </p:oleObj>
               </mc:Choice>
@@ -14529,7 +15971,7 @@
           <a:graphicData uri="http://schemas.openxmlformats.org/presentationml/2006/ole">
             <mc:AlternateContent xmlns:mc="http://schemas.openxmlformats.org/markup-compatibility/2006">
               <mc:Choice xmlns:v="urn:schemas-microsoft-com:vml" Requires="v">
-                <p:oleObj spid="_x0000_s9352" name="Equazione" r:id="rId13" imgW="2044700" imgH="393700" progId="Equation.3">
+                <p:oleObj spid="_x0000_s9466" name="Equazione" r:id="rId13" imgW="2044700" imgH="393700" progId="Equation.3">
                   <p:embed/>
                 </p:oleObj>
               </mc:Choice>
@@ -14601,7 +16043,7 @@
           <a:graphicData uri="http://schemas.openxmlformats.org/presentationml/2006/ole">
             <mc:AlternateContent xmlns:mc="http://schemas.openxmlformats.org/markup-compatibility/2006">
               <mc:Choice xmlns:v="urn:schemas-microsoft-com:vml" Requires="v">
-                <p:oleObj spid="_x0000_s9353" name="Equazione" r:id="rId15" imgW="571252" imgH="393529" progId="Equation.3">
+                <p:oleObj spid="_x0000_s9467" name="Equazione" r:id="rId15" imgW="571252" imgH="393529" progId="Equation.3">
                   <p:embed/>
                 </p:oleObj>
               </mc:Choice>
@@ -15047,7 +16489,7 @@
           <a:graphicData uri="http://schemas.openxmlformats.org/presentationml/2006/ole">
             <mc:AlternateContent xmlns:mc="http://schemas.openxmlformats.org/markup-compatibility/2006">
               <mc:Choice xmlns:v="urn:schemas-microsoft-com:vml" Requires="v">
-                <p:oleObj spid="_x0000_s9354" name="Equazione" r:id="rId18" imgW="190440" imgH="152280" progId="Equation.3">
+                <p:oleObj spid="_x0000_s9468" name="Equazione" r:id="rId18" imgW="190440" imgH="152280" progId="Equation.3">
                   <p:embed/>
                 </p:oleObj>
               </mc:Choice>
@@ -15558,7 +17000,7 @@
           <a:graphicData uri="http://schemas.openxmlformats.org/presentationml/2006/ole">
             <mc:AlternateContent xmlns:mc="http://schemas.openxmlformats.org/markup-compatibility/2006">
               <mc:Choice xmlns:v="urn:schemas-microsoft-com:vml" Requires="v">
-                <p:oleObj spid="_x0000_s3598" name="Equazione" r:id="rId7" imgW="1651000" imgH="660400" progId="Equation.3">
+                <p:oleObj spid="_x0000_s3750" name="Equazione" r:id="rId7" imgW="1651000" imgH="660400" progId="Equation.3">
                   <p:embed/>
                 </p:oleObj>
               </mc:Choice>
@@ -15625,7 +17067,7 @@
           <a:graphicData uri="http://schemas.openxmlformats.org/presentationml/2006/ole">
             <mc:AlternateContent xmlns:mc="http://schemas.openxmlformats.org/markup-compatibility/2006">
               <mc:Choice xmlns:v="urn:schemas-microsoft-com:vml" Requires="v">
-                <p:oleObj spid="_x0000_s3599" name="Equazione" r:id="rId9" imgW="965160" imgH="393480" progId="Equation.3">
+                <p:oleObj spid="_x0000_s3751" name="Equazione" r:id="rId9" imgW="965160" imgH="393480" progId="Equation.3">
                   <p:embed/>
                 </p:oleObj>
               </mc:Choice>
@@ -15686,7 +17128,7 @@
           <a:graphicData uri="http://schemas.openxmlformats.org/presentationml/2006/ole">
             <mc:AlternateContent xmlns:mc="http://schemas.openxmlformats.org/markup-compatibility/2006">
               <mc:Choice xmlns:v="urn:schemas-microsoft-com:vml" Requires="v">
-                <p:oleObj spid="_x0000_s3600" name="Equazione" r:id="rId11" imgW="2374560" imgH="965160" progId="Equation.3">
+                <p:oleObj spid="_x0000_s3752" name="Equazione" r:id="rId11" imgW="2374560" imgH="965160" progId="Equation.3">
                   <p:embed/>
                 </p:oleObj>
               </mc:Choice>
@@ -15747,7 +17189,7 @@
           <a:graphicData uri="http://schemas.openxmlformats.org/presentationml/2006/ole">
             <mc:AlternateContent xmlns:mc="http://schemas.openxmlformats.org/markup-compatibility/2006">
               <mc:Choice xmlns:v="urn:schemas-microsoft-com:vml" Requires="v">
-                <p:oleObj spid="_x0000_s3601" name="Equazione" r:id="rId13" imgW="190440" imgH="152280" progId="Equation.3">
+                <p:oleObj spid="_x0000_s3753" name="Equazione" r:id="rId13" imgW="190440" imgH="152280" progId="Equation.3">
                   <p:embed/>
                 </p:oleObj>
               </mc:Choice>
@@ -15979,7 +17421,7 @@
           <a:graphicData uri="http://schemas.openxmlformats.org/presentationml/2006/ole">
             <mc:AlternateContent xmlns:mc="http://schemas.openxmlformats.org/markup-compatibility/2006">
               <mc:Choice xmlns:v="urn:schemas-microsoft-com:vml" Requires="v">
-                <p:oleObj spid="_x0000_s3602" name="Equazione" r:id="rId15" imgW="1892300" imgH="482600" progId="Equation.3">
+                <p:oleObj spid="_x0000_s3754" name="Equazione" r:id="rId15" imgW="1892300" imgH="482600" progId="Equation.3">
                   <p:embed/>
                 </p:oleObj>
               </mc:Choice>
@@ -16046,7 +17488,7 @@
           <a:graphicData uri="http://schemas.openxmlformats.org/presentationml/2006/ole">
             <mc:AlternateContent xmlns:mc="http://schemas.openxmlformats.org/markup-compatibility/2006">
               <mc:Choice xmlns:v="urn:schemas-microsoft-com:vml" Requires="v">
-                <p:oleObj spid="_x0000_s3603" name="Equazione" r:id="rId17" imgW="774364" imgH="457002" progId="Equation.3">
+                <p:oleObj spid="_x0000_s3755" name="Equazione" r:id="rId17" imgW="774364" imgH="457002" progId="Equation.3">
                   <p:embed/>
                 </p:oleObj>
               </mc:Choice>
@@ -16113,7 +17555,7 @@
           <a:graphicData uri="http://schemas.openxmlformats.org/presentationml/2006/ole">
             <mc:AlternateContent xmlns:mc="http://schemas.openxmlformats.org/markup-compatibility/2006">
               <mc:Choice xmlns:v="urn:schemas-microsoft-com:vml" Requires="v">
-                <p:oleObj spid="_x0000_s3604" name="Equazione" r:id="rId19" imgW="3009900" imgH="1143000" progId="Equation.3">
+                <p:oleObj spid="_x0000_s3756" name="Equazione" r:id="rId19" imgW="3009900" imgH="1143000" progId="Equation.3">
                   <p:embed/>
                 </p:oleObj>
               </mc:Choice>
@@ -16354,7 +17796,7 @@
           <a:graphicData uri="http://schemas.openxmlformats.org/presentationml/2006/ole">
             <mc:AlternateContent xmlns:mc="http://schemas.openxmlformats.org/markup-compatibility/2006">
               <mc:Choice xmlns:v="urn:schemas-microsoft-com:vml" Requires="v">
-                <p:oleObj spid="_x0000_s3605" name="Equazione" r:id="rId21" imgW="3251160" imgH="1600200" progId="Equation.3">
+                <p:oleObj spid="_x0000_s3757" name="Equazione" r:id="rId21" imgW="3251160" imgH="1600200" progId="Equation.3">
                   <p:embed/>
                 </p:oleObj>
               </mc:Choice>
@@ -17389,13 +18831,18 @@
         </p:nvSpPr>
         <p:spPr>
           <a:xfrm>
-            <a:off x="8237913" y="5503025"/>
+            <a:off x="7936160" y="5401452"/>
             <a:ext cx="1851725" cy="369332"/>
           </a:xfrm>
           <a:prstGeom prst="rect">
             <a:avLst/>
           </a:prstGeom>
           <a:noFill/>
+          <a:ln>
+            <a:solidFill>
+              <a:schemeClr val="tx1"/>
+            </a:solidFill>
+          </a:ln>
         </p:spPr>
         <p:txBody>
           <a:bodyPr wrap="none" rtlCol="0">
@@ -17410,6 +18857,65 @@
           </a:p>
         </p:txBody>
       </p:sp>
+      <p:pic>
+        <p:nvPicPr>
+          <p:cNvPr id="2" name="Immagine 1"/>
+          <p:cNvPicPr>
+            <a:picLocks noChangeAspect="1"/>
+          </p:cNvPicPr>
+          <p:nvPr/>
+        </p:nvPicPr>
+        <p:blipFill>
+          <a:blip r:embed="rId6" cstate="print">
+            <a:extLst>
+              <a:ext uri="{28A0092B-C50C-407E-A947-70E740481C1C}">
+                <a14:useLocalDpi xmlns:a14="http://schemas.microsoft.com/office/drawing/2010/main" val="0"/>
+              </a:ext>
+            </a:extLst>
+          </a:blip>
+          <a:stretch>
+            <a:fillRect/>
+          </a:stretch>
+        </p:blipFill>
+        <p:spPr>
+          <a:xfrm>
+            <a:off x="6889068" y="3127807"/>
+            <a:ext cx="4657312" cy="2035253"/>
+          </a:xfrm>
+          <a:prstGeom prst="rect">
+            <a:avLst/>
+          </a:prstGeom>
+        </p:spPr>
+      </p:pic>
+      <p:pic>
+        <p:nvPicPr>
+          <p:cNvPr id="32" name="Immagine 31"/>
+          <p:cNvPicPr>
+            <a:picLocks noChangeAspect="1"/>
+          </p:cNvPicPr>
+          <p:nvPr/>
+        </p:nvPicPr>
+        <p:blipFill rotWithShape="1">
+          <a:blip r:embed="rId7" cstate="print">
+            <a:extLst>
+              <a:ext uri="{28A0092B-C50C-407E-A947-70E740481C1C}">
+                <a14:useLocalDpi xmlns:a14="http://schemas.microsoft.com/office/drawing/2010/main" val="0"/>
+              </a:ext>
+            </a:extLst>
+          </a:blip>
+          <a:srcRect t="13063"/>
+          <a:stretch/>
+        </p:blipFill>
+        <p:spPr>
+          <a:xfrm>
+            <a:off x="7008532" y="1520081"/>
+            <a:ext cx="3407315" cy="1666241"/>
+          </a:xfrm>
+          <a:prstGeom prst="rect">
+            <a:avLst/>
+          </a:prstGeom>
+        </p:spPr>
+      </p:pic>
     </p:spTree>
     <p:extLst>
       <p:ext uri="{BB962C8B-B14F-4D97-AF65-F5344CB8AC3E}">

</xml_diff>

<commit_message>
Slides part 1 uodate
Correction back emf
</commit_message>
<xml_diff>
--- a/finalPresentation/Part 1/Part1.pptx
+++ b/finalPresentation/Part 1/Part1.pptx
@@ -6909,7 +6909,7 @@
           <a:graphicData uri="http://schemas.openxmlformats.org/presentationml/2006/ole">
             <mc:AlternateContent xmlns:mc="http://schemas.openxmlformats.org/markup-compatibility/2006">
               <mc:Choice xmlns:v="urn:schemas-microsoft-com:vml" Requires="v">
-                <p:oleObj spid="_x0000_s14387" name="Equazione" r:id="rId8" imgW="1714320" imgH="419040" progId="Equation.3">
+                <p:oleObj spid="_x0000_s14389" name="Equazione" r:id="rId8" imgW="1714320" imgH="419040" progId="Equation.3">
                   <p:embed/>
                 </p:oleObj>
               </mc:Choice>
@@ -7262,7 +7262,7 @@
           <a:graphicData uri="http://schemas.openxmlformats.org/presentationml/2006/ole">
             <mc:AlternateContent xmlns:mc="http://schemas.openxmlformats.org/markup-compatibility/2006">
               <mc:Choice xmlns:v="urn:schemas-microsoft-com:vml" Requires="v">
-                <p:oleObj spid="_x0000_s14388" name="Equazione" r:id="rId10" imgW="2590560" imgH="330120" progId="Equation.3">
+                <p:oleObj spid="_x0000_s14390" name="Equazione" r:id="rId10" imgW="2590560" imgH="330120" progId="Equation.3">
                   <p:embed/>
                 </p:oleObj>
               </mc:Choice>
@@ -7755,7 +7755,7 @@
           <a:graphicData uri="http://schemas.openxmlformats.org/presentationml/2006/ole">
             <mc:AlternateContent xmlns:mc="http://schemas.openxmlformats.org/markup-compatibility/2006">
               <mc:Choice xmlns:v="urn:schemas-microsoft-com:vml" Requires="v">
-                <p:oleObj spid="_x0000_s13335" name="Equazione" r:id="rId7" imgW="876240" imgH="253800" progId="Equation.3">
+                <p:oleObj spid="_x0000_s13336" name="Equazione" r:id="rId7" imgW="876240" imgH="253800" progId="Equation.3">
                   <p:embed/>
                 </p:oleObj>
               </mc:Choice>
@@ -8136,7 +8136,7 @@
           <a:graphicData uri="http://schemas.openxmlformats.org/presentationml/2006/ole">
             <mc:AlternateContent xmlns:mc="http://schemas.openxmlformats.org/markup-compatibility/2006">
               <mc:Choice xmlns:v="urn:schemas-microsoft-com:vml" Requires="v">
-                <p:oleObj spid="_x0000_s12421" name="Equazione" r:id="rId8" imgW="1841500" imgH="203200" progId="Equation.3">
+                <p:oleObj spid="_x0000_s12422" name="Equazione" r:id="rId8" imgW="1841500" imgH="203200" progId="Equation.3">
                   <p:embed/>
                 </p:oleObj>
               </mc:Choice>
@@ -8887,7 +8887,7 @@
           <a:graphicData uri="http://schemas.openxmlformats.org/presentationml/2006/ole">
             <mc:AlternateContent xmlns:mc="http://schemas.openxmlformats.org/markup-compatibility/2006">
               <mc:Choice xmlns:v="urn:schemas-microsoft-com:vml" Requires="v">
-                <p:oleObj spid="_x0000_s15437" name="Equazione" r:id="rId8" imgW="1167893" imgH="393529" progId="Equation.3">
+                <p:oleObj spid="_x0000_s15443" name="Equazione" r:id="rId8" imgW="1167893" imgH="393529" progId="Equation.3">
                   <p:embed/>
                 </p:oleObj>
               </mc:Choice>
@@ -8954,7 +8954,7 @@
           <a:graphicData uri="http://schemas.openxmlformats.org/presentationml/2006/ole">
             <mc:AlternateContent xmlns:mc="http://schemas.openxmlformats.org/markup-compatibility/2006">
               <mc:Choice xmlns:v="urn:schemas-microsoft-com:vml" Requires="v">
-                <p:oleObj spid="_x0000_s15438" name="Equazione" r:id="rId10" imgW="901309" imgH="393529" progId="Equation.3">
+                <p:oleObj spid="_x0000_s15444" name="Equazione" r:id="rId10" imgW="901309" imgH="393529" progId="Equation.3">
                   <p:embed/>
                 </p:oleObj>
               </mc:Choice>
@@ -9021,7 +9021,7 @@
           <a:graphicData uri="http://schemas.openxmlformats.org/presentationml/2006/ole">
             <mc:AlternateContent xmlns:mc="http://schemas.openxmlformats.org/markup-compatibility/2006">
               <mc:Choice xmlns:v="urn:schemas-microsoft-com:vml" Requires="v">
-                <p:oleObj spid="_x0000_s15439" name="Equazione" r:id="rId12" imgW="1511300" imgH="203200" progId="Equation.3">
+                <p:oleObj spid="_x0000_s15445" name="Equazione" r:id="rId12" imgW="1511300" imgH="203200" progId="Equation.3">
                   <p:embed/>
                 </p:oleObj>
               </mc:Choice>
@@ -9088,7 +9088,7 @@
           <a:graphicData uri="http://schemas.openxmlformats.org/presentationml/2006/ole">
             <mc:AlternateContent xmlns:mc="http://schemas.openxmlformats.org/markup-compatibility/2006">
               <mc:Choice xmlns:v="urn:schemas-microsoft-com:vml" Requires="v">
-                <p:oleObj spid="_x0000_s15440" name="Equazione" r:id="rId14" imgW="647640" imgH="228600" progId="Equation.3">
+                <p:oleObj spid="_x0000_s15446" name="Equazione" r:id="rId14" imgW="647640" imgH="228600" progId="Equation.3">
                   <p:embed/>
                 </p:oleObj>
               </mc:Choice>
@@ -9149,7 +9149,7 @@
           <a:graphicData uri="http://schemas.openxmlformats.org/presentationml/2006/ole">
             <mc:AlternateContent xmlns:mc="http://schemas.openxmlformats.org/markup-compatibility/2006">
               <mc:Choice xmlns:v="urn:schemas-microsoft-com:vml" Requires="v">
-                <p:oleObj spid="_x0000_s15441" name="Equazione" r:id="rId16" imgW="889000" imgH="228600" progId="Equation.3">
+                <p:oleObj spid="_x0000_s15447" name="Equazione" r:id="rId16" imgW="889000" imgH="228600" progId="Equation.3">
                   <p:embed/>
                 </p:oleObj>
               </mc:Choice>
@@ -9839,7 +9839,7 @@
           <a:graphicData uri="http://schemas.openxmlformats.org/presentationml/2006/ole">
             <mc:AlternateContent xmlns:mc="http://schemas.openxmlformats.org/markup-compatibility/2006">
               <mc:Choice xmlns:v="urn:schemas-microsoft-com:vml" Requires="v">
-                <p:oleObj spid="_x0000_s15442" name="Equazione" r:id="rId18" imgW="507960" imgH="393480" progId="Equation.3">
+                <p:oleObj spid="_x0000_s15448" name="Equazione" r:id="rId18" imgW="507960" imgH="393480" progId="Equation.3">
                   <p:embed/>
                 </p:oleObj>
               </mc:Choice>
@@ -13057,7 +13057,7 @@
         </p:blipFill>
         <p:spPr>
           <a:xfrm>
-            <a:off x="6676201" y="1960436"/>
+            <a:off x="6676201" y="1936163"/>
             <a:ext cx="4001743" cy="2007124"/>
           </a:xfrm>
           <a:prstGeom prst="rect">
@@ -13433,7 +13433,7 @@
           <a:graphicData uri="http://schemas.openxmlformats.org/presentationml/2006/ole">
             <mc:AlternateContent xmlns:mc="http://schemas.openxmlformats.org/markup-compatibility/2006">
               <mc:Choice xmlns:v="urn:schemas-microsoft-com:vml" Requires="v">
-                <p:oleObj spid="_x0000_s2793" name="Equazione" r:id="rId8" imgW="1815312" imgH="393529" progId="Equation.3">
+                <p:oleObj spid="_x0000_s2797" name="Equazione" r:id="rId8" imgW="1815312" imgH="393529" progId="Equation.3">
                   <p:embed/>
                 </p:oleObj>
               </mc:Choice>
@@ -13500,7 +13500,7 @@
           <a:graphicData uri="http://schemas.openxmlformats.org/presentationml/2006/ole">
             <mc:AlternateContent xmlns:mc="http://schemas.openxmlformats.org/markup-compatibility/2006">
               <mc:Choice xmlns:v="urn:schemas-microsoft-com:vml" Requires="v">
-                <p:oleObj spid="_x0000_s2794" name="Equazione" r:id="rId10" imgW="457200" imgH="241200" progId="Equation.3">
+                <p:oleObj spid="_x0000_s2798" name="Equazione" r:id="rId10" imgW="457200" imgH="241200" progId="Equation.3">
                   <p:embed/>
                 </p:oleObj>
               </mc:Choice>
@@ -13561,7 +13561,7 @@
           <a:graphicData uri="http://schemas.openxmlformats.org/presentationml/2006/ole">
             <mc:AlternateContent xmlns:mc="http://schemas.openxmlformats.org/markup-compatibility/2006">
               <mc:Choice xmlns:v="urn:schemas-microsoft-com:vml" Requires="v">
-                <p:oleObj spid="_x0000_s2795" name="Equazione" r:id="rId12" imgW="203112" imgH="228501" progId="Equation.3">
+                <p:oleObj spid="_x0000_s2799" name="Equazione" r:id="rId12" imgW="203112" imgH="228501" progId="Equation.3">
                   <p:embed/>
                 </p:oleObj>
               </mc:Choice>
@@ -13769,7 +13769,7 @@
           <a:graphicData uri="http://schemas.openxmlformats.org/presentationml/2006/ole">
             <mc:AlternateContent xmlns:mc="http://schemas.openxmlformats.org/markup-compatibility/2006">
               <mc:Choice xmlns:v="urn:schemas-microsoft-com:vml" Requires="v">
-                <p:oleObj spid="_x0000_s2796" name="Equazione" r:id="rId14" imgW="787400" imgH="228600" progId="Equation.3">
+                <p:oleObj spid="_x0000_s2800" name="Equazione" r:id="rId14" imgW="787400" imgH="228600" progId="Equation.3">
                   <p:embed/>
                 </p:oleObj>
               </mc:Choice>
@@ -13983,8 +13983,8 @@
         </p:nvSpPr>
         <p:spPr>
           <a:xfrm>
-            <a:off x="8085577" y="2311974"/>
-            <a:ext cx="414867" cy="1279416"/>
+            <a:off x="7555062" y="2150388"/>
+            <a:ext cx="500928" cy="861696"/>
           </a:xfrm>
           <a:prstGeom prst="ellipse">
             <a:avLst/>
@@ -14032,9 +14032,9 @@
           <p:nvPr/>
         </p:nvCxnSpPr>
         <p:spPr>
-          <a:xfrm>
-            <a:off x="8202219" y="1779659"/>
-            <a:ext cx="90792" cy="532315"/>
+          <a:xfrm flipH="1">
+            <a:off x="7805526" y="1779659"/>
+            <a:ext cx="396693" cy="370729"/>
           </a:xfrm>
           <a:prstGeom prst="straightConnector1">
             <a:avLst/>
@@ -14517,7 +14517,7 @@
           <a:graphicData uri="http://schemas.openxmlformats.org/presentationml/2006/ole">
             <mc:AlternateContent xmlns:mc="http://schemas.openxmlformats.org/markup-compatibility/2006">
               <mc:Choice xmlns:v="urn:schemas-microsoft-com:vml" Requires="v">
-                <p:oleObj spid="_x0000_s11421" name="Equazione" r:id="rId8" imgW="1625400" imgH="241200" progId="Equation.3">
+                <p:oleObj spid="_x0000_s11426" name="Equazione" r:id="rId8" imgW="1625400" imgH="241200" progId="Equation.3">
                   <p:embed/>
                 </p:oleObj>
               </mc:Choice>
@@ -14583,7 +14583,7 @@
           <a:graphicData uri="http://schemas.openxmlformats.org/presentationml/2006/ole">
             <mc:AlternateContent xmlns:mc="http://schemas.openxmlformats.org/markup-compatibility/2006">
               <mc:Choice xmlns:v="urn:schemas-microsoft-com:vml" Requires="v">
-                <p:oleObj spid="_x0000_s11422" name="Equazione" r:id="rId10" imgW="304668" imgH="228501" progId="Equation.3">
+                <p:oleObj spid="_x0000_s11427" name="Equazione" r:id="rId10" imgW="304668" imgH="228501" progId="Equation.3">
                   <p:embed/>
                 </p:oleObj>
               </mc:Choice>
@@ -14650,7 +14650,7 @@
           <a:graphicData uri="http://schemas.openxmlformats.org/presentationml/2006/ole">
             <mc:AlternateContent xmlns:mc="http://schemas.openxmlformats.org/markup-compatibility/2006">
               <mc:Choice xmlns:v="urn:schemas-microsoft-com:vml" Requires="v">
-                <p:oleObj spid="_x0000_s11423" name="Equazione" r:id="rId12" imgW="139579" imgH="177646" progId="Equation.3">
+                <p:oleObj spid="_x0000_s11428" name="Equazione" r:id="rId12" imgW="139579" imgH="177646" progId="Equation.3">
                   <p:embed/>
                 </p:oleObj>
               </mc:Choice>
@@ -14717,7 +14717,7 @@
           <a:graphicData uri="http://schemas.openxmlformats.org/presentationml/2006/ole">
             <mc:AlternateContent xmlns:mc="http://schemas.openxmlformats.org/markup-compatibility/2006">
               <mc:Choice xmlns:v="urn:schemas-microsoft-com:vml" Requires="v">
-                <p:oleObj spid="_x0000_s11424" name="Equazione" r:id="rId14" imgW="545760" imgH="241200" progId="Equation.3">
+                <p:oleObj spid="_x0000_s11429" name="Equazione" r:id="rId14" imgW="545760" imgH="241200" progId="Equation.3">
                   <p:embed/>
                 </p:oleObj>
               </mc:Choice>
@@ -15304,7 +15304,7 @@
           <a:graphicData uri="http://schemas.openxmlformats.org/presentationml/2006/ole">
             <mc:AlternateContent xmlns:mc="http://schemas.openxmlformats.org/markup-compatibility/2006">
               <mc:Choice xmlns:v="urn:schemas-microsoft-com:vml" Requires="v">
-                <p:oleObj spid="_x0000_s11425" name="Equazione" r:id="rId12" imgW="139579" imgH="177646" progId="Equation.3">
+                <p:oleObj spid="_x0000_s11430" name="Equazione" r:id="rId12" imgW="139579" imgH="177646" progId="Equation.3">
                   <p:embed/>
                 </p:oleObj>
               </mc:Choice>
@@ -15632,7 +15632,7 @@
           <a:graphicData uri="http://schemas.openxmlformats.org/presentationml/2006/ole">
             <mc:AlternateContent xmlns:mc="http://schemas.openxmlformats.org/markup-compatibility/2006">
               <mc:Choice xmlns:v="urn:schemas-microsoft-com:vml" Requires="v">
-                <p:oleObj spid="_x0000_s9463" name="Equazione" r:id="rId7" imgW="1549400" imgH="228600" progId="Equation.3">
+                <p:oleObj spid="_x0000_s9469" name="Equazione" r:id="rId7" imgW="1549400" imgH="228600" progId="Equation.3">
                   <p:embed/>
                 </p:oleObj>
               </mc:Choice>
@@ -15704,7 +15704,7 @@
           <a:graphicData uri="http://schemas.openxmlformats.org/presentationml/2006/ole">
             <mc:AlternateContent xmlns:mc="http://schemas.openxmlformats.org/markup-compatibility/2006">
               <mc:Choice xmlns:v="urn:schemas-microsoft-com:vml" Requires="v">
-                <p:oleObj spid="_x0000_s9464" name="Equazione" r:id="rId9" imgW="469900" imgH="228600" progId="Equation.3">
+                <p:oleObj spid="_x0000_s9470" name="Equazione" r:id="rId9" imgW="469900" imgH="228600" progId="Equation.3">
                   <p:embed/>
                 </p:oleObj>
               </mc:Choice>
@@ -15904,7 +15904,7 @@
           <a:graphicData uri="http://schemas.openxmlformats.org/presentationml/2006/ole">
             <mc:AlternateContent xmlns:mc="http://schemas.openxmlformats.org/markup-compatibility/2006">
               <mc:Choice xmlns:v="urn:schemas-microsoft-com:vml" Requires="v">
-                <p:oleObj spid="_x0000_s9465" name="Equazione" r:id="rId11" imgW="520474" imgH="393529" progId="Equation.3">
+                <p:oleObj spid="_x0000_s9471" name="Equazione" r:id="rId11" imgW="520474" imgH="393529" progId="Equation.3">
                   <p:embed/>
                 </p:oleObj>
               </mc:Choice>
@@ -15971,7 +15971,7 @@
           <a:graphicData uri="http://schemas.openxmlformats.org/presentationml/2006/ole">
             <mc:AlternateContent xmlns:mc="http://schemas.openxmlformats.org/markup-compatibility/2006">
               <mc:Choice xmlns:v="urn:schemas-microsoft-com:vml" Requires="v">
-                <p:oleObj spid="_x0000_s9466" name="Equazione" r:id="rId13" imgW="2044700" imgH="393700" progId="Equation.3">
+                <p:oleObj spid="_x0000_s9472" name="Equazione" r:id="rId13" imgW="2044700" imgH="393700" progId="Equation.3">
                   <p:embed/>
                 </p:oleObj>
               </mc:Choice>
@@ -16043,7 +16043,7 @@
           <a:graphicData uri="http://schemas.openxmlformats.org/presentationml/2006/ole">
             <mc:AlternateContent xmlns:mc="http://schemas.openxmlformats.org/markup-compatibility/2006">
               <mc:Choice xmlns:v="urn:schemas-microsoft-com:vml" Requires="v">
-                <p:oleObj spid="_x0000_s9467" name="Equazione" r:id="rId15" imgW="571252" imgH="393529" progId="Equation.3">
+                <p:oleObj spid="_x0000_s9473" name="Equazione" r:id="rId15" imgW="571252" imgH="393529" progId="Equation.3">
                   <p:embed/>
                 </p:oleObj>
               </mc:Choice>
@@ -16489,7 +16489,7 @@
           <a:graphicData uri="http://schemas.openxmlformats.org/presentationml/2006/ole">
             <mc:AlternateContent xmlns:mc="http://schemas.openxmlformats.org/markup-compatibility/2006">
               <mc:Choice xmlns:v="urn:schemas-microsoft-com:vml" Requires="v">
-                <p:oleObj spid="_x0000_s9468" name="Equazione" r:id="rId18" imgW="190440" imgH="152280" progId="Equation.3">
+                <p:oleObj spid="_x0000_s9474" name="Equazione" r:id="rId18" imgW="190440" imgH="152280" progId="Equation.3">
                   <p:embed/>
                 </p:oleObj>
               </mc:Choice>
@@ -17000,7 +17000,7 @@
           <a:graphicData uri="http://schemas.openxmlformats.org/presentationml/2006/ole">
             <mc:AlternateContent xmlns:mc="http://schemas.openxmlformats.org/markup-compatibility/2006">
               <mc:Choice xmlns:v="urn:schemas-microsoft-com:vml" Requires="v">
-                <p:oleObj spid="_x0000_s3750" name="Equazione" r:id="rId7" imgW="1651000" imgH="660400" progId="Equation.3">
+                <p:oleObj spid="_x0000_s3758" name="Equazione" r:id="rId7" imgW="1651000" imgH="660400" progId="Equation.3">
                   <p:embed/>
                 </p:oleObj>
               </mc:Choice>
@@ -17067,7 +17067,7 @@
           <a:graphicData uri="http://schemas.openxmlformats.org/presentationml/2006/ole">
             <mc:AlternateContent xmlns:mc="http://schemas.openxmlformats.org/markup-compatibility/2006">
               <mc:Choice xmlns:v="urn:schemas-microsoft-com:vml" Requires="v">
-                <p:oleObj spid="_x0000_s3751" name="Equazione" r:id="rId9" imgW="965160" imgH="393480" progId="Equation.3">
+                <p:oleObj spid="_x0000_s3759" name="Equazione" r:id="rId9" imgW="965160" imgH="393480" progId="Equation.3">
                   <p:embed/>
                 </p:oleObj>
               </mc:Choice>
@@ -17128,7 +17128,7 @@
           <a:graphicData uri="http://schemas.openxmlformats.org/presentationml/2006/ole">
             <mc:AlternateContent xmlns:mc="http://schemas.openxmlformats.org/markup-compatibility/2006">
               <mc:Choice xmlns:v="urn:schemas-microsoft-com:vml" Requires="v">
-                <p:oleObj spid="_x0000_s3752" name="Equazione" r:id="rId11" imgW="2374560" imgH="965160" progId="Equation.3">
+                <p:oleObj spid="_x0000_s3760" name="Equazione" r:id="rId11" imgW="2374560" imgH="965160" progId="Equation.3">
                   <p:embed/>
                 </p:oleObj>
               </mc:Choice>
@@ -17189,7 +17189,7 @@
           <a:graphicData uri="http://schemas.openxmlformats.org/presentationml/2006/ole">
             <mc:AlternateContent xmlns:mc="http://schemas.openxmlformats.org/markup-compatibility/2006">
               <mc:Choice xmlns:v="urn:schemas-microsoft-com:vml" Requires="v">
-                <p:oleObj spid="_x0000_s3753" name="Equazione" r:id="rId13" imgW="190440" imgH="152280" progId="Equation.3">
+                <p:oleObj spid="_x0000_s3761" name="Equazione" r:id="rId13" imgW="190440" imgH="152280" progId="Equation.3">
                   <p:embed/>
                 </p:oleObj>
               </mc:Choice>
@@ -17421,7 +17421,7 @@
           <a:graphicData uri="http://schemas.openxmlformats.org/presentationml/2006/ole">
             <mc:AlternateContent xmlns:mc="http://schemas.openxmlformats.org/markup-compatibility/2006">
               <mc:Choice xmlns:v="urn:schemas-microsoft-com:vml" Requires="v">
-                <p:oleObj spid="_x0000_s3754" name="Equazione" r:id="rId15" imgW="1892300" imgH="482600" progId="Equation.3">
+                <p:oleObj spid="_x0000_s3762" name="Equazione" r:id="rId15" imgW="1892300" imgH="482600" progId="Equation.3">
                   <p:embed/>
                 </p:oleObj>
               </mc:Choice>
@@ -17488,7 +17488,7 @@
           <a:graphicData uri="http://schemas.openxmlformats.org/presentationml/2006/ole">
             <mc:AlternateContent xmlns:mc="http://schemas.openxmlformats.org/markup-compatibility/2006">
               <mc:Choice xmlns:v="urn:schemas-microsoft-com:vml" Requires="v">
-                <p:oleObj spid="_x0000_s3755" name="Equazione" r:id="rId17" imgW="774364" imgH="457002" progId="Equation.3">
+                <p:oleObj spid="_x0000_s3763" name="Equazione" r:id="rId17" imgW="774364" imgH="457002" progId="Equation.3">
                   <p:embed/>
                 </p:oleObj>
               </mc:Choice>
@@ -17555,7 +17555,7 @@
           <a:graphicData uri="http://schemas.openxmlformats.org/presentationml/2006/ole">
             <mc:AlternateContent xmlns:mc="http://schemas.openxmlformats.org/markup-compatibility/2006">
               <mc:Choice xmlns:v="urn:schemas-microsoft-com:vml" Requires="v">
-                <p:oleObj spid="_x0000_s3756" name="Equazione" r:id="rId19" imgW="3009900" imgH="1143000" progId="Equation.3">
+                <p:oleObj spid="_x0000_s3764" name="Equazione" r:id="rId19" imgW="3009900" imgH="1143000" progId="Equation.3">
                   <p:embed/>
                 </p:oleObj>
               </mc:Choice>
@@ -17796,7 +17796,7 @@
           <a:graphicData uri="http://schemas.openxmlformats.org/presentationml/2006/ole">
             <mc:AlternateContent xmlns:mc="http://schemas.openxmlformats.org/markup-compatibility/2006">
               <mc:Choice xmlns:v="urn:schemas-microsoft-com:vml" Requires="v">
-                <p:oleObj spid="_x0000_s3757" name="Equazione" r:id="rId21" imgW="3251160" imgH="1600200" progId="Equation.3">
+                <p:oleObj spid="_x0000_s3765" name="Equazione" r:id="rId21" imgW="3251160" imgH="1600200" progId="Equation.3">
                   <p:embed/>
                 </p:oleObj>
               </mc:Choice>

</xml_diff>